<commit_message>
Added files from Visio
</commit_message>
<xml_diff>
--- a/GIT.pptx
+++ b/GIT.pptx
@@ -11,6 +11,8 @@
     <p:sldId id="259" r:id="rId5"/>
     <p:sldId id="257" r:id="rId6"/>
     <p:sldId id="258" r:id="rId7"/>
+    <p:sldId id="263" r:id="rId8"/>
+    <p:sldId id="262" r:id="rId9"/>
   </p:sldIdLst>
   <p:sldSz cx="12192000" cy="6858000"/>
   <p:notesSz cx="6858000" cy="9144000"/>
@@ -109,6 +111,11 @@
       </a:defRPr>
     </a:lvl9pPr>
   </p:defaultTextStyle>
+  <p:extLst>
+    <p:ext uri="{EFAFB233-063F-42B5-8137-9DF3F51BA10A}">
+      <p15:sldGuideLst xmlns:p15="http://schemas.microsoft.com/office/powerpoint/2012/main"/>
+    </p:ext>
+  </p:extLst>
 </p:presentation>
 </file>
 
@@ -4576,11 +4583,11 @@
   <p:clrMapOvr>
     <a:masterClrMapping/>
   </p:clrMapOvr>
-  <mc:AlternateContent xmlns:mc="http://schemas.openxmlformats.org/markup-compatibility/2006">
-    <mc:Choice xmlns:p14="http://schemas.microsoft.com/office/powerpoint/2010/main" Requires="p14">
+  <mc:AlternateContent xmlns:mc="http://schemas.openxmlformats.org/markup-compatibility/2006" xmlns:p14="http://schemas.microsoft.com/office/powerpoint/2010/main">
+    <mc:Choice Requires="p14">
       <p:transition p14:dur="10"/>
     </mc:Choice>
-    <mc:Fallback>
+    <mc:Fallback xmlns="">
       <p:transition/>
     </mc:Fallback>
   </mc:AlternateContent>
@@ -6624,13 +6631,13 @@
   <p:clrMapOvr>
     <a:masterClrMapping/>
   </p:clrMapOvr>
-  <mc:AlternateContent xmlns:mc="http://schemas.openxmlformats.org/markup-compatibility/2006">
-    <mc:Choice xmlns:p14="http://schemas.microsoft.com/office/powerpoint/2010/main" Requires="p14">
+  <mc:AlternateContent xmlns:mc="http://schemas.openxmlformats.org/markup-compatibility/2006" xmlns:p14="http://schemas.microsoft.com/office/powerpoint/2010/main">
+    <mc:Choice Requires="p14">
       <p:transition spd="slow" p14:dur="3400">
         <p14:reveal/>
       </p:transition>
     </mc:Choice>
-    <mc:Fallback>
+    <mc:Fallback xmlns="">
       <p:transition spd="slow">
         <p:fade/>
       </p:transition>
@@ -6994,6 +7001,607 @@
     <p:extLst>
       <p:ext uri="{BB962C8B-B14F-4D97-AF65-F5344CB8AC3E}">
         <p14:creationId xmlns:p14="http://schemas.microsoft.com/office/powerpoint/2010/main" val="1224543025"/>
+      </p:ext>
+    </p:extLst>
+  </p:cSld>
+  <p:clrMapOvr>
+    <a:masterClrMapping/>
+  </p:clrMapOvr>
+  <p:timing>
+    <p:tnLst>
+      <p:par>
+        <p:cTn id="1" dur="indefinite" restart="never" nodeType="tmRoot"/>
+      </p:par>
+    </p:tnLst>
+  </p:timing>
+</p:sld>
+</file>
+
+<file path=ppt/slides/slide7.xml><?xml version="1.0" encoding="utf-8"?>
+<p:sld xmlns:a="http://schemas.openxmlformats.org/drawingml/2006/main" xmlns:r="http://schemas.openxmlformats.org/officeDocument/2006/relationships" xmlns:p="http://schemas.openxmlformats.org/presentationml/2006/main">
+  <p:cSld>
+    <p:spTree>
+      <p:nvGrpSpPr>
+        <p:cNvPr id="1" name=""/>
+        <p:cNvGrpSpPr/>
+        <p:nvPr/>
+      </p:nvGrpSpPr>
+      <p:grpSpPr>
+        <a:xfrm>
+          <a:off x="0" y="0"/>
+          <a:ext cx="0" cy="0"/>
+          <a:chOff x="0" y="0"/>
+          <a:chExt cx="0" cy="0"/>
+        </a:xfrm>
+      </p:grpSpPr>
+      <p:sp>
+        <p:nvSpPr>
+          <p:cNvPr id="2" name="Title 1"/>
+          <p:cNvSpPr>
+            <a:spLocks noGrp="1"/>
+          </p:cNvSpPr>
+          <p:nvPr>
+            <p:ph type="title"/>
+          </p:nvPr>
+        </p:nvSpPr>
+        <p:spPr>
+          <a:xfrm>
+            <a:off x="1396538" y="685800"/>
+            <a:ext cx="9601200" cy="1485900"/>
+          </a:xfrm>
+        </p:spPr>
+        <p:txBody>
+          <a:bodyPr/>
+          <a:lstStyle/>
+          <a:p>
+            <a:r>
+              <a:rPr lang="en-US" dirty="0" smtClean="0"/>
+              <a:t>Add, Stage, Commit, Checkout</a:t>
+            </a:r>
+            <a:endParaRPr lang="en-US" dirty="0"/>
+          </a:p>
+        </p:txBody>
+      </p:sp>
+      <p:pic>
+        <p:nvPicPr>
+          <p:cNvPr id="6" name="Picture 5"/>
+          <p:cNvPicPr>
+            <a:picLocks noChangeAspect="1"/>
+          </p:cNvPicPr>
+          <p:nvPr/>
+        </p:nvPicPr>
+        <p:blipFill>
+          <a:blip r:embed="rId2"/>
+          <a:stretch>
+            <a:fillRect/>
+          </a:stretch>
+        </p:blipFill>
+        <p:spPr>
+          <a:xfrm>
+            <a:off x="1665821" y="1687484"/>
+            <a:ext cx="1777913" cy="3994567"/>
+          </a:xfrm>
+          <a:prstGeom prst="rect">
+            <a:avLst/>
+          </a:prstGeom>
+        </p:spPr>
+      </p:pic>
+      <p:pic>
+        <p:nvPicPr>
+          <p:cNvPr id="7" name="Picture 6"/>
+          <p:cNvPicPr>
+            <a:picLocks noChangeAspect="1"/>
+          </p:cNvPicPr>
+          <p:nvPr/>
+        </p:nvPicPr>
+        <p:blipFill>
+          <a:blip r:embed="rId3"/>
+          <a:stretch>
+            <a:fillRect/>
+          </a:stretch>
+        </p:blipFill>
+        <p:spPr>
+          <a:xfrm>
+            <a:off x="5177948" y="1687484"/>
+            <a:ext cx="1777913" cy="3994567"/>
+          </a:xfrm>
+          <a:prstGeom prst="rect">
+            <a:avLst/>
+          </a:prstGeom>
+        </p:spPr>
+      </p:pic>
+      <p:pic>
+        <p:nvPicPr>
+          <p:cNvPr id="8" name="Picture 7"/>
+          <p:cNvPicPr>
+            <a:picLocks noChangeAspect="1"/>
+          </p:cNvPicPr>
+          <p:nvPr/>
+        </p:nvPicPr>
+        <p:blipFill>
+          <a:blip r:embed="rId4"/>
+          <a:stretch>
+            <a:fillRect/>
+          </a:stretch>
+        </p:blipFill>
+        <p:spPr>
+          <a:xfrm>
+            <a:off x="8690075" y="1687484"/>
+            <a:ext cx="1777913" cy="3994567"/>
+          </a:xfrm>
+          <a:prstGeom prst="rect">
+            <a:avLst/>
+          </a:prstGeom>
+        </p:spPr>
+      </p:pic>
+      <p:pic>
+        <p:nvPicPr>
+          <p:cNvPr id="9" name="Picture 8"/>
+          <p:cNvPicPr>
+            <a:picLocks noChangeAspect="1"/>
+          </p:cNvPicPr>
+          <p:nvPr/>
+        </p:nvPicPr>
+        <p:blipFill>
+          <a:blip r:embed="rId5"/>
+          <a:stretch>
+            <a:fillRect/>
+          </a:stretch>
+        </p:blipFill>
+        <p:spPr>
+          <a:xfrm>
+            <a:off x="2664010" y="3173384"/>
+            <a:ext cx="1211325" cy="839933"/>
+          </a:xfrm>
+          <a:prstGeom prst="rect">
+            <a:avLst/>
+          </a:prstGeom>
+        </p:spPr>
+      </p:pic>
+      <p:pic>
+        <p:nvPicPr>
+          <p:cNvPr id="10" name="Picture 9"/>
+          <p:cNvPicPr>
+            <a:picLocks noChangeAspect="1"/>
+          </p:cNvPicPr>
+          <p:nvPr/>
+        </p:nvPicPr>
+        <p:blipFill>
+          <a:blip r:embed="rId5"/>
+          <a:stretch>
+            <a:fillRect/>
+          </a:stretch>
+        </p:blipFill>
+        <p:spPr>
+          <a:xfrm>
+            <a:off x="6197138" y="3840305"/>
+            <a:ext cx="1211325" cy="839933"/>
+          </a:xfrm>
+          <a:prstGeom prst="rect">
+            <a:avLst/>
+          </a:prstGeom>
+        </p:spPr>
+      </p:pic>
+      <p:pic>
+        <p:nvPicPr>
+          <p:cNvPr id="11" name="Picture 10"/>
+          <p:cNvPicPr>
+            <a:picLocks noChangeAspect="1"/>
+          </p:cNvPicPr>
+          <p:nvPr/>
+        </p:nvPicPr>
+        <p:blipFill>
+          <a:blip r:embed="rId6"/>
+          <a:stretch>
+            <a:fillRect/>
+          </a:stretch>
+        </p:blipFill>
+        <p:spPr>
+          <a:xfrm>
+            <a:off x="4057781" y="4841989"/>
+            <a:ext cx="5490038" cy="839933"/>
+          </a:xfrm>
+          <a:prstGeom prst="rect">
+            <a:avLst/>
+          </a:prstGeom>
+        </p:spPr>
+      </p:pic>
+    </p:spTree>
+    <p:extLst>
+      <p:ext uri="{BB962C8B-B14F-4D97-AF65-F5344CB8AC3E}">
+        <p14:creationId xmlns:p14="http://schemas.microsoft.com/office/powerpoint/2010/main" val="881955558"/>
+      </p:ext>
+    </p:extLst>
+  </p:cSld>
+  <p:clrMapOvr>
+    <a:masterClrMapping/>
+  </p:clrMapOvr>
+  <p:timing>
+    <p:tnLst>
+      <p:par>
+        <p:cTn id="1" dur="indefinite" restart="never" nodeType="tmRoot">
+          <p:childTnLst>
+            <p:seq concurrent="1" nextAc="seek">
+              <p:cTn id="2" dur="indefinite" nodeType="mainSeq">
+                <p:childTnLst>
+                  <p:par>
+                    <p:cTn id="3" fill="hold">
+                      <p:stCondLst>
+                        <p:cond delay="indefinite"/>
+                      </p:stCondLst>
+                      <p:childTnLst>
+                        <p:par>
+                          <p:cTn id="4" fill="hold">
+                            <p:stCondLst>
+                              <p:cond delay="0"/>
+                            </p:stCondLst>
+                            <p:childTnLst>
+                              <p:par>
+                                <p:cTn id="5" presetID="10" presetClass="entr" presetSubtype="0" fill="hold" nodeType="clickEffect">
+                                  <p:stCondLst>
+                                    <p:cond delay="0"/>
+                                  </p:stCondLst>
+                                  <p:childTnLst>
+                                    <p:set>
+                                      <p:cBhvr>
+                                        <p:cTn id="6" dur="1" fill="hold">
+                                          <p:stCondLst>
+                                            <p:cond delay="0"/>
+                                          </p:stCondLst>
+                                        </p:cTn>
+                                        <p:tgtEl>
+                                          <p:spTgt spid="6"/>
+                                        </p:tgtEl>
+                                        <p:attrNameLst>
+                                          <p:attrName>style.visibility</p:attrName>
+                                        </p:attrNameLst>
+                                      </p:cBhvr>
+                                      <p:to>
+                                        <p:strVal val="visible"/>
+                                      </p:to>
+                                    </p:set>
+                                    <p:animEffect transition="in" filter="fade">
+                                      <p:cBhvr>
+                                        <p:cTn id="7" dur="500"/>
+                                        <p:tgtEl>
+                                          <p:spTgt spid="6"/>
+                                        </p:tgtEl>
+                                      </p:cBhvr>
+                                    </p:animEffect>
+                                  </p:childTnLst>
+                                </p:cTn>
+                              </p:par>
+                              <p:par>
+                                <p:cTn id="8" presetID="10" presetClass="entr" presetSubtype="0" fill="hold" nodeType="withEffect">
+                                  <p:stCondLst>
+                                    <p:cond delay="0"/>
+                                  </p:stCondLst>
+                                  <p:childTnLst>
+                                    <p:set>
+                                      <p:cBhvr>
+                                        <p:cTn id="9" dur="1" fill="hold">
+                                          <p:stCondLst>
+                                            <p:cond delay="0"/>
+                                          </p:stCondLst>
+                                        </p:cTn>
+                                        <p:tgtEl>
+                                          <p:spTgt spid="9"/>
+                                        </p:tgtEl>
+                                        <p:attrNameLst>
+                                          <p:attrName>style.visibility</p:attrName>
+                                        </p:attrNameLst>
+                                      </p:cBhvr>
+                                      <p:to>
+                                        <p:strVal val="visible"/>
+                                      </p:to>
+                                    </p:set>
+                                    <p:animEffect transition="in" filter="fade">
+                                      <p:cBhvr>
+                                        <p:cTn id="10" dur="500"/>
+                                        <p:tgtEl>
+                                          <p:spTgt spid="9"/>
+                                        </p:tgtEl>
+                                      </p:cBhvr>
+                                    </p:animEffect>
+                                  </p:childTnLst>
+                                </p:cTn>
+                              </p:par>
+                            </p:childTnLst>
+                          </p:cTn>
+                        </p:par>
+                      </p:childTnLst>
+                    </p:cTn>
+                  </p:par>
+                  <p:par>
+                    <p:cTn id="11" fill="hold">
+                      <p:stCondLst>
+                        <p:cond delay="indefinite"/>
+                      </p:stCondLst>
+                      <p:childTnLst>
+                        <p:par>
+                          <p:cTn id="12" fill="hold">
+                            <p:stCondLst>
+                              <p:cond delay="0"/>
+                            </p:stCondLst>
+                            <p:childTnLst>
+                              <p:par>
+                                <p:cTn id="13" presetID="10" presetClass="entr" presetSubtype="0" fill="hold" nodeType="clickEffect">
+                                  <p:stCondLst>
+                                    <p:cond delay="0"/>
+                                  </p:stCondLst>
+                                  <p:childTnLst>
+                                    <p:set>
+                                      <p:cBhvr>
+                                        <p:cTn id="14" dur="1" fill="hold">
+                                          <p:stCondLst>
+                                            <p:cond delay="0"/>
+                                          </p:stCondLst>
+                                        </p:cTn>
+                                        <p:tgtEl>
+                                          <p:spTgt spid="7"/>
+                                        </p:tgtEl>
+                                        <p:attrNameLst>
+                                          <p:attrName>style.visibility</p:attrName>
+                                        </p:attrNameLst>
+                                      </p:cBhvr>
+                                      <p:to>
+                                        <p:strVal val="visible"/>
+                                      </p:to>
+                                    </p:set>
+                                    <p:animEffect transition="in" filter="fade">
+                                      <p:cBhvr>
+                                        <p:cTn id="15" dur="500"/>
+                                        <p:tgtEl>
+                                          <p:spTgt spid="7"/>
+                                        </p:tgtEl>
+                                      </p:cBhvr>
+                                    </p:animEffect>
+                                  </p:childTnLst>
+                                </p:cTn>
+                              </p:par>
+                              <p:par>
+                                <p:cTn id="16" presetID="10" presetClass="entr" presetSubtype="0" fill="hold" nodeType="withEffect">
+                                  <p:stCondLst>
+                                    <p:cond delay="0"/>
+                                  </p:stCondLst>
+                                  <p:childTnLst>
+                                    <p:set>
+                                      <p:cBhvr>
+                                        <p:cTn id="17" dur="1" fill="hold">
+                                          <p:stCondLst>
+                                            <p:cond delay="0"/>
+                                          </p:stCondLst>
+                                        </p:cTn>
+                                        <p:tgtEl>
+                                          <p:spTgt spid="10"/>
+                                        </p:tgtEl>
+                                        <p:attrNameLst>
+                                          <p:attrName>style.visibility</p:attrName>
+                                        </p:attrNameLst>
+                                      </p:cBhvr>
+                                      <p:to>
+                                        <p:strVal val="visible"/>
+                                      </p:to>
+                                    </p:set>
+                                    <p:animEffect transition="in" filter="fade">
+                                      <p:cBhvr>
+                                        <p:cTn id="18" dur="500"/>
+                                        <p:tgtEl>
+                                          <p:spTgt spid="10"/>
+                                        </p:tgtEl>
+                                      </p:cBhvr>
+                                    </p:animEffect>
+                                  </p:childTnLst>
+                                </p:cTn>
+                              </p:par>
+                            </p:childTnLst>
+                          </p:cTn>
+                        </p:par>
+                      </p:childTnLst>
+                    </p:cTn>
+                  </p:par>
+                  <p:par>
+                    <p:cTn id="19" fill="hold">
+                      <p:stCondLst>
+                        <p:cond delay="indefinite"/>
+                      </p:stCondLst>
+                      <p:childTnLst>
+                        <p:par>
+                          <p:cTn id="20" fill="hold">
+                            <p:stCondLst>
+                              <p:cond delay="0"/>
+                            </p:stCondLst>
+                            <p:childTnLst>
+                              <p:par>
+                                <p:cTn id="21" presetID="10" presetClass="entr" presetSubtype="0" fill="hold" nodeType="clickEffect">
+                                  <p:stCondLst>
+                                    <p:cond delay="0"/>
+                                  </p:stCondLst>
+                                  <p:childTnLst>
+                                    <p:set>
+                                      <p:cBhvr>
+                                        <p:cTn id="22" dur="1" fill="hold">
+                                          <p:stCondLst>
+                                            <p:cond delay="0"/>
+                                          </p:stCondLst>
+                                        </p:cTn>
+                                        <p:tgtEl>
+                                          <p:spTgt spid="8"/>
+                                        </p:tgtEl>
+                                        <p:attrNameLst>
+                                          <p:attrName>style.visibility</p:attrName>
+                                        </p:attrNameLst>
+                                      </p:cBhvr>
+                                      <p:to>
+                                        <p:strVal val="visible"/>
+                                      </p:to>
+                                    </p:set>
+                                    <p:animEffect transition="in" filter="fade">
+                                      <p:cBhvr>
+                                        <p:cTn id="23" dur="500"/>
+                                        <p:tgtEl>
+                                          <p:spTgt spid="8"/>
+                                        </p:tgtEl>
+                                      </p:cBhvr>
+                                    </p:animEffect>
+                                  </p:childTnLst>
+                                </p:cTn>
+                              </p:par>
+                            </p:childTnLst>
+                          </p:cTn>
+                        </p:par>
+                      </p:childTnLst>
+                    </p:cTn>
+                  </p:par>
+                  <p:par>
+                    <p:cTn id="24" fill="hold">
+                      <p:stCondLst>
+                        <p:cond delay="indefinite"/>
+                      </p:stCondLst>
+                      <p:childTnLst>
+                        <p:par>
+                          <p:cTn id="25" fill="hold">
+                            <p:stCondLst>
+                              <p:cond delay="0"/>
+                            </p:stCondLst>
+                            <p:childTnLst>
+                              <p:par>
+                                <p:cTn id="26" presetID="10" presetClass="entr" presetSubtype="0" fill="hold" nodeType="clickEffect">
+                                  <p:stCondLst>
+                                    <p:cond delay="0"/>
+                                  </p:stCondLst>
+                                  <p:childTnLst>
+                                    <p:set>
+                                      <p:cBhvr>
+                                        <p:cTn id="27" dur="1" fill="hold">
+                                          <p:stCondLst>
+                                            <p:cond delay="0"/>
+                                          </p:stCondLst>
+                                        </p:cTn>
+                                        <p:tgtEl>
+                                          <p:spTgt spid="11"/>
+                                        </p:tgtEl>
+                                        <p:attrNameLst>
+                                          <p:attrName>style.visibility</p:attrName>
+                                        </p:attrNameLst>
+                                      </p:cBhvr>
+                                      <p:to>
+                                        <p:strVal val="visible"/>
+                                      </p:to>
+                                    </p:set>
+                                    <p:animEffect transition="in" filter="fade">
+                                      <p:cBhvr>
+                                        <p:cTn id="28" dur="500"/>
+                                        <p:tgtEl>
+                                          <p:spTgt spid="11"/>
+                                        </p:tgtEl>
+                                      </p:cBhvr>
+                                    </p:animEffect>
+                                  </p:childTnLst>
+                                </p:cTn>
+                              </p:par>
+                            </p:childTnLst>
+                          </p:cTn>
+                        </p:par>
+                      </p:childTnLst>
+                    </p:cTn>
+                  </p:par>
+                </p:childTnLst>
+              </p:cTn>
+              <p:prevCondLst>
+                <p:cond evt="onPrev" delay="0">
+                  <p:tgtEl>
+                    <p:sldTgt/>
+                  </p:tgtEl>
+                </p:cond>
+              </p:prevCondLst>
+              <p:nextCondLst>
+                <p:cond evt="onNext" delay="0">
+                  <p:tgtEl>
+                    <p:sldTgt/>
+                  </p:tgtEl>
+                </p:cond>
+              </p:nextCondLst>
+            </p:seq>
+          </p:childTnLst>
+        </p:cTn>
+      </p:par>
+    </p:tnLst>
+  </p:timing>
+</p:sld>
+</file>
+
+<file path=ppt/slides/slide8.xml><?xml version="1.0" encoding="utf-8"?>
+<p:sld xmlns:a="http://schemas.openxmlformats.org/drawingml/2006/main" xmlns:r="http://schemas.openxmlformats.org/officeDocument/2006/relationships" xmlns:p="http://schemas.openxmlformats.org/presentationml/2006/main">
+  <p:cSld>
+    <p:spTree>
+      <p:nvGrpSpPr>
+        <p:cNvPr id="1" name=""/>
+        <p:cNvGrpSpPr/>
+        <p:nvPr/>
+      </p:nvGrpSpPr>
+      <p:grpSpPr>
+        <a:xfrm>
+          <a:off x="0" y="0"/>
+          <a:ext cx="0" cy="0"/>
+          <a:chOff x="0" y="0"/>
+          <a:chExt cx="0" cy="0"/>
+        </a:xfrm>
+      </p:grpSpPr>
+      <p:sp>
+        <p:nvSpPr>
+          <p:cNvPr id="2" name="Title 1"/>
+          <p:cNvSpPr>
+            <a:spLocks noGrp="1"/>
+          </p:cNvSpPr>
+          <p:nvPr>
+            <p:ph type="title"/>
+          </p:nvPr>
+        </p:nvSpPr>
+        <p:spPr>
+          <a:xfrm>
+            <a:off x="1371600" y="685800"/>
+            <a:ext cx="9601200" cy="876993"/>
+          </a:xfrm>
+        </p:spPr>
+        <p:txBody>
+          <a:bodyPr/>
+          <a:lstStyle/>
+          <a:p>
+            <a:r>
+              <a:rPr lang="en-US" dirty="0" smtClean="0"/>
+              <a:t>“Hands on!”</a:t>
+            </a:r>
+            <a:endParaRPr lang="en-US" dirty="0"/>
+          </a:p>
+        </p:txBody>
+      </p:sp>
+      <p:sp>
+        <p:nvSpPr>
+          <p:cNvPr id="3" name="Content Placeholder 2"/>
+          <p:cNvSpPr>
+            <a:spLocks noGrp="1"/>
+          </p:cNvSpPr>
+          <p:nvPr>
+            <p:ph idx="1"/>
+          </p:nvPr>
+        </p:nvSpPr>
+        <p:spPr/>
+        <p:txBody>
+          <a:bodyPr/>
+          <a:lstStyle/>
+          <a:p>
+            <a:pPr marL="0" indent="0">
+              <a:buNone/>
+            </a:pPr>
+            <a:endParaRPr lang="en-US" dirty="0" smtClean="0"/>
+          </a:p>
+        </p:txBody>
+      </p:sp>
+    </p:spTree>
+    <p:extLst>
+      <p:ext uri="{BB962C8B-B14F-4D97-AF65-F5344CB8AC3E}">
+        <p14:creationId xmlns:p14="http://schemas.microsoft.com/office/powerpoint/2010/main" val="2732130130"/>
       </p:ext>
     </p:extLst>
   </p:cSld>

</xml_diff>

<commit_message>
Added diagram for branches
</commit_message>
<xml_diff>
--- a/GIT.pptx
+++ b/GIT.pptx
@@ -13,11 +13,12 @@
     <p:sldId id="257" r:id="rId7"/>
     <p:sldId id="267" r:id="rId8"/>
     <p:sldId id="268" r:id="rId9"/>
-    <p:sldId id="269" r:id="rId10"/>
-    <p:sldId id="265" r:id="rId11"/>
-    <p:sldId id="270" r:id="rId12"/>
-    <p:sldId id="263" r:id="rId13"/>
-    <p:sldId id="264" r:id="rId14"/>
+    <p:sldId id="271" r:id="rId10"/>
+    <p:sldId id="269" r:id="rId11"/>
+    <p:sldId id="265" r:id="rId12"/>
+    <p:sldId id="270" r:id="rId13"/>
+    <p:sldId id="263" r:id="rId14"/>
+    <p:sldId id="264" r:id="rId15"/>
   </p:sldIdLst>
   <p:sldSz cx="12192000" cy="6858000"/>
   <p:notesSz cx="6858000" cy="9144000"/>
@@ -3933,8 +3934,8 @@
           <a:lstStyle/>
           <a:p>
             <a:r>
-              <a:rPr lang="en-US" dirty="0" err="1" smtClean="0"/>
-              <a:t>Github</a:t>
+              <a:rPr lang="en-US" dirty="0" smtClean="0"/>
+              <a:t>REMOTE REPOSITORY , aka GITHUB?</a:t>
             </a:r>
             <a:endParaRPr lang="en-US" dirty="0"/>
           </a:p>
@@ -3955,33 +3956,14 @@
           <a:bodyPr/>
           <a:lstStyle/>
           <a:p>
-            <a:r>
-              <a:rPr lang="en-US" dirty="0" err="1" smtClean="0"/>
-              <a:t>Lage</a:t>
-            </a:r>
-            <a:r>
-              <a:rPr lang="en-US" dirty="0" smtClean="0"/>
-              <a:t> repository</a:t>
-            </a:r>
-          </a:p>
-          <a:p>
-            <a:r>
-              <a:rPr lang="en-US" dirty="0" smtClean="0"/>
-              <a:t>Fork</a:t>
-            </a:r>
-          </a:p>
-          <a:p>
-            <a:r>
-              <a:rPr lang="en-US" dirty="0" smtClean="0"/>
-              <a:t>Clone</a:t>
-            </a:r>
+            <a:endParaRPr lang="en-US" dirty="0"/>
           </a:p>
         </p:txBody>
       </p:sp>
     </p:spTree>
     <p:extLst>
       <p:ext uri="{BB962C8B-B14F-4D97-AF65-F5344CB8AC3E}">
-        <p14:creationId xmlns:p14="http://schemas.microsoft.com/office/powerpoint/2010/main" val="3350630885"/>
+        <p14:creationId xmlns:p14="http://schemas.microsoft.com/office/powerpoint/2010/main" val="2257065067"/>
       </p:ext>
     </p:extLst>
   </p:cSld>
@@ -4032,6 +4014,104 @@
           <a:p>
             <a:r>
               <a:rPr lang="en-US" dirty="0" err="1" smtClean="0"/>
+              <a:t>Github</a:t>
+            </a:r>
+            <a:endParaRPr lang="en-US" dirty="0"/>
+          </a:p>
+        </p:txBody>
+      </p:sp>
+      <p:sp>
+        <p:nvSpPr>
+          <p:cNvPr id="3" name="Content Placeholder 2"/>
+          <p:cNvSpPr>
+            <a:spLocks noGrp="1"/>
+          </p:cNvSpPr>
+          <p:nvPr>
+            <p:ph idx="1"/>
+          </p:nvPr>
+        </p:nvSpPr>
+        <p:spPr/>
+        <p:txBody>
+          <a:bodyPr/>
+          <a:lstStyle/>
+          <a:p>
+            <a:r>
+              <a:rPr lang="en-US" dirty="0" err="1" smtClean="0"/>
+              <a:t>Lage</a:t>
+            </a:r>
+            <a:r>
+              <a:rPr lang="en-US" dirty="0" smtClean="0"/>
+              <a:t> repository</a:t>
+            </a:r>
+          </a:p>
+          <a:p>
+            <a:r>
+              <a:rPr lang="en-US" dirty="0" smtClean="0"/>
+              <a:t>Fork</a:t>
+            </a:r>
+          </a:p>
+          <a:p>
+            <a:r>
+              <a:rPr lang="en-US" dirty="0" smtClean="0"/>
+              <a:t>Clone</a:t>
+            </a:r>
+          </a:p>
+        </p:txBody>
+      </p:sp>
+    </p:spTree>
+    <p:extLst>
+      <p:ext uri="{BB962C8B-B14F-4D97-AF65-F5344CB8AC3E}">
+        <p14:creationId xmlns:p14="http://schemas.microsoft.com/office/powerpoint/2010/main" val="3350630885"/>
+      </p:ext>
+    </p:extLst>
+  </p:cSld>
+  <p:clrMapOvr>
+    <a:masterClrMapping/>
+  </p:clrMapOvr>
+  <p:timing>
+    <p:tnLst>
+      <p:par>
+        <p:cTn id="1" dur="indefinite" restart="never" nodeType="tmRoot"/>
+      </p:par>
+    </p:tnLst>
+  </p:timing>
+</p:sld>
+</file>
+
+<file path=ppt/slides/slide12.xml><?xml version="1.0" encoding="utf-8"?>
+<p:sld xmlns:a="http://schemas.openxmlformats.org/drawingml/2006/main" xmlns:r="http://schemas.openxmlformats.org/officeDocument/2006/relationships" xmlns:p="http://schemas.openxmlformats.org/presentationml/2006/main">
+  <p:cSld>
+    <p:spTree>
+      <p:nvGrpSpPr>
+        <p:cNvPr id="1" name=""/>
+        <p:cNvGrpSpPr/>
+        <p:nvPr/>
+      </p:nvGrpSpPr>
+      <p:grpSpPr>
+        <a:xfrm>
+          <a:off x="0" y="0"/>
+          <a:ext cx="0" cy="0"/>
+          <a:chOff x="0" y="0"/>
+          <a:chExt cx="0" cy="0"/>
+        </a:xfrm>
+      </p:grpSpPr>
+      <p:sp>
+        <p:nvSpPr>
+          <p:cNvPr id="2" name="Title 1"/>
+          <p:cNvSpPr>
+            <a:spLocks noGrp="1"/>
+          </p:cNvSpPr>
+          <p:nvPr>
+            <p:ph type="title"/>
+          </p:nvPr>
+        </p:nvSpPr>
+        <p:spPr/>
+        <p:txBody>
+          <a:bodyPr/>
+          <a:lstStyle/>
+          <a:p>
+            <a:r>
+              <a:rPr lang="en-US" dirty="0" err="1" smtClean="0"/>
               <a:t>Git</a:t>
             </a:r>
             <a:r>
@@ -4120,7 +4200,7 @@
 </p:sld>
 </file>
 
-<file path=ppt/slides/slide12.xml><?xml version="1.0" encoding="utf-8"?>
+<file path=ppt/slides/slide13.xml><?xml version="1.0" encoding="utf-8"?>
 <p:sld xmlns:a="http://schemas.openxmlformats.org/drawingml/2006/main" xmlns:r="http://schemas.openxmlformats.org/officeDocument/2006/relationships" xmlns:p="http://schemas.openxmlformats.org/presentationml/2006/main">
   <p:cSld>
     <p:spTree>
@@ -4634,7 +4714,7 @@
 </p:sld>
 </file>
 
-<file path=ppt/slides/slide13.xml><?xml version="1.0" encoding="utf-8"?>
+<file path=ppt/slides/slide14.xml><?xml version="1.0" encoding="utf-8"?>
 <p:sld xmlns:a="http://schemas.openxmlformats.org/drawingml/2006/main" xmlns:r="http://schemas.openxmlformats.org/officeDocument/2006/relationships" xmlns:p="http://schemas.openxmlformats.org/presentationml/2006/main">
   <p:cSld>
     <p:spTree>
@@ -6101,13 +6181,13 @@
         </p:nvSpPr>
         <p:spPr>
           <a:xfrm>
-            <a:off x="1371600" y="2286000"/>
-            <a:ext cx="9601200" cy="3594100"/>
+            <a:off x="1266969" y="1625600"/>
+            <a:ext cx="9810461" cy="4215101"/>
           </a:xfrm>
         </p:spPr>
         <p:txBody>
           <a:bodyPr>
-            <a:normAutofit fontScale="70000" lnSpcReduction="20000"/>
+            <a:normAutofit fontScale="62500" lnSpcReduction="20000"/>
           </a:bodyPr>
           <a:lstStyle/>
           <a:p>
@@ -6127,6 +6207,13 @@
               <a:rPr lang="en-US" dirty="0" smtClean="0"/>
               <a:t>Local Version Control Systems</a:t>
             </a:r>
+          </a:p>
+          <a:p>
+            <a:pPr lvl="2"/>
+            <a:r>
+              <a:rPr lang="en-US" dirty="0" smtClean="0"/>
+              <a:t>File lock</a:t>
+            </a:r>
             <a:endParaRPr lang="en-US" dirty="0" smtClean="0"/>
           </a:p>
           <a:p>
@@ -6173,28 +6260,25 @@
           <a:p>
             <a:pPr lvl="1"/>
             <a:r>
+              <a:rPr lang="en-US" dirty="0" smtClean="0"/>
+              <a:t>Linus </a:t>
+            </a:r>
+            <a:r>
+              <a:rPr lang="en-US" dirty="0" err="1" smtClean="0"/>
+              <a:t>Torvald</a:t>
+            </a:r>
+            <a:r>
+              <a:rPr lang="en-US" dirty="0" smtClean="0"/>
+              <a:t>	</a:t>
+            </a:r>
+            <a:endParaRPr lang="en-US" dirty="0" smtClean="0"/>
+          </a:p>
+          <a:p>
+            <a:pPr lvl="1"/>
+            <a:r>
               <a:rPr lang="en-US" dirty="0" err="1" smtClean="0"/>
               <a:t>Bla</a:t>
             </a:r>
-            <a:r>
-              <a:rPr lang="en-US" dirty="0" smtClean="0"/>
-              <a:t>	</a:t>
-            </a:r>
-          </a:p>
-          <a:p>
-            <a:pPr lvl="1"/>
-            <a:r>
-              <a:rPr lang="en-US" dirty="0" err="1" smtClean="0"/>
-              <a:t>Bla</a:t>
-            </a:r>
-            <a:endParaRPr lang="en-US" dirty="0" smtClean="0"/>
-          </a:p>
-          <a:p>
-            <a:pPr lvl="1"/>
-            <a:r>
-              <a:rPr lang="en-US" dirty="0" err="1" smtClean="0"/>
-              <a:t>Bla</a:t>
-            </a:r>
             <a:endParaRPr lang="en-US" dirty="0" smtClean="0"/>
           </a:p>
           <a:p>
@@ -6223,7 +6307,6 @@
               <a:rPr lang="en-US" dirty="0" smtClean="0"/>
               <a:t>?</a:t>
             </a:r>
-            <a:endParaRPr lang="en-US" dirty="0" smtClean="0"/>
           </a:p>
           <a:p>
             <a:r>
@@ -6305,6 +6388,88 @@
               <a:rPr lang="en-US" b="1" i="0" dirty="0"/>
               <a:t>12,000 </a:t>
             </a:r>
+            <a:endParaRPr lang="en-US" b="1" i="0" dirty="0" smtClean="0"/>
+          </a:p>
+          <a:p>
+            <a:r>
+              <a:rPr lang="en-US" i="0" dirty="0" smtClean="0"/>
+              <a:t>Cons</a:t>
+            </a:r>
+          </a:p>
+          <a:p>
+            <a:pPr lvl="1"/>
+            <a:r>
+              <a:rPr lang="en-US" i="0" dirty="0" err="1" smtClean="0"/>
+              <a:t>Kjenner</a:t>
+            </a:r>
+            <a:r>
+              <a:rPr lang="en-US" i="0" dirty="0" smtClean="0"/>
+              <a:t> </a:t>
+            </a:r>
+            <a:r>
+              <a:rPr lang="en-US" i="0" dirty="0" err="1" smtClean="0"/>
+              <a:t>ikke</a:t>
+            </a:r>
+            <a:r>
+              <a:rPr lang="en-US" i="0" dirty="0" smtClean="0"/>
+              <a:t> </a:t>
+            </a:r>
+            <a:r>
+              <a:rPr lang="en-US" i="0" dirty="0" err="1" smtClean="0"/>
+              <a:t>til</a:t>
+            </a:r>
+            <a:r>
+              <a:rPr lang="en-US" i="0" dirty="0" smtClean="0"/>
+              <a:t> </a:t>
+            </a:r>
+            <a:r>
+              <a:rPr lang="en-US" i="0" dirty="0" err="1" smtClean="0"/>
+              <a:t>enkelte</a:t>
+            </a:r>
+            <a:r>
+              <a:rPr lang="en-US" i="0" dirty="0" smtClean="0"/>
+              <a:t> filer</a:t>
+            </a:r>
+          </a:p>
+          <a:p>
+            <a:pPr lvl="1"/>
+            <a:r>
+              <a:rPr lang="en-US" i="0" dirty="0" err="1" smtClean="0"/>
+              <a:t>Må</a:t>
+            </a:r>
+            <a:r>
+              <a:rPr lang="en-US" i="0" dirty="0" smtClean="0"/>
+              <a:t> </a:t>
+            </a:r>
+            <a:r>
+              <a:rPr lang="en-US" i="0" dirty="0" err="1" smtClean="0"/>
+              <a:t>laste</a:t>
+            </a:r>
+            <a:r>
+              <a:rPr lang="en-US" i="0" dirty="0" smtClean="0"/>
+              <a:t> </a:t>
+            </a:r>
+            <a:r>
+              <a:rPr lang="en-US" i="0" dirty="0" err="1" smtClean="0"/>
+              <a:t>ned</a:t>
+            </a:r>
+            <a:r>
+              <a:rPr lang="en-US" i="0" dirty="0" smtClean="0"/>
+              <a:t> hele</a:t>
+            </a:r>
+          </a:p>
+          <a:p>
+            <a:pPr lvl="1"/>
+            <a:r>
+              <a:rPr lang="en-US" i="0" dirty="0" err="1" smtClean="0"/>
+              <a:t>Unaturlig</a:t>
+            </a:r>
+            <a:endParaRPr lang="en-US" i="0" dirty="0" smtClean="0"/>
+          </a:p>
+          <a:p>
+            <a:pPr marL="530352" lvl="1" indent="0">
+              <a:buNone/>
+            </a:pPr>
             <a:endParaRPr lang="en-US" dirty="0"/>
           </a:p>
           <a:p>
@@ -6315,6 +6480,88 @@
           </a:p>
         </p:txBody>
       </p:sp>
+      <p:pic>
+        <p:nvPicPr>
+          <p:cNvPr id="2050" name="Picture 2" descr="https://upload.wikimedia.org/wikipedia/commons/thumb/3/3f/Git_icon.svg/2000px-Git_icon.svg.png"/>
+          <p:cNvPicPr>
+            <a:picLocks noChangeAspect="1" noChangeArrowheads="1"/>
+          </p:cNvPicPr>
+          <p:nvPr/>
+        </p:nvPicPr>
+        <p:blipFill>
+          <a:blip r:embed="rId2">
+            <a:extLst>
+              <a:ext uri="{28A0092B-C50C-407E-A947-70E740481C1C}">
+                <a14:useLocalDpi xmlns:a14="http://schemas.microsoft.com/office/drawing/2010/main" val="0"/>
+              </a:ext>
+            </a:extLst>
+          </a:blip>
+          <a:srcRect/>
+          <a:stretch>
+            <a:fillRect/>
+          </a:stretch>
+        </p:blipFill>
+        <p:spPr bwMode="auto">
+          <a:xfrm>
+            <a:off x="9333348" y="1911928"/>
+            <a:ext cx="2285997" cy="2285997"/>
+          </a:xfrm>
+          <a:prstGeom prst="rect">
+            <a:avLst/>
+          </a:prstGeom>
+          <a:noFill/>
+          <a:extLst>
+            <a:ext uri="{909E8E84-426E-40DD-AFC4-6F175D3DCCD1}">
+              <a14:hiddenFill xmlns:a14="http://schemas.microsoft.com/office/drawing/2010/main">
+                <a:solidFill>
+                  <a:srgbClr val="FFFFFF"/>
+                </a:solidFill>
+              </a14:hiddenFill>
+            </a:ext>
+          </a:extLst>
+        </p:spPr>
+      </p:pic>
+      <p:pic>
+        <p:nvPicPr>
+          <p:cNvPr id="2052" name="Picture 4" descr="http://icons.iconarchive.com/icons/kearone/comicons/128/linux-icon.png"/>
+          <p:cNvPicPr>
+            <a:picLocks noChangeAspect="1" noChangeArrowheads="1"/>
+          </p:cNvPicPr>
+          <p:nvPr/>
+        </p:nvPicPr>
+        <p:blipFill>
+          <a:blip r:embed="rId3">
+            <a:extLst>
+              <a:ext uri="{28A0092B-C50C-407E-A947-70E740481C1C}">
+                <a14:useLocalDpi xmlns:a14="http://schemas.microsoft.com/office/drawing/2010/main" val="0"/>
+              </a:ext>
+            </a:extLst>
+          </a:blip>
+          <a:srcRect/>
+          <a:stretch>
+            <a:fillRect/>
+          </a:stretch>
+        </p:blipFill>
+        <p:spPr bwMode="auto">
+          <a:xfrm>
+            <a:off x="7755373" y="2445325"/>
+            <a:ext cx="1219200" cy="1219201"/>
+          </a:xfrm>
+          <a:prstGeom prst="rect">
+            <a:avLst/>
+          </a:prstGeom>
+          <a:noFill/>
+          <a:extLst>
+            <a:ext uri="{909E8E84-426E-40DD-AFC4-6F175D3DCCD1}">
+              <a14:hiddenFill xmlns:a14="http://schemas.microsoft.com/office/drawing/2010/main">
+                <a:solidFill>
+                  <a:srgbClr val="FFFFFF"/>
+                </a:solidFill>
+              </a14:hiddenFill>
+            </a:ext>
+          </a:extLst>
+        </p:spPr>
+      </p:pic>
     </p:spTree>
     <p:extLst>
       <p:ext uri="{BB962C8B-B14F-4D97-AF65-F5344CB8AC3E}">
@@ -8682,52 +8929,34 @@
           <a:chExt cx="0" cy="0"/>
         </a:xfrm>
       </p:grpSpPr>
-      <p:sp>
-        <p:nvSpPr>
-          <p:cNvPr id="2" name="Title 1"/>
-          <p:cNvSpPr>
-            <a:spLocks noGrp="1"/>
-          </p:cNvSpPr>
-          <p:nvPr>
-            <p:ph type="title"/>
-          </p:nvPr>
-        </p:nvSpPr>
-        <p:spPr/>
-        <p:txBody>
-          <a:bodyPr/>
-          <a:lstStyle/>
-          <a:p>
-            <a:r>
-              <a:rPr lang="en-US" dirty="0" smtClean="0"/>
-              <a:t>REMOTE REPOSITORY , aka GITHUB?</a:t>
-            </a:r>
-            <a:endParaRPr lang="en-US" dirty="0"/>
-          </a:p>
-        </p:txBody>
-      </p:sp>
-      <p:sp>
-        <p:nvSpPr>
-          <p:cNvPr id="3" name="Content Placeholder 2"/>
-          <p:cNvSpPr>
-            <a:spLocks noGrp="1"/>
-          </p:cNvSpPr>
-          <p:nvPr>
-            <p:ph idx="1"/>
-          </p:nvPr>
-        </p:nvSpPr>
-        <p:spPr/>
-        <p:txBody>
-          <a:bodyPr/>
-          <a:lstStyle/>
-          <a:p>
-            <a:endParaRPr lang="en-US" dirty="0"/>
-          </a:p>
-        </p:txBody>
-      </p:sp>
+      <p:pic>
+        <p:nvPicPr>
+          <p:cNvPr id="5" name="Picture 4"/>
+          <p:cNvPicPr>
+            <a:picLocks noChangeAspect="1"/>
+          </p:cNvPicPr>
+          <p:nvPr/>
+        </p:nvPicPr>
+        <p:blipFill>
+          <a:blip r:embed="rId2"/>
+          <a:stretch>
+            <a:fillRect/>
+          </a:stretch>
+        </p:blipFill>
+        <p:spPr>
+          <a:xfrm>
+            <a:off x="3341119" y="282542"/>
+            <a:ext cx="5343507" cy="6348334"/>
+          </a:xfrm>
+          <a:prstGeom prst="rect">
+            <a:avLst/>
+          </a:prstGeom>
+        </p:spPr>
+      </p:pic>
     </p:spTree>
     <p:extLst>
       <p:ext uri="{BB962C8B-B14F-4D97-AF65-F5344CB8AC3E}">
-        <p14:creationId xmlns:p14="http://schemas.microsoft.com/office/powerpoint/2010/main" val="2257065067"/>
+        <p14:creationId xmlns:p14="http://schemas.microsoft.com/office/powerpoint/2010/main" val="2166476444"/>
       </p:ext>
     </p:extLst>
   </p:cSld>

</xml_diff>

<commit_message>
Added some slides about GIT basics
</commit_message>
<xml_diff>
--- a/GIT.pptx
+++ b/GIT.pptx
@@ -11,14 +11,16 @@
     <p:sldId id="261" r:id="rId5"/>
     <p:sldId id="259" r:id="rId6"/>
     <p:sldId id="257" r:id="rId7"/>
-    <p:sldId id="267" r:id="rId8"/>
-    <p:sldId id="268" r:id="rId9"/>
-    <p:sldId id="271" r:id="rId10"/>
-    <p:sldId id="269" r:id="rId11"/>
-    <p:sldId id="265" r:id="rId12"/>
-    <p:sldId id="270" r:id="rId13"/>
-    <p:sldId id="263" r:id="rId14"/>
-    <p:sldId id="264" r:id="rId15"/>
+    <p:sldId id="272" r:id="rId8"/>
+    <p:sldId id="273" r:id="rId9"/>
+    <p:sldId id="263" r:id="rId10"/>
+    <p:sldId id="267" r:id="rId11"/>
+    <p:sldId id="268" r:id="rId12"/>
+    <p:sldId id="271" r:id="rId13"/>
+    <p:sldId id="269" r:id="rId14"/>
+    <p:sldId id="265" r:id="rId15"/>
+    <p:sldId id="270" r:id="rId16"/>
+    <p:sldId id="264" r:id="rId17"/>
   </p:sldIdLst>
   <p:sldSz cx="12192000" cy="6858000"/>
   <p:notesSz cx="6858000" cy="9144000"/>
@@ -325,7 +327,7 @@
             <a:fld id="{87DE6118-2437-4B30-8E3C-4D2BE6020583}" type="datetimeFigureOut">
               <a:rPr lang="en-US" dirty="0"/>
               <a:pPr/>
-              <a:t>6/18/2016</a:t>
+              <a:t>6/19/2016</a:t>
             </a:fld>
             <a:endParaRPr lang="en-US" dirty="0"/>
           </a:p>
@@ -651,7 +653,7 @@
           <a:p>
             <a:fld id="{87DE6118-2437-4B30-8E3C-4D2BE6020583}" type="datetimeFigureOut">
               <a:rPr lang="en-US" dirty="0"/>
-              <a:t>6/18/2016</a:t>
+              <a:t>6/19/2016</a:t>
             </a:fld>
             <a:endParaRPr lang="en-US" dirty="0"/>
           </a:p>
@@ -826,7 +828,7 @@
           <a:p>
             <a:fld id="{87DE6118-2437-4B30-8E3C-4D2BE6020583}" type="datetimeFigureOut">
               <a:rPr lang="en-US" dirty="0"/>
-              <a:t>6/18/2016</a:t>
+              <a:t>6/19/2016</a:t>
             </a:fld>
             <a:endParaRPr lang="en-US" dirty="0"/>
           </a:p>
@@ -991,7 +993,7 @@
           <a:p>
             <a:fld id="{87DE6118-2437-4B30-8E3C-4D2BE6020583}" type="datetimeFigureOut">
               <a:rPr lang="en-US" dirty="0"/>
-              <a:t>6/18/2016</a:t>
+              <a:t>6/19/2016</a:t>
             </a:fld>
             <a:endParaRPr lang="en-US" dirty="0"/>
           </a:p>
@@ -1264,7 +1266,7 @@
             <a:fld id="{87DE6118-2437-4B30-8E3C-4D2BE6020583}" type="datetimeFigureOut">
               <a:rPr lang="en-US" dirty="0"/>
               <a:pPr/>
-              <a:t>6/18/2016</a:t>
+              <a:t>6/19/2016</a:t>
             </a:fld>
             <a:endParaRPr lang="en-US" dirty="0"/>
           </a:p>
@@ -1654,7 +1656,7 @@
           <a:p>
             <a:fld id="{87DE6118-2437-4B30-8E3C-4D2BE6020583}" type="datetimeFigureOut">
               <a:rPr lang="en-US" dirty="0"/>
-              <a:t>6/18/2016</a:t>
+              <a:t>6/19/2016</a:t>
             </a:fld>
             <a:endParaRPr lang="en-US" dirty="0"/>
           </a:p>
@@ -2126,7 +2128,7 @@
           <a:p>
             <a:fld id="{87DE6118-2437-4B30-8E3C-4D2BE6020583}" type="datetimeFigureOut">
               <a:rPr lang="en-US" dirty="0"/>
-              <a:t>6/18/2016</a:t>
+              <a:t>6/19/2016</a:t>
             </a:fld>
             <a:endParaRPr lang="en-US" dirty="0"/>
           </a:p>
@@ -2239,7 +2241,7 @@
           <a:p>
             <a:fld id="{87DE6118-2437-4B30-8E3C-4D2BE6020583}" type="datetimeFigureOut">
               <a:rPr lang="en-US" dirty="0"/>
-              <a:t>6/18/2016</a:t>
+              <a:t>6/19/2016</a:t>
             </a:fld>
             <a:endParaRPr lang="en-US" dirty="0"/>
           </a:p>
@@ -2329,7 +2331,7 @@
           <a:p>
             <a:fld id="{87DE6118-2437-4B30-8E3C-4D2BE6020583}" type="datetimeFigureOut">
               <a:rPr lang="en-US" dirty="0"/>
-              <a:t>6/18/2016</a:t>
+              <a:t>6/19/2016</a:t>
             </a:fld>
             <a:endParaRPr lang="en-US" dirty="0"/>
           </a:p>
@@ -2671,7 +2673,7 @@
             <a:fld id="{87DE6118-2437-4B30-8E3C-4D2BE6020583}" type="datetimeFigureOut">
               <a:rPr lang="en-US" dirty="0"/>
               <a:pPr/>
-              <a:t>6/18/2016</a:t>
+              <a:t>6/19/2016</a:t>
             </a:fld>
             <a:endParaRPr lang="en-US" dirty="0"/>
           </a:p>
@@ -3056,7 +3058,7 @@
             <a:fld id="{87DE6118-2437-4B30-8E3C-4D2BE6020583}" type="datetimeFigureOut">
               <a:rPr lang="en-US" dirty="0"/>
               <a:pPr/>
-              <a:t>6/18/2016</a:t>
+              <a:t>6/19/2016</a:t>
             </a:fld>
             <a:endParaRPr lang="en-US" dirty="0"/>
           </a:p>
@@ -3331,7 +3333,7 @@
             <a:fld id="{87DE6118-2437-4B30-8E3C-4D2BE6020583}" type="datetimeFigureOut">
               <a:rPr lang="en-US" dirty="0"/>
               <a:pPr/>
-              <a:t>6/18/2016</a:t>
+              <a:t>6/19/2016</a:t>
             </a:fld>
             <a:endParaRPr lang="en-US" dirty="0"/>
           </a:p>
@@ -3935,7 +3937,15 @@
           <a:p>
             <a:r>
               <a:rPr lang="en-US" dirty="0" smtClean="0"/>
-              <a:t>REMOTE REPOSITORY , aka GITHUB?</a:t>
+              <a:t>Basic </a:t>
+            </a:r>
+            <a:r>
+              <a:rPr lang="en-US" dirty="0" err="1" smtClean="0"/>
+              <a:t>Git</a:t>
+            </a:r>
+            <a:r>
+              <a:rPr lang="en-US" dirty="0" smtClean="0"/>
+              <a:t> -&gt; Lab it up!</a:t>
             </a:r>
             <a:endParaRPr lang="en-US" dirty="0"/>
           </a:p>
@@ -3956,14 +3966,186 @@
           <a:bodyPr/>
           <a:lstStyle/>
           <a:p>
-            <a:endParaRPr lang="en-US" dirty="0"/>
+            <a:r>
+              <a:rPr lang="en-US" dirty="0" smtClean="0"/>
+              <a:t>Lag </a:t>
+            </a:r>
+            <a:r>
+              <a:rPr lang="en-US" dirty="0" err="1" smtClean="0"/>
+              <a:t>en</a:t>
+            </a:r>
+            <a:r>
+              <a:rPr lang="en-US" dirty="0" smtClean="0"/>
+              <a:t> </a:t>
+            </a:r>
+            <a:r>
+              <a:rPr lang="en-US" dirty="0" err="1" smtClean="0"/>
+              <a:t>mappe</a:t>
+            </a:r>
+            <a:endParaRPr lang="en-US" dirty="0" smtClean="0"/>
+          </a:p>
+          <a:p>
+            <a:r>
+              <a:rPr lang="en-US" dirty="0" err="1" smtClean="0"/>
+              <a:t>Initsialiser</a:t>
+            </a:r>
+            <a:r>
+              <a:rPr lang="en-US" dirty="0" smtClean="0"/>
+              <a:t> </a:t>
+            </a:r>
+            <a:r>
+              <a:rPr lang="en-US" dirty="0" err="1" smtClean="0"/>
+              <a:t>mappen</a:t>
+            </a:r>
+            <a:r>
+              <a:rPr lang="en-US" dirty="0" smtClean="0"/>
+              <a:t> med </a:t>
+            </a:r>
+            <a:r>
+              <a:rPr lang="en-US" dirty="0" err="1" smtClean="0"/>
+              <a:t>git</a:t>
+            </a:r>
+            <a:r>
+              <a:rPr lang="en-US" dirty="0" smtClean="0"/>
+              <a:t>! </a:t>
+            </a:r>
+            <a:r>
+              <a:rPr lang="en-US" dirty="0" smtClean="0">
+                <a:sym typeface="Wingdings" panose="05000000000000000000" pitchFamily="2" charset="2"/>
+              </a:rPr>
+              <a:t></a:t>
+            </a:r>
+            <a:r>
+              <a:rPr lang="en-US" dirty="0" smtClean="0"/>
+              <a:t> Status?</a:t>
+            </a:r>
+          </a:p>
+          <a:p>
+            <a:r>
+              <a:rPr lang="en-US" dirty="0" smtClean="0"/>
+              <a:t>Lag </a:t>
+            </a:r>
+            <a:r>
+              <a:rPr lang="en-US" dirty="0" err="1" smtClean="0"/>
+              <a:t>en</a:t>
+            </a:r>
+            <a:r>
+              <a:rPr lang="en-US" dirty="0" smtClean="0"/>
+              <a:t> fil, </a:t>
+            </a:r>
+            <a:r>
+              <a:rPr lang="en-US" dirty="0" err="1" smtClean="0"/>
+              <a:t>skriv</a:t>
+            </a:r>
+            <a:r>
+              <a:rPr lang="en-US" dirty="0" smtClean="0"/>
+              <a:t> </a:t>
+            </a:r>
+            <a:r>
+              <a:rPr lang="en-US" dirty="0" err="1" smtClean="0"/>
+              <a:t>noe</a:t>
+            </a:r>
+            <a:r>
+              <a:rPr lang="en-US" dirty="0" smtClean="0"/>
+              <a:t> I den. </a:t>
+            </a:r>
+            <a:r>
+              <a:rPr lang="en-US" dirty="0" smtClean="0">
+                <a:sym typeface="Wingdings" panose="05000000000000000000" pitchFamily="2" charset="2"/>
+              </a:rPr>
+              <a:t></a:t>
+            </a:r>
+            <a:r>
+              <a:rPr lang="en-US" dirty="0" smtClean="0"/>
+              <a:t> Status?</a:t>
+            </a:r>
+          </a:p>
+          <a:p>
+            <a:r>
+              <a:rPr lang="en-US" dirty="0" smtClean="0"/>
+              <a:t>Vi </a:t>
+            </a:r>
+            <a:r>
+              <a:rPr lang="en-US" dirty="0" err="1" smtClean="0"/>
+              <a:t>vil</a:t>
+            </a:r>
+            <a:r>
+              <a:rPr lang="en-US" dirty="0" smtClean="0"/>
+              <a:t> ha med </a:t>
+            </a:r>
+            <a:r>
+              <a:rPr lang="en-US" dirty="0" err="1" smtClean="0"/>
+              <a:t>filen</a:t>
+            </a:r>
+            <a:r>
+              <a:rPr lang="en-US" dirty="0" smtClean="0"/>
+              <a:t> </a:t>
+            </a:r>
+            <a:r>
+              <a:rPr lang="en-US" dirty="0" err="1" smtClean="0"/>
+              <a:t>i</a:t>
+            </a:r>
+            <a:r>
+              <a:rPr lang="en-US" dirty="0" smtClean="0"/>
+              <a:t> </a:t>
+            </a:r>
+            <a:r>
+              <a:rPr lang="en-US" dirty="0" err="1" smtClean="0"/>
+              <a:t>neste</a:t>
+            </a:r>
+            <a:r>
+              <a:rPr lang="en-US" dirty="0" smtClean="0"/>
+              <a:t> commit, </a:t>
+            </a:r>
+            <a:r>
+              <a:rPr lang="en-US" dirty="0" err="1" smtClean="0"/>
+              <a:t>hva</a:t>
+            </a:r>
+            <a:r>
+              <a:rPr lang="en-US" dirty="0" smtClean="0"/>
+              <a:t> </a:t>
+            </a:r>
+            <a:r>
+              <a:rPr lang="en-US" dirty="0" err="1" smtClean="0"/>
+              <a:t>må</a:t>
+            </a:r>
+            <a:r>
+              <a:rPr lang="en-US" dirty="0" smtClean="0"/>
+              <a:t> vi </a:t>
+            </a:r>
+            <a:r>
+              <a:rPr lang="en-US" dirty="0" err="1" smtClean="0"/>
+              <a:t>gjøre</a:t>
+            </a:r>
+            <a:r>
+              <a:rPr lang="en-US" dirty="0" smtClean="0"/>
+              <a:t>? </a:t>
+            </a:r>
+            <a:r>
+              <a:rPr lang="en-US" dirty="0" smtClean="0">
+                <a:sym typeface="Wingdings" panose="05000000000000000000" pitchFamily="2" charset="2"/>
+              </a:rPr>
+              <a:t> Status?</a:t>
+            </a:r>
+          </a:p>
+          <a:p>
+            <a:r>
+              <a:rPr lang="en-US" dirty="0" smtClean="0">
+                <a:sym typeface="Wingdings" panose="05000000000000000000" pitchFamily="2" charset="2"/>
+              </a:rPr>
+              <a:t>Commit that shit.  Log?</a:t>
+            </a:r>
+            <a:endParaRPr lang="en-US" dirty="0" smtClean="0"/>
+          </a:p>
+          <a:p>
+            <a:endParaRPr lang="en-US" dirty="0" smtClean="0"/>
           </a:p>
         </p:txBody>
       </p:sp>
     </p:spTree>
     <p:extLst>
       <p:ext uri="{BB962C8B-B14F-4D97-AF65-F5344CB8AC3E}">
-        <p14:creationId xmlns:p14="http://schemas.microsoft.com/office/powerpoint/2010/main" val="2257065067"/>
+        <p14:creationId xmlns:p14="http://schemas.microsoft.com/office/powerpoint/2010/main" val="4049588484"/>
       </p:ext>
     </p:extLst>
   </p:cSld>
@@ -4014,7 +4196,7 @@
           <a:p>
             <a:r>
               <a:rPr lang="en-US" dirty="0" err="1" smtClean="0"/>
-              <a:t>Github</a:t>
+              <a:t>Brænsj</a:t>
             </a:r>
             <a:endParaRPr lang="en-US" dirty="0"/>
           </a:p>
@@ -4037,31 +4219,118 @@
           <a:p>
             <a:r>
               <a:rPr lang="en-US" dirty="0" err="1" smtClean="0"/>
-              <a:t>Lage</a:t>
+              <a:t>Hva</a:t>
             </a:r>
             <a:r>
               <a:rPr lang="en-US" dirty="0" smtClean="0"/>
-              <a:t> repository</a:t>
-            </a:r>
-          </a:p>
-          <a:p>
+              <a:t> </a:t>
+            </a:r>
+            <a:r>
+              <a:rPr lang="en-US" dirty="0" err="1" smtClean="0"/>
+              <a:t>er</a:t>
+            </a:r>
             <a:r>
               <a:rPr lang="en-US" dirty="0" smtClean="0"/>
-              <a:t>Fork</a:t>
-            </a:r>
-          </a:p>
-          <a:p>
+              <a:t> </a:t>
+            </a:r>
+            <a:r>
+              <a:rPr lang="en-US" dirty="0" err="1" smtClean="0"/>
+              <a:t>en</a:t>
+            </a:r>
             <a:r>
               <a:rPr lang="en-US" dirty="0" smtClean="0"/>
-              <a:t>Clone</a:t>
-            </a:r>
+              <a:t> branch?</a:t>
+            </a:r>
+          </a:p>
+          <a:p>
+            <a:r>
+              <a:rPr lang="en-US" dirty="0" err="1" smtClean="0"/>
+              <a:t>Hvordan</a:t>
+            </a:r>
+            <a:r>
+              <a:rPr lang="en-US" dirty="0" smtClean="0"/>
+              <a:t> </a:t>
+            </a:r>
+            <a:r>
+              <a:rPr lang="en-US" dirty="0" err="1" smtClean="0"/>
+              <a:t>bruker</a:t>
+            </a:r>
+            <a:r>
+              <a:rPr lang="en-US" dirty="0" smtClean="0"/>
+              <a:t> vi </a:t>
+            </a:r>
+            <a:r>
+              <a:rPr lang="en-US" dirty="0" err="1" smtClean="0"/>
+              <a:t>en</a:t>
+            </a:r>
+            <a:r>
+              <a:rPr lang="en-US" dirty="0" smtClean="0"/>
+              <a:t> branch? </a:t>
+            </a:r>
+            <a:r>
+              <a:rPr lang="en-US" dirty="0" smtClean="0">
+                <a:sym typeface="Wingdings" panose="05000000000000000000" pitchFamily="2" charset="2"/>
+              </a:rPr>
+              <a:t> </a:t>
+            </a:r>
+            <a:r>
+              <a:rPr lang="en-US" dirty="0" err="1" smtClean="0">
+                <a:sym typeface="Wingdings" panose="05000000000000000000" pitchFamily="2" charset="2"/>
+              </a:rPr>
+              <a:t>Kommandoer</a:t>
+            </a:r>
+            <a:r>
+              <a:rPr lang="en-US" dirty="0" smtClean="0">
+                <a:sym typeface="Wingdings" panose="05000000000000000000" pitchFamily="2" charset="2"/>
+              </a:rPr>
+              <a:t>?</a:t>
+            </a:r>
+          </a:p>
+          <a:p>
+            <a:r>
+              <a:rPr lang="en-US" dirty="0" err="1" smtClean="0">
+                <a:sym typeface="Wingdings" panose="05000000000000000000" pitchFamily="2" charset="2"/>
+              </a:rPr>
+              <a:t>Slå</a:t>
+            </a:r>
+            <a:r>
+              <a:rPr lang="en-US" dirty="0" smtClean="0">
+                <a:sym typeface="Wingdings" panose="05000000000000000000" pitchFamily="2" charset="2"/>
+              </a:rPr>
+              <a:t> </a:t>
+            </a:r>
+            <a:r>
+              <a:rPr lang="en-US" dirty="0" err="1" smtClean="0">
+                <a:sym typeface="Wingdings" panose="05000000000000000000" pitchFamily="2" charset="2"/>
+              </a:rPr>
+              <a:t>sammen</a:t>
+            </a:r>
+            <a:r>
+              <a:rPr lang="en-US" dirty="0" smtClean="0">
+                <a:sym typeface="Wingdings" panose="05000000000000000000" pitchFamily="2" charset="2"/>
+              </a:rPr>
+              <a:t> </a:t>
+            </a:r>
+            <a:r>
+              <a:rPr lang="en-US" dirty="0" err="1" smtClean="0">
+                <a:sym typeface="Wingdings" panose="05000000000000000000" pitchFamily="2" charset="2"/>
+              </a:rPr>
+              <a:t>brancher</a:t>
+            </a:r>
+            <a:r>
+              <a:rPr lang="en-US" dirty="0" smtClean="0">
+                <a:sym typeface="Wingdings" panose="05000000000000000000" pitchFamily="2" charset="2"/>
+              </a:rPr>
+              <a:t>  Merge?</a:t>
+            </a:r>
+            <a:endParaRPr lang="en-US" dirty="0"/>
           </a:p>
         </p:txBody>
       </p:sp>
     </p:spTree>
     <p:extLst>
       <p:ext uri="{BB962C8B-B14F-4D97-AF65-F5344CB8AC3E}">
-        <p14:creationId xmlns:p14="http://schemas.microsoft.com/office/powerpoint/2010/main" val="3350630885"/>
+        <p14:creationId xmlns:p14="http://schemas.microsoft.com/office/powerpoint/2010/main" val="3030663113"/>
       </p:ext>
     </p:extLst>
   </p:cSld>
@@ -4095,95 +4364,34 @@
           <a:chExt cx="0" cy="0"/>
         </a:xfrm>
       </p:grpSpPr>
-      <p:sp>
-        <p:nvSpPr>
-          <p:cNvPr id="2" name="Title 1"/>
-          <p:cNvSpPr>
-            <a:spLocks noGrp="1"/>
-          </p:cNvSpPr>
-          <p:nvPr>
-            <p:ph type="title"/>
-          </p:nvPr>
-        </p:nvSpPr>
-        <p:spPr/>
-        <p:txBody>
-          <a:bodyPr/>
-          <a:lstStyle/>
-          <a:p>
-            <a:r>
-              <a:rPr lang="en-US" dirty="0" err="1" smtClean="0"/>
-              <a:t>Git</a:t>
-            </a:r>
-            <a:r>
-              <a:rPr lang="en-US" dirty="0" smtClean="0"/>
-              <a:t> clone – Lab it up!</a:t>
-            </a:r>
-            <a:endParaRPr lang="en-US" dirty="0"/>
-          </a:p>
-        </p:txBody>
-      </p:sp>
-      <p:sp>
-        <p:nvSpPr>
-          <p:cNvPr id="3" name="Content Placeholder 2"/>
-          <p:cNvSpPr>
-            <a:spLocks noGrp="1"/>
-          </p:cNvSpPr>
-          <p:nvPr>
-            <p:ph idx="1"/>
-          </p:nvPr>
-        </p:nvSpPr>
-        <p:spPr/>
-        <p:txBody>
-          <a:bodyPr/>
-          <a:lstStyle/>
-          <a:p>
-            <a:r>
-              <a:rPr lang="en-US" dirty="0" err="1" smtClean="0"/>
-              <a:t>Gå</a:t>
-            </a:r>
-            <a:r>
-              <a:rPr lang="en-US" dirty="0" smtClean="0"/>
-              <a:t> </a:t>
-            </a:r>
-            <a:r>
-              <a:rPr lang="en-US" dirty="0" err="1" smtClean="0"/>
-              <a:t>sammen</a:t>
-            </a:r>
-            <a:r>
-              <a:rPr lang="en-US" dirty="0" smtClean="0"/>
-              <a:t> </a:t>
-            </a:r>
-            <a:r>
-              <a:rPr lang="en-US" dirty="0" err="1" smtClean="0"/>
-              <a:t>i</a:t>
-            </a:r>
-            <a:r>
-              <a:rPr lang="en-US" dirty="0" smtClean="0"/>
-              <a:t> par, lag repository.</a:t>
-            </a:r>
-          </a:p>
-          <a:p>
-            <a:r>
-              <a:rPr lang="en-US" dirty="0" smtClean="0"/>
-              <a:t>Merge</a:t>
-            </a:r>
-            <a:endParaRPr lang="en-US" dirty="0"/>
-          </a:p>
-          <a:p>
-            <a:r>
-              <a:rPr lang="en-US" dirty="0"/>
-              <a:t>Merge conflict.</a:t>
-            </a:r>
-          </a:p>
-          <a:p>
-            <a:endParaRPr lang="en-US" dirty="0"/>
-          </a:p>
-        </p:txBody>
-      </p:sp>
+      <p:pic>
+        <p:nvPicPr>
+          <p:cNvPr id="5" name="Picture 4"/>
+          <p:cNvPicPr>
+            <a:picLocks noChangeAspect="1"/>
+          </p:cNvPicPr>
+          <p:nvPr/>
+        </p:nvPicPr>
+        <p:blipFill>
+          <a:blip r:embed="rId2"/>
+          <a:stretch>
+            <a:fillRect/>
+          </a:stretch>
+        </p:blipFill>
+        <p:spPr>
+          <a:xfrm>
+            <a:off x="3341119" y="282542"/>
+            <a:ext cx="5343507" cy="6348334"/>
+          </a:xfrm>
+          <a:prstGeom prst="rect">
+            <a:avLst/>
+          </a:prstGeom>
+        </p:spPr>
+      </p:pic>
     </p:spTree>
     <p:extLst>
       <p:ext uri="{BB962C8B-B14F-4D97-AF65-F5344CB8AC3E}">
-        <p14:creationId xmlns:p14="http://schemas.microsoft.com/office/powerpoint/2010/main" val="314678066"/>
+        <p14:creationId xmlns:p14="http://schemas.microsoft.com/office/powerpoint/2010/main" val="2166476444"/>
       </p:ext>
     </p:extLst>
   </p:cSld>
@@ -4227,172 +4435,42 @@
             <p:ph type="title"/>
           </p:nvPr>
         </p:nvSpPr>
-        <p:spPr>
-          <a:xfrm>
-            <a:off x="1396538" y="685800"/>
-            <a:ext cx="9601200" cy="1485900"/>
-          </a:xfrm>
-        </p:spPr>
+        <p:spPr/>
         <p:txBody>
           <a:bodyPr/>
           <a:lstStyle/>
           <a:p>
             <a:r>
               <a:rPr lang="en-US" dirty="0" smtClean="0"/>
-              <a:t>Add, Stage, Commit, Checkout</a:t>
+              <a:t>REMOTE REPOSITORY , aka GITHUB?</a:t>
             </a:r>
             <a:endParaRPr lang="en-US" dirty="0"/>
           </a:p>
         </p:txBody>
       </p:sp>
-      <p:pic>
-        <p:nvPicPr>
-          <p:cNvPr id="6" name="Picture 5"/>
-          <p:cNvPicPr>
-            <a:picLocks noChangeAspect="1"/>
-          </p:cNvPicPr>
-          <p:nvPr/>
-        </p:nvPicPr>
-        <p:blipFill>
-          <a:blip r:embed="rId2"/>
-          <a:stretch>
-            <a:fillRect/>
-          </a:stretch>
-        </p:blipFill>
-        <p:spPr>
-          <a:xfrm>
-            <a:off x="1665821" y="1687484"/>
-            <a:ext cx="1777913" cy="3994567"/>
-          </a:xfrm>
-          <a:prstGeom prst="rect">
-            <a:avLst/>
-          </a:prstGeom>
-        </p:spPr>
-      </p:pic>
-      <p:pic>
-        <p:nvPicPr>
-          <p:cNvPr id="7" name="Picture 6"/>
-          <p:cNvPicPr>
-            <a:picLocks noChangeAspect="1"/>
-          </p:cNvPicPr>
-          <p:nvPr/>
-        </p:nvPicPr>
-        <p:blipFill>
-          <a:blip r:embed="rId3"/>
-          <a:stretch>
-            <a:fillRect/>
-          </a:stretch>
-        </p:blipFill>
-        <p:spPr>
-          <a:xfrm>
-            <a:off x="5177948" y="1687484"/>
-            <a:ext cx="1777913" cy="3994567"/>
-          </a:xfrm>
-          <a:prstGeom prst="rect">
-            <a:avLst/>
-          </a:prstGeom>
-        </p:spPr>
-      </p:pic>
-      <p:pic>
-        <p:nvPicPr>
-          <p:cNvPr id="8" name="Picture 7"/>
-          <p:cNvPicPr>
-            <a:picLocks noChangeAspect="1"/>
-          </p:cNvPicPr>
-          <p:nvPr/>
-        </p:nvPicPr>
-        <p:blipFill>
-          <a:blip r:embed="rId4"/>
-          <a:stretch>
-            <a:fillRect/>
-          </a:stretch>
-        </p:blipFill>
-        <p:spPr>
-          <a:xfrm>
-            <a:off x="8690075" y="1687484"/>
-            <a:ext cx="1777913" cy="3994567"/>
-          </a:xfrm>
-          <a:prstGeom prst="rect">
-            <a:avLst/>
-          </a:prstGeom>
-        </p:spPr>
-      </p:pic>
-      <p:pic>
-        <p:nvPicPr>
-          <p:cNvPr id="9" name="Picture 8"/>
-          <p:cNvPicPr>
-            <a:picLocks noChangeAspect="1"/>
-          </p:cNvPicPr>
-          <p:nvPr/>
-        </p:nvPicPr>
-        <p:blipFill>
-          <a:blip r:embed="rId5"/>
-          <a:stretch>
-            <a:fillRect/>
-          </a:stretch>
-        </p:blipFill>
-        <p:spPr>
-          <a:xfrm>
-            <a:off x="2664010" y="3173384"/>
-            <a:ext cx="1211325" cy="839933"/>
-          </a:xfrm>
-          <a:prstGeom prst="rect">
-            <a:avLst/>
-          </a:prstGeom>
-        </p:spPr>
-      </p:pic>
-      <p:pic>
-        <p:nvPicPr>
-          <p:cNvPr id="10" name="Picture 9"/>
-          <p:cNvPicPr>
-            <a:picLocks noChangeAspect="1"/>
-          </p:cNvPicPr>
-          <p:nvPr/>
-        </p:nvPicPr>
-        <p:blipFill>
-          <a:blip r:embed="rId5"/>
-          <a:stretch>
-            <a:fillRect/>
-          </a:stretch>
-        </p:blipFill>
-        <p:spPr>
-          <a:xfrm>
-            <a:off x="6197138" y="3840305"/>
-            <a:ext cx="1211325" cy="839933"/>
-          </a:xfrm>
-          <a:prstGeom prst="rect">
-            <a:avLst/>
-          </a:prstGeom>
-        </p:spPr>
-      </p:pic>
-      <p:pic>
-        <p:nvPicPr>
-          <p:cNvPr id="11" name="Picture 10"/>
-          <p:cNvPicPr>
-            <a:picLocks noChangeAspect="1"/>
-          </p:cNvPicPr>
-          <p:nvPr/>
-        </p:nvPicPr>
-        <p:blipFill>
-          <a:blip r:embed="rId6"/>
-          <a:stretch>
-            <a:fillRect/>
-          </a:stretch>
-        </p:blipFill>
-        <p:spPr>
-          <a:xfrm>
-            <a:off x="4057781" y="4841989"/>
-            <a:ext cx="5490038" cy="839933"/>
-          </a:xfrm>
-          <a:prstGeom prst="rect">
-            <a:avLst/>
-          </a:prstGeom>
-        </p:spPr>
-      </p:pic>
+      <p:sp>
+        <p:nvSpPr>
+          <p:cNvPr id="3" name="Content Placeholder 2"/>
+          <p:cNvSpPr>
+            <a:spLocks noGrp="1"/>
+          </p:cNvSpPr>
+          <p:nvPr>
+            <p:ph idx="1"/>
+          </p:nvPr>
+        </p:nvSpPr>
+        <p:spPr/>
+        <p:txBody>
+          <a:bodyPr/>
+          <a:lstStyle/>
+          <a:p>
+            <a:endParaRPr lang="en-US" dirty="0"/>
+          </a:p>
+        </p:txBody>
+      </p:sp>
     </p:spTree>
     <p:extLst>
       <p:ext uri="{BB962C8B-B14F-4D97-AF65-F5344CB8AC3E}">
-        <p14:creationId xmlns:p14="http://schemas.microsoft.com/office/powerpoint/2010/main" val="881955558"/>
+        <p14:creationId xmlns:p14="http://schemas.microsoft.com/office/powerpoint/2010/main" val="2257065067"/>
       </p:ext>
     </p:extLst>
   </p:cSld>
@@ -4402,312 +4480,7 @@
   <p:timing>
     <p:tnLst>
       <p:par>
-        <p:cTn id="1" dur="indefinite" restart="never" nodeType="tmRoot">
-          <p:childTnLst>
-            <p:seq concurrent="1" nextAc="seek">
-              <p:cTn id="2" dur="indefinite" nodeType="mainSeq">
-                <p:childTnLst>
-                  <p:par>
-                    <p:cTn id="3" fill="hold">
-                      <p:stCondLst>
-                        <p:cond delay="indefinite"/>
-                      </p:stCondLst>
-                      <p:childTnLst>
-                        <p:par>
-                          <p:cTn id="4" fill="hold">
-                            <p:stCondLst>
-                              <p:cond delay="0"/>
-                            </p:stCondLst>
-                            <p:childTnLst>
-                              <p:par>
-                                <p:cTn id="5" presetID="10" presetClass="entr" presetSubtype="0" fill="hold" nodeType="clickEffect">
-                                  <p:stCondLst>
-                                    <p:cond delay="0"/>
-                                  </p:stCondLst>
-                                  <p:childTnLst>
-                                    <p:set>
-                                      <p:cBhvr>
-                                        <p:cTn id="6" dur="1" fill="hold">
-                                          <p:stCondLst>
-                                            <p:cond delay="0"/>
-                                          </p:stCondLst>
-                                        </p:cTn>
-                                        <p:tgtEl>
-                                          <p:spTgt spid="6"/>
-                                        </p:tgtEl>
-                                        <p:attrNameLst>
-                                          <p:attrName>style.visibility</p:attrName>
-                                        </p:attrNameLst>
-                                      </p:cBhvr>
-                                      <p:to>
-                                        <p:strVal val="visible"/>
-                                      </p:to>
-                                    </p:set>
-                                    <p:animEffect transition="in" filter="fade">
-                                      <p:cBhvr>
-                                        <p:cTn id="7" dur="500"/>
-                                        <p:tgtEl>
-                                          <p:spTgt spid="6"/>
-                                        </p:tgtEl>
-                                      </p:cBhvr>
-                                    </p:animEffect>
-                                  </p:childTnLst>
-                                </p:cTn>
-                              </p:par>
-                              <p:par>
-                                <p:cTn id="8" presetID="10" presetClass="entr" presetSubtype="0" fill="hold" nodeType="withEffect">
-                                  <p:stCondLst>
-                                    <p:cond delay="0"/>
-                                  </p:stCondLst>
-                                  <p:childTnLst>
-                                    <p:set>
-                                      <p:cBhvr>
-                                        <p:cTn id="9" dur="1" fill="hold">
-                                          <p:stCondLst>
-                                            <p:cond delay="0"/>
-                                          </p:stCondLst>
-                                        </p:cTn>
-                                        <p:tgtEl>
-                                          <p:spTgt spid="9"/>
-                                        </p:tgtEl>
-                                        <p:attrNameLst>
-                                          <p:attrName>style.visibility</p:attrName>
-                                        </p:attrNameLst>
-                                      </p:cBhvr>
-                                      <p:to>
-                                        <p:strVal val="visible"/>
-                                      </p:to>
-                                    </p:set>
-                                    <p:animEffect transition="in" filter="fade">
-                                      <p:cBhvr>
-                                        <p:cTn id="10" dur="500"/>
-                                        <p:tgtEl>
-                                          <p:spTgt spid="9"/>
-                                        </p:tgtEl>
-                                      </p:cBhvr>
-                                    </p:animEffect>
-                                  </p:childTnLst>
-                                </p:cTn>
-                              </p:par>
-                            </p:childTnLst>
-                          </p:cTn>
-                        </p:par>
-                      </p:childTnLst>
-                    </p:cTn>
-                  </p:par>
-                  <p:par>
-                    <p:cTn id="11" fill="hold">
-                      <p:stCondLst>
-                        <p:cond delay="indefinite"/>
-                      </p:stCondLst>
-                      <p:childTnLst>
-                        <p:par>
-                          <p:cTn id="12" fill="hold">
-                            <p:stCondLst>
-                              <p:cond delay="0"/>
-                            </p:stCondLst>
-                            <p:childTnLst>
-                              <p:par>
-                                <p:cTn id="13" presetID="10" presetClass="entr" presetSubtype="0" fill="hold" nodeType="clickEffect">
-                                  <p:stCondLst>
-                                    <p:cond delay="0"/>
-                                  </p:stCondLst>
-                                  <p:childTnLst>
-                                    <p:set>
-                                      <p:cBhvr>
-                                        <p:cTn id="14" dur="1" fill="hold">
-                                          <p:stCondLst>
-                                            <p:cond delay="0"/>
-                                          </p:stCondLst>
-                                        </p:cTn>
-                                        <p:tgtEl>
-                                          <p:spTgt spid="7"/>
-                                        </p:tgtEl>
-                                        <p:attrNameLst>
-                                          <p:attrName>style.visibility</p:attrName>
-                                        </p:attrNameLst>
-                                      </p:cBhvr>
-                                      <p:to>
-                                        <p:strVal val="visible"/>
-                                      </p:to>
-                                    </p:set>
-                                    <p:animEffect transition="in" filter="fade">
-                                      <p:cBhvr>
-                                        <p:cTn id="15" dur="500"/>
-                                        <p:tgtEl>
-                                          <p:spTgt spid="7"/>
-                                        </p:tgtEl>
-                                      </p:cBhvr>
-                                    </p:animEffect>
-                                  </p:childTnLst>
-                                </p:cTn>
-                              </p:par>
-                              <p:par>
-                                <p:cTn id="16" presetID="10" presetClass="entr" presetSubtype="0" fill="hold" nodeType="withEffect">
-                                  <p:stCondLst>
-                                    <p:cond delay="0"/>
-                                  </p:stCondLst>
-                                  <p:childTnLst>
-                                    <p:set>
-                                      <p:cBhvr>
-                                        <p:cTn id="17" dur="1" fill="hold">
-                                          <p:stCondLst>
-                                            <p:cond delay="0"/>
-                                          </p:stCondLst>
-                                        </p:cTn>
-                                        <p:tgtEl>
-                                          <p:spTgt spid="10"/>
-                                        </p:tgtEl>
-                                        <p:attrNameLst>
-                                          <p:attrName>style.visibility</p:attrName>
-                                        </p:attrNameLst>
-                                      </p:cBhvr>
-                                      <p:to>
-                                        <p:strVal val="visible"/>
-                                      </p:to>
-                                    </p:set>
-                                    <p:animEffect transition="in" filter="fade">
-                                      <p:cBhvr>
-                                        <p:cTn id="18" dur="500"/>
-                                        <p:tgtEl>
-                                          <p:spTgt spid="10"/>
-                                        </p:tgtEl>
-                                      </p:cBhvr>
-                                    </p:animEffect>
-                                  </p:childTnLst>
-                                </p:cTn>
-                              </p:par>
-                            </p:childTnLst>
-                          </p:cTn>
-                        </p:par>
-                      </p:childTnLst>
-                    </p:cTn>
-                  </p:par>
-                  <p:par>
-                    <p:cTn id="19" fill="hold">
-                      <p:stCondLst>
-                        <p:cond delay="indefinite"/>
-                      </p:stCondLst>
-                      <p:childTnLst>
-                        <p:par>
-                          <p:cTn id="20" fill="hold">
-                            <p:stCondLst>
-                              <p:cond delay="0"/>
-                            </p:stCondLst>
-                            <p:childTnLst>
-                              <p:par>
-                                <p:cTn id="21" presetID="10" presetClass="entr" presetSubtype="0" fill="hold" nodeType="clickEffect">
-                                  <p:stCondLst>
-                                    <p:cond delay="0"/>
-                                  </p:stCondLst>
-                                  <p:childTnLst>
-                                    <p:set>
-                                      <p:cBhvr>
-                                        <p:cTn id="22" dur="1" fill="hold">
-                                          <p:stCondLst>
-                                            <p:cond delay="0"/>
-                                          </p:stCondLst>
-                                        </p:cTn>
-                                        <p:tgtEl>
-                                          <p:spTgt spid="8"/>
-                                        </p:tgtEl>
-                                        <p:attrNameLst>
-                                          <p:attrName>style.visibility</p:attrName>
-                                        </p:attrNameLst>
-                                      </p:cBhvr>
-                                      <p:to>
-                                        <p:strVal val="visible"/>
-                                      </p:to>
-                                    </p:set>
-                                    <p:animEffect transition="in" filter="fade">
-                                      <p:cBhvr>
-                                        <p:cTn id="23" dur="500"/>
-                                        <p:tgtEl>
-                                          <p:spTgt spid="8"/>
-                                        </p:tgtEl>
-                                      </p:cBhvr>
-                                    </p:animEffect>
-                                  </p:childTnLst>
-                                </p:cTn>
-                              </p:par>
-                            </p:childTnLst>
-                          </p:cTn>
-                        </p:par>
-                      </p:childTnLst>
-                    </p:cTn>
-                  </p:par>
-                  <p:par>
-                    <p:cTn id="24" fill="hold">
-                      <p:stCondLst>
-                        <p:cond delay="indefinite"/>
-                      </p:stCondLst>
-                      <p:childTnLst>
-                        <p:par>
-                          <p:cTn id="25" fill="hold">
-                            <p:stCondLst>
-                              <p:cond delay="0"/>
-                            </p:stCondLst>
-                            <p:childTnLst>
-                              <p:par>
-                                <p:cTn id="26" presetID="10" presetClass="entr" presetSubtype="0" fill="hold" nodeType="clickEffect">
-                                  <p:stCondLst>
-                                    <p:cond delay="0"/>
-                                  </p:stCondLst>
-                                  <p:childTnLst>
-                                    <p:set>
-                                      <p:cBhvr>
-                                        <p:cTn id="27" dur="1" fill="hold">
-                                          <p:stCondLst>
-                                            <p:cond delay="0"/>
-                                          </p:stCondLst>
-                                        </p:cTn>
-                                        <p:tgtEl>
-                                          <p:spTgt spid="11"/>
-                                        </p:tgtEl>
-                                        <p:attrNameLst>
-                                          <p:attrName>style.visibility</p:attrName>
-                                        </p:attrNameLst>
-                                      </p:cBhvr>
-                                      <p:to>
-                                        <p:strVal val="visible"/>
-                                      </p:to>
-                                    </p:set>
-                                    <p:animEffect transition="in" filter="fade">
-                                      <p:cBhvr>
-                                        <p:cTn id="28" dur="500"/>
-                                        <p:tgtEl>
-                                          <p:spTgt spid="11"/>
-                                        </p:tgtEl>
-                                      </p:cBhvr>
-                                    </p:animEffect>
-                                  </p:childTnLst>
-                                </p:cTn>
-                              </p:par>
-                            </p:childTnLst>
-                          </p:cTn>
-                        </p:par>
-                      </p:childTnLst>
-                    </p:cTn>
-                  </p:par>
-                </p:childTnLst>
-              </p:cTn>
-              <p:prevCondLst>
-                <p:cond evt="onPrev" delay="0">
-                  <p:tgtEl>
-                    <p:sldTgt/>
-                  </p:tgtEl>
-                </p:cond>
-              </p:prevCondLst>
-              <p:nextCondLst>
-                <p:cond evt="onNext" delay="0">
-                  <p:tgtEl>
-                    <p:sldTgt/>
-                  </p:tgtEl>
-                </p:cond>
-              </p:nextCondLst>
-            </p:seq>
-          </p:childTnLst>
-        </p:cTn>
+        <p:cTn id="1" dur="indefinite" restart="never" nodeType="tmRoot"/>
       </p:par>
     </p:tnLst>
   </p:timing>
@@ -4715,6 +4488,226 @@
 </file>
 
 <file path=ppt/slides/slide14.xml><?xml version="1.0" encoding="utf-8"?>
+<p:sld xmlns:a="http://schemas.openxmlformats.org/drawingml/2006/main" xmlns:r="http://schemas.openxmlformats.org/officeDocument/2006/relationships" xmlns:p="http://schemas.openxmlformats.org/presentationml/2006/main">
+  <p:cSld>
+    <p:spTree>
+      <p:nvGrpSpPr>
+        <p:cNvPr id="1" name=""/>
+        <p:cNvGrpSpPr/>
+        <p:nvPr/>
+      </p:nvGrpSpPr>
+      <p:grpSpPr>
+        <a:xfrm>
+          <a:off x="0" y="0"/>
+          <a:ext cx="0" cy="0"/>
+          <a:chOff x="0" y="0"/>
+          <a:chExt cx="0" cy="0"/>
+        </a:xfrm>
+      </p:grpSpPr>
+      <p:sp>
+        <p:nvSpPr>
+          <p:cNvPr id="2" name="Title 1"/>
+          <p:cNvSpPr>
+            <a:spLocks noGrp="1"/>
+          </p:cNvSpPr>
+          <p:nvPr>
+            <p:ph type="title"/>
+          </p:nvPr>
+        </p:nvSpPr>
+        <p:spPr/>
+        <p:txBody>
+          <a:bodyPr/>
+          <a:lstStyle/>
+          <a:p>
+            <a:r>
+              <a:rPr lang="en-US" dirty="0" err="1" smtClean="0"/>
+              <a:t>Github</a:t>
+            </a:r>
+            <a:endParaRPr lang="en-US" dirty="0"/>
+          </a:p>
+        </p:txBody>
+      </p:sp>
+      <p:sp>
+        <p:nvSpPr>
+          <p:cNvPr id="3" name="Content Placeholder 2"/>
+          <p:cNvSpPr>
+            <a:spLocks noGrp="1"/>
+          </p:cNvSpPr>
+          <p:nvPr>
+            <p:ph idx="1"/>
+          </p:nvPr>
+        </p:nvSpPr>
+        <p:spPr/>
+        <p:txBody>
+          <a:bodyPr/>
+          <a:lstStyle/>
+          <a:p>
+            <a:r>
+              <a:rPr lang="en-US" dirty="0" err="1" smtClean="0"/>
+              <a:t>Lage</a:t>
+            </a:r>
+            <a:r>
+              <a:rPr lang="en-US" dirty="0" smtClean="0"/>
+              <a:t> repository</a:t>
+            </a:r>
+          </a:p>
+          <a:p>
+            <a:r>
+              <a:rPr lang="en-US" dirty="0" smtClean="0"/>
+              <a:t>Fork</a:t>
+            </a:r>
+          </a:p>
+          <a:p>
+            <a:r>
+              <a:rPr lang="en-US" dirty="0" smtClean="0"/>
+              <a:t>Clone</a:t>
+            </a:r>
+          </a:p>
+        </p:txBody>
+      </p:sp>
+    </p:spTree>
+    <p:extLst>
+      <p:ext uri="{BB962C8B-B14F-4D97-AF65-F5344CB8AC3E}">
+        <p14:creationId xmlns:p14="http://schemas.microsoft.com/office/powerpoint/2010/main" val="3350630885"/>
+      </p:ext>
+    </p:extLst>
+  </p:cSld>
+  <p:clrMapOvr>
+    <a:masterClrMapping/>
+  </p:clrMapOvr>
+  <p:timing>
+    <p:tnLst>
+      <p:par>
+        <p:cTn id="1" dur="indefinite" restart="never" nodeType="tmRoot"/>
+      </p:par>
+    </p:tnLst>
+  </p:timing>
+</p:sld>
+</file>
+
+<file path=ppt/slides/slide15.xml><?xml version="1.0" encoding="utf-8"?>
+<p:sld xmlns:a="http://schemas.openxmlformats.org/drawingml/2006/main" xmlns:r="http://schemas.openxmlformats.org/officeDocument/2006/relationships" xmlns:p="http://schemas.openxmlformats.org/presentationml/2006/main">
+  <p:cSld>
+    <p:spTree>
+      <p:nvGrpSpPr>
+        <p:cNvPr id="1" name=""/>
+        <p:cNvGrpSpPr/>
+        <p:nvPr/>
+      </p:nvGrpSpPr>
+      <p:grpSpPr>
+        <a:xfrm>
+          <a:off x="0" y="0"/>
+          <a:ext cx="0" cy="0"/>
+          <a:chOff x="0" y="0"/>
+          <a:chExt cx="0" cy="0"/>
+        </a:xfrm>
+      </p:grpSpPr>
+      <p:sp>
+        <p:nvSpPr>
+          <p:cNvPr id="2" name="Title 1"/>
+          <p:cNvSpPr>
+            <a:spLocks noGrp="1"/>
+          </p:cNvSpPr>
+          <p:nvPr>
+            <p:ph type="title"/>
+          </p:nvPr>
+        </p:nvSpPr>
+        <p:spPr/>
+        <p:txBody>
+          <a:bodyPr/>
+          <a:lstStyle/>
+          <a:p>
+            <a:r>
+              <a:rPr lang="en-US" dirty="0" err="1" smtClean="0"/>
+              <a:t>Git</a:t>
+            </a:r>
+            <a:r>
+              <a:rPr lang="en-US" dirty="0" smtClean="0"/>
+              <a:t> clone – Lab it up!</a:t>
+            </a:r>
+            <a:endParaRPr lang="en-US" dirty="0"/>
+          </a:p>
+        </p:txBody>
+      </p:sp>
+      <p:sp>
+        <p:nvSpPr>
+          <p:cNvPr id="3" name="Content Placeholder 2"/>
+          <p:cNvSpPr>
+            <a:spLocks noGrp="1"/>
+          </p:cNvSpPr>
+          <p:nvPr>
+            <p:ph idx="1"/>
+          </p:nvPr>
+        </p:nvSpPr>
+        <p:spPr/>
+        <p:txBody>
+          <a:bodyPr/>
+          <a:lstStyle/>
+          <a:p>
+            <a:r>
+              <a:rPr lang="en-US" dirty="0" err="1" smtClean="0"/>
+              <a:t>Gå</a:t>
+            </a:r>
+            <a:r>
+              <a:rPr lang="en-US" dirty="0" smtClean="0"/>
+              <a:t> </a:t>
+            </a:r>
+            <a:r>
+              <a:rPr lang="en-US" dirty="0" err="1" smtClean="0"/>
+              <a:t>sammen</a:t>
+            </a:r>
+            <a:r>
+              <a:rPr lang="en-US" dirty="0" smtClean="0"/>
+              <a:t> </a:t>
+            </a:r>
+            <a:r>
+              <a:rPr lang="en-US" dirty="0" err="1" smtClean="0"/>
+              <a:t>i</a:t>
+            </a:r>
+            <a:r>
+              <a:rPr lang="en-US" dirty="0" smtClean="0"/>
+              <a:t> par, lag repository.</a:t>
+            </a:r>
+          </a:p>
+          <a:p>
+            <a:r>
+              <a:rPr lang="en-US" dirty="0" smtClean="0"/>
+              <a:t>Merge</a:t>
+            </a:r>
+            <a:endParaRPr lang="en-US" dirty="0"/>
+          </a:p>
+          <a:p>
+            <a:r>
+              <a:rPr lang="en-US" dirty="0"/>
+              <a:t>Merge conflict.</a:t>
+            </a:r>
+          </a:p>
+          <a:p>
+            <a:endParaRPr lang="en-US" dirty="0"/>
+          </a:p>
+        </p:txBody>
+      </p:sp>
+    </p:spTree>
+    <p:extLst>
+      <p:ext uri="{BB962C8B-B14F-4D97-AF65-F5344CB8AC3E}">
+        <p14:creationId xmlns:p14="http://schemas.microsoft.com/office/powerpoint/2010/main" val="314678066"/>
+      </p:ext>
+    </p:extLst>
+  </p:cSld>
+  <p:clrMapOvr>
+    <a:masterClrMapping/>
+  </p:clrMapOvr>
+  <p:timing>
+    <p:tnLst>
+      <p:par>
+        <p:cTn id="1" dur="indefinite" restart="never" nodeType="tmRoot"/>
+      </p:par>
+    </p:tnLst>
+  </p:timing>
+</p:sld>
+</file>
+
+<file path=ppt/slides/slide16.xml><?xml version="1.0" encoding="utf-8"?>
 <p:sld xmlns:a="http://schemas.openxmlformats.org/drawingml/2006/main" xmlns:r="http://schemas.openxmlformats.org/officeDocument/2006/relationships" xmlns:p="http://schemas.openxmlformats.org/presentationml/2006/main">
   <p:cSld>
     <p:spTree>
@@ -6159,11 +6152,7 @@
             </a:r>
             <a:r>
               <a:rPr lang="en-US" dirty="0" smtClean="0"/>
-              <a:t>?</a:t>
-            </a:r>
-            <a:r>
-              <a:rPr lang="en-US" dirty="0" smtClean="0"/>
-              <a:t>	</a:t>
+              <a:t>?	</a:t>
             </a:r>
             <a:endParaRPr lang="en-US" dirty="0"/>
           </a:p>
@@ -6187,7 +6176,7 @@
         </p:spPr>
         <p:txBody>
           <a:bodyPr>
-            <a:normAutofit fontScale="62500" lnSpcReduction="20000"/>
+            <a:normAutofit fontScale="70000" lnSpcReduction="20000"/>
           </a:bodyPr>
           <a:lstStyle/>
           <a:p>
@@ -6214,7 +6203,6 @@
               <a:rPr lang="en-US" dirty="0" smtClean="0"/>
               <a:t>File lock</a:t>
             </a:r>
-            <a:endParaRPr lang="en-US" dirty="0" smtClean="0"/>
           </a:p>
           <a:p>
             <a:pPr lvl="1"/>
@@ -6222,7 +6210,6 @@
               <a:rPr lang="en-US" dirty="0" smtClean="0"/>
               <a:t>Centralized Version Control Systems</a:t>
             </a:r>
-            <a:endParaRPr lang="en-US" dirty="0" smtClean="0"/>
           </a:p>
           <a:p>
             <a:pPr lvl="1"/>
@@ -6271,15 +6258,6 @@
               <a:rPr lang="en-US" dirty="0" smtClean="0"/>
               <a:t>	</a:t>
             </a:r>
-            <a:endParaRPr lang="en-US" dirty="0" smtClean="0"/>
-          </a:p>
-          <a:p>
-            <a:pPr lvl="1"/>
-            <a:r>
-              <a:rPr lang="en-US" dirty="0" err="1" smtClean="0"/>
-              <a:t>Bla</a:t>
-            </a:r>
-            <a:endParaRPr lang="en-US" dirty="0" smtClean="0"/>
           </a:p>
           <a:p>
             <a:pPr lvl="1"/>
@@ -6378,11 +6356,7 @@
             </a:r>
             <a:r>
               <a:rPr lang="en-US" dirty="0" smtClean="0"/>
-              <a:t> </a:t>
-            </a:r>
-            <a:r>
-              <a:rPr lang="en-US" dirty="0" smtClean="0"/>
-              <a:t>~ </a:t>
+              <a:t> ~ </a:t>
             </a:r>
             <a:r>
               <a:rPr lang="en-US" b="1" i="0" dirty="0"/>
@@ -6960,15 +6934,6 @@
                         </a:rPr>
                         <a:t>Tree</a:t>
                       </a:r>
-                      <a:endParaRPr lang="en-US" sz="1800" b="0" i="0" kern="1200" dirty="0" smtClean="0">
-                        <a:solidFill>
-                          <a:schemeClr val="dk1"/>
-                        </a:solidFill>
-                        <a:effectLst/>
-                        <a:latin typeface="+mn-lt"/>
-                        <a:ea typeface="+mn-ea"/>
-                        <a:cs typeface="+mn-cs"/>
-                      </a:endParaRPr>
                     </a:p>
                   </a:txBody>
                   <a:tcPr/>
@@ -7021,15 +6986,6 @@
                         </a:rPr>
                         <a:t>Upstream</a:t>
                       </a:r>
-                      <a:endParaRPr lang="en-US" sz="1800" b="0" i="0" kern="1200" dirty="0" smtClean="0">
-                        <a:solidFill>
-                          <a:schemeClr val="dk1"/>
-                        </a:solidFill>
-                        <a:effectLst/>
-                        <a:latin typeface="+mn-lt"/>
-                        <a:ea typeface="+mn-ea"/>
-                        <a:cs typeface="+mn-cs"/>
-                      </a:endParaRPr>
                     </a:p>
                   </a:txBody>
                   <a:tcPr/>
@@ -7103,15 +7059,6 @@
                         </a:rPr>
                         <a:t>Tag</a:t>
                       </a:r>
-                      <a:endParaRPr lang="en-US" sz="1800" b="0" i="0" kern="1200" dirty="0" smtClean="0">
-                        <a:solidFill>
-                          <a:schemeClr val="dk1"/>
-                        </a:solidFill>
-                        <a:effectLst/>
-                        <a:latin typeface="+mn-lt"/>
-                        <a:ea typeface="+mn-ea"/>
-                        <a:cs typeface="+mn-cs"/>
-                      </a:endParaRPr>
                     </a:p>
                   </a:txBody>
                   <a:tcPr/>
@@ -7150,15 +7097,6 @@
                         </a:rPr>
                         <a:t>Archive</a:t>
                       </a:r>
-                      <a:endParaRPr lang="en-US" sz="1800" b="0" i="0" kern="1200" dirty="0" smtClean="0">
-                        <a:solidFill>
-                          <a:schemeClr val="dk1"/>
-                        </a:solidFill>
-                        <a:effectLst/>
-                        <a:latin typeface="+mn-lt"/>
-                        <a:ea typeface="+mn-ea"/>
-                        <a:cs typeface="+mn-cs"/>
-                      </a:endParaRPr>
                     </a:p>
                   </a:txBody>
                   <a:tcPr/>
@@ -7225,15 +7163,6 @@
                         </a:rPr>
                         <a:t>patch</a:t>
                       </a:r>
-                      <a:endParaRPr lang="en-US" sz="1800" b="0" i="0" kern="1200" dirty="0" smtClean="0">
-                        <a:solidFill>
-                          <a:schemeClr val="dk1"/>
-                        </a:solidFill>
-                        <a:effectLst/>
-                        <a:latin typeface="+mn-lt"/>
-                        <a:ea typeface="+mn-ea"/>
-                        <a:cs typeface="+mn-cs"/>
-                      </a:endParaRPr>
                     </a:p>
                   </a:txBody>
                   <a:tcPr/>
@@ -7279,15 +7208,6 @@
                         </a:rPr>
                         <a:t>submission</a:t>
                       </a:r>
-                      <a:endParaRPr lang="en-US" sz="1800" b="0" i="0" kern="1200" dirty="0" smtClean="0">
-                        <a:solidFill>
-                          <a:schemeClr val="dk1"/>
-                        </a:solidFill>
-                        <a:effectLst/>
-                        <a:latin typeface="+mn-lt"/>
-                        <a:ea typeface="+mn-ea"/>
-                        <a:cs typeface="+mn-cs"/>
-                      </a:endParaRPr>
                     </a:p>
                   </a:txBody>
                   <a:tcPr/>
@@ -7378,15 +7298,6 @@
                         </a:rPr>
                         <a:t>Module</a:t>
                       </a:r>
-                      <a:endParaRPr lang="en-US" sz="1800" b="0" i="0" kern="1200" dirty="0" smtClean="0">
-                        <a:solidFill>
-                          <a:schemeClr val="dk1"/>
-                        </a:solidFill>
-                        <a:effectLst/>
-                        <a:latin typeface="+mn-lt"/>
-                        <a:ea typeface="+mn-ea"/>
-                        <a:cs typeface="+mn-cs"/>
-                      </a:endParaRPr>
                     </a:p>
                   </a:txBody>
                   <a:tcPr/>
@@ -7425,15 +7336,6 @@
                         </a:rPr>
                         <a:t>Submodule</a:t>
                       </a:r>
-                      <a:endParaRPr lang="en-US" sz="1800" b="0" i="0" kern="1200" dirty="0" smtClean="0">
-                        <a:solidFill>
-                          <a:schemeClr val="dk1"/>
-                        </a:solidFill>
-                        <a:effectLst/>
-                        <a:latin typeface="+mn-lt"/>
-                        <a:ea typeface="+mn-ea"/>
-                        <a:cs typeface="+mn-cs"/>
-                      </a:endParaRPr>
                     </a:p>
                   </a:txBody>
                   <a:tcPr/>
@@ -8062,7 +7964,6 @@
                         <a:rPr lang="en-US" dirty="0" smtClean="0"/>
                         <a:t>Add</a:t>
                       </a:r>
-                      <a:endParaRPr lang="en-US" dirty="0" smtClean="0"/>
                     </a:p>
                   </a:txBody>
                   <a:tcPr/>
@@ -8093,7 +7994,6 @@
                         <a:rPr lang="en-US" dirty="0" smtClean="0"/>
                         <a:t>Commit</a:t>
                       </a:r>
-                      <a:endParaRPr lang="en-US" dirty="0" smtClean="0"/>
                     </a:p>
                   </a:txBody>
                   <a:tcPr/>
@@ -8124,7 +8024,6 @@
                         <a:rPr lang="en-US" dirty="0" smtClean="0"/>
                         <a:t>Log</a:t>
                       </a:r>
-                      <a:endParaRPr lang="en-US" dirty="0" smtClean="0"/>
                     </a:p>
                   </a:txBody>
                   <a:tcPr/>
@@ -8155,7 +8054,6 @@
                         <a:rPr lang="en-US" dirty="0" smtClean="0"/>
                         <a:t>Status</a:t>
                       </a:r>
-                      <a:endParaRPr lang="en-US" dirty="0" smtClean="0"/>
                     </a:p>
                   </a:txBody>
                   <a:tcPr/>
@@ -8193,7 +8091,6 @@
                         <a:rPr lang="en-US" dirty="0" smtClean="0"/>
                         <a:t>Checkout</a:t>
                       </a:r>
-                      <a:endParaRPr lang="en-US" dirty="0" smtClean="0"/>
                     </a:p>
                   </a:txBody>
                   <a:tcPr/>
@@ -8224,7 +8121,6 @@
                         <a:rPr lang="en-US" dirty="0" smtClean="0"/>
                         <a:t>Push</a:t>
                       </a:r>
-                      <a:endParaRPr lang="en-US" dirty="0" smtClean="0"/>
                     </a:p>
                   </a:txBody>
                   <a:tcPr/>
@@ -8501,16 +8397,20 @@
           <a:lstStyle/>
           <a:p>
             <a:r>
-              <a:rPr lang="en-US" dirty="0" smtClean="0"/>
-              <a:t>Basic </a:t>
-            </a:r>
-            <a:r>
               <a:rPr lang="en-US" dirty="0" err="1" smtClean="0"/>
               <a:t>Git</a:t>
             </a:r>
             <a:r>
               <a:rPr lang="en-US" dirty="0" smtClean="0"/>
-              <a:t> -&gt; Lab it up!</a:t>
+              <a:t> </a:t>
+            </a:r>
+            <a:r>
+              <a:rPr lang="en-US" dirty="0" err="1" smtClean="0"/>
+              <a:t>init</a:t>
+            </a:r>
+            <a:r>
+              <a:rPr lang="en-US" dirty="0" smtClean="0"/>
+              <a:t> + add</a:t>
             </a:r>
             <a:endParaRPr lang="en-US" dirty="0"/>
           </a:p>
@@ -8532,198 +8432,51 @@
           <a:lstStyle/>
           <a:p>
             <a:r>
+              <a:rPr lang="en-US" dirty="0" err="1" smtClean="0"/>
+              <a:t>Git</a:t>
+            </a:r>
+            <a:r>
               <a:rPr lang="en-US" dirty="0" smtClean="0"/>
-              <a:t>Lag </a:t>
-            </a:r>
-            <a:r>
-              <a:rPr lang="en-US" dirty="0" err="1" smtClean="0"/>
-              <a:t>en</a:t>
-            </a:r>
-            <a:r>
-              <a:rPr lang="en-US" dirty="0" smtClean="0"/>
-              <a:t> </a:t>
-            </a:r>
-            <a:r>
-              <a:rPr lang="en-US" dirty="0" err="1" smtClean="0"/>
-              <a:t>mappe</a:t>
-            </a:r>
-            <a:endParaRPr lang="en-US" dirty="0" smtClean="0"/>
-          </a:p>
-          <a:p>
-            <a:r>
-              <a:rPr lang="en-US" dirty="0" err="1" smtClean="0"/>
-              <a:t>Initsialiser</a:t>
-            </a:r>
-            <a:r>
-              <a:rPr lang="en-US" dirty="0" smtClean="0"/>
-              <a:t> </a:t>
-            </a:r>
-            <a:r>
-              <a:rPr lang="en-US" dirty="0" err="1" smtClean="0"/>
-              <a:t>mappen</a:t>
-            </a:r>
-            <a:r>
-              <a:rPr lang="en-US" dirty="0" smtClean="0"/>
-              <a:t> med </a:t>
-            </a:r>
-            <a:r>
-              <a:rPr lang="en-US" dirty="0" err="1" smtClean="0"/>
-              <a:t>git</a:t>
-            </a:r>
-            <a:r>
-              <a:rPr lang="en-US" dirty="0" smtClean="0"/>
-              <a:t>! </a:t>
-            </a:r>
-            <a:r>
-              <a:rPr lang="en-US" dirty="0" smtClean="0">
-                <a:sym typeface="Wingdings" panose="05000000000000000000" pitchFamily="2" charset="2"/>
-              </a:rPr>
-              <a:t></a:t>
-            </a:r>
-            <a:r>
-              <a:rPr lang="en-US" dirty="0" smtClean="0"/>
-              <a:t> Status?</a:t>
-            </a:r>
-          </a:p>
-          <a:p>
-            <a:r>
-              <a:rPr lang="en-US" dirty="0" smtClean="0"/>
-              <a:t>Lag </a:t>
-            </a:r>
-            <a:r>
-              <a:rPr lang="en-US" dirty="0" err="1" smtClean="0"/>
-              <a:t>en</a:t>
-            </a:r>
-            <a:r>
-              <a:rPr lang="en-US" dirty="0" smtClean="0"/>
-              <a:t> fil, </a:t>
-            </a:r>
-            <a:r>
-              <a:rPr lang="en-US" dirty="0" err="1" smtClean="0"/>
-              <a:t>skriv</a:t>
-            </a:r>
-            <a:r>
-              <a:rPr lang="en-US" dirty="0" smtClean="0"/>
-              <a:t> </a:t>
-            </a:r>
-            <a:r>
-              <a:rPr lang="en-US" dirty="0" err="1" smtClean="0"/>
-              <a:t>noe</a:t>
-            </a:r>
-            <a:r>
-              <a:rPr lang="en-US" dirty="0" smtClean="0"/>
-              <a:t> I den. </a:t>
-            </a:r>
-            <a:r>
-              <a:rPr lang="en-US" dirty="0" smtClean="0">
-                <a:sym typeface="Wingdings" panose="05000000000000000000" pitchFamily="2" charset="2"/>
-              </a:rPr>
-              <a:t></a:t>
-            </a:r>
-            <a:r>
-              <a:rPr lang="en-US" dirty="0" smtClean="0"/>
-              <a:t> Status?</a:t>
-            </a:r>
-          </a:p>
-          <a:p>
-            <a:r>
-              <a:rPr lang="en-US" dirty="0" smtClean="0"/>
-              <a:t>Vi </a:t>
-            </a:r>
-            <a:r>
-              <a:rPr lang="en-US" dirty="0" err="1" smtClean="0"/>
-              <a:t>vil</a:t>
-            </a:r>
-            <a:r>
-              <a:rPr lang="en-US" dirty="0" smtClean="0"/>
-              <a:t> ha med </a:t>
-            </a:r>
-            <a:r>
-              <a:rPr lang="en-US" dirty="0" err="1" smtClean="0"/>
-              <a:t>filen</a:t>
-            </a:r>
-            <a:r>
-              <a:rPr lang="en-US" dirty="0" smtClean="0"/>
-              <a:t> </a:t>
-            </a:r>
-            <a:r>
-              <a:rPr lang="en-US" dirty="0" err="1" smtClean="0"/>
-              <a:t>i</a:t>
-            </a:r>
-            <a:r>
-              <a:rPr lang="en-US" dirty="0" smtClean="0"/>
-              <a:t> </a:t>
-            </a:r>
-            <a:r>
-              <a:rPr lang="en-US" dirty="0" err="1" smtClean="0"/>
-              <a:t>neste</a:t>
-            </a:r>
-            <a:r>
-              <a:rPr lang="en-US" dirty="0" smtClean="0"/>
-              <a:t> commit, </a:t>
-            </a:r>
-            <a:r>
-              <a:rPr lang="en-US" dirty="0" err="1" smtClean="0"/>
-              <a:t>hva</a:t>
-            </a:r>
-            <a:r>
-              <a:rPr lang="en-US" dirty="0" smtClean="0"/>
-              <a:t> </a:t>
-            </a:r>
-            <a:r>
-              <a:rPr lang="en-US" dirty="0" err="1" smtClean="0"/>
-              <a:t>må</a:t>
-            </a:r>
-            <a:r>
-              <a:rPr lang="en-US" dirty="0" smtClean="0"/>
-              <a:t> vi </a:t>
-            </a:r>
-            <a:r>
-              <a:rPr lang="en-US" dirty="0" err="1" smtClean="0"/>
-              <a:t>gjøre</a:t>
-            </a:r>
-            <a:r>
-              <a:rPr lang="en-US" dirty="0" smtClean="0"/>
-              <a:t>? </a:t>
-            </a:r>
-            <a:r>
-              <a:rPr lang="en-US" dirty="0" smtClean="0">
-                <a:sym typeface="Wingdings" panose="05000000000000000000" pitchFamily="2" charset="2"/>
-              </a:rPr>
-              <a:t> Status?</a:t>
-            </a:r>
-          </a:p>
-          <a:p>
-            <a:r>
-              <a:rPr lang="en-US" dirty="0" smtClean="0">
-                <a:sym typeface="Wingdings" panose="05000000000000000000" pitchFamily="2" charset="2"/>
-              </a:rPr>
-              <a:t>Commit that shit.  Log?</a:t>
-            </a:r>
-            <a:endParaRPr lang="en-US" dirty="0" smtClean="0"/>
-          </a:p>
-          <a:p>
-            <a:endParaRPr lang="en-US" dirty="0" smtClean="0"/>
+              <a:t> add . -n</a:t>
+            </a:r>
+            <a:endParaRPr lang="en-US" dirty="0"/>
           </a:p>
         </p:txBody>
       </p:sp>
+      <p:pic>
+        <p:nvPicPr>
+          <p:cNvPr id="4" name="Picture 3"/>
+          <p:cNvPicPr>
+            <a:picLocks noChangeAspect="1"/>
+          </p:cNvPicPr>
+          <p:nvPr/>
+        </p:nvPicPr>
+        <p:blipFill>
+          <a:blip r:embed="rId2"/>
+          <a:stretch>
+            <a:fillRect/>
+          </a:stretch>
+        </p:blipFill>
+        <p:spPr>
+          <a:xfrm>
+            <a:off x="5008641" y="1486939"/>
+            <a:ext cx="5499807" cy="4990767"/>
+          </a:xfrm>
+          <a:prstGeom prst="rect">
+            <a:avLst/>
+          </a:prstGeom>
+        </p:spPr>
+      </p:pic>
     </p:spTree>
     <p:extLst>
       <p:ext uri="{BB962C8B-B14F-4D97-AF65-F5344CB8AC3E}">
-        <p14:creationId xmlns:p14="http://schemas.microsoft.com/office/powerpoint/2010/main" val="4049588484"/>
+        <p14:creationId xmlns:p14="http://schemas.microsoft.com/office/powerpoint/2010/main" val="1122899036"/>
       </p:ext>
     </p:extLst>
   </p:cSld>
   <p:clrMapOvr>
     <a:masterClrMapping/>
   </p:clrMapOvr>
-  <p:timing>
-    <p:tnLst>
-      <p:par>
-        <p:cTn id="1" dur="indefinite" restart="never" nodeType="tmRoot"/>
-      </p:par>
-    </p:tnLst>
-  </p:timing>
 </p:sld>
 </file>
 
@@ -8761,154 +8514,814 @@
           <a:p>
             <a:r>
               <a:rPr lang="en-US" dirty="0" err="1" smtClean="0"/>
-              <a:t>Brænsj</a:t>
+              <a:t>Git</a:t>
+            </a:r>
+            <a:r>
+              <a:rPr lang="en-US" dirty="0" smtClean="0"/>
+              <a:t> commit</a:t>
             </a:r>
             <a:endParaRPr lang="en-US" dirty="0"/>
           </a:p>
         </p:txBody>
       </p:sp>
-      <p:sp>
-        <p:nvSpPr>
-          <p:cNvPr id="3" name="Content Placeholder 2"/>
-          <p:cNvSpPr>
-            <a:spLocks noGrp="1"/>
-          </p:cNvSpPr>
+      <p:graphicFrame>
+        <p:nvGraphicFramePr>
+          <p:cNvPr id="7" name="Content Placeholder 6"/>
+          <p:cNvGraphicFramePr>
+            <a:graphicFrameLocks noGrp="1"/>
+          </p:cNvGraphicFramePr>
           <p:nvPr>
             <p:ph idx="1"/>
+            <p:extLst>
+              <p:ext uri="{D42A27DB-BD31-4B8C-83A1-F6EECF244321}">
+                <p14:modId xmlns:p14="http://schemas.microsoft.com/office/powerpoint/2010/main" val="3793660926"/>
+              </p:ext>
+            </p:extLst>
           </p:nvPr>
-        </p:nvSpPr>
-        <p:spPr/>
-        <p:txBody>
-          <a:bodyPr/>
-          <a:lstStyle/>
-          <a:p>
-            <a:r>
-              <a:rPr lang="en-US" dirty="0" err="1" smtClean="0"/>
-              <a:t>Hva</a:t>
-            </a:r>
-            <a:r>
-              <a:rPr lang="en-US" dirty="0" smtClean="0"/>
-              <a:t> </a:t>
-            </a:r>
-            <a:r>
-              <a:rPr lang="en-US" dirty="0" err="1" smtClean="0"/>
-              <a:t>er</a:t>
-            </a:r>
-            <a:r>
-              <a:rPr lang="en-US" dirty="0" smtClean="0"/>
-              <a:t> </a:t>
-            </a:r>
-            <a:r>
-              <a:rPr lang="en-US" dirty="0" err="1" smtClean="0"/>
-              <a:t>en</a:t>
-            </a:r>
-            <a:r>
-              <a:rPr lang="en-US" dirty="0" smtClean="0"/>
-              <a:t> branch?</a:t>
-            </a:r>
-          </a:p>
-          <a:p>
-            <a:r>
-              <a:rPr lang="en-US" dirty="0" err="1" smtClean="0"/>
-              <a:t>Hvordan</a:t>
-            </a:r>
-            <a:r>
-              <a:rPr lang="en-US" dirty="0" smtClean="0"/>
-              <a:t> </a:t>
-            </a:r>
-            <a:r>
-              <a:rPr lang="en-US" dirty="0" err="1" smtClean="0"/>
-              <a:t>bruker</a:t>
-            </a:r>
-            <a:r>
-              <a:rPr lang="en-US" dirty="0" smtClean="0"/>
-              <a:t> vi </a:t>
-            </a:r>
-            <a:r>
-              <a:rPr lang="en-US" dirty="0" err="1" smtClean="0"/>
-              <a:t>en</a:t>
-            </a:r>
-            <a:r>
-              <a:rPr lang="en-US" dirty="0" smtClean="0"/>
-              <a:t> branch? </a:t>
-            </a:r>
-            <a:r>
-              <a:rPr lang="en-US" dirty="0" smtClean="0">
-                <a:sym typeface="Wingdings" panose="05000000000000000000" pitchFamily="2" charset="2"/>
-              </a:rPr>
-              <a:t> </a:t>
-            </a:r>
-            <a:r>
-              <a:rPr lang="en-US" dirty="0" err="1" smtClean="0">
-                <a:sym typeface="Wingdings" panose="05000000000000000000" pitchFamily="2" charset="2"/>
-              </a:rPr>
-              <a:t>Kommandoer</a:t>
-            </a:r>
-            <a:r>
-              <a:rPr lang="en-US" dirty="0" smtClean="0">
-                <a:sym typeface="Wingdings" panose="05000000000000000000" pitchFamily="2" charset="2"/>
-              </a:rPr>
-              <a:t>?</a:t>
-            </a:r>
-          </a:p>
-          <a:p>
-            <a:r>
-              <a:rPr lang="en-US" dirty="0" err="1" smtClean="0">
-                <a:sym typeface="Wingdings" panose="05000000000000000000" pitchFamily="2" charset="2"/>
-              </a:rPr>
-              <a:t>Slå</a:t>
-            </a:r>
-            <a:r>
-              <a:rPr lang="en-US" dirty="0" smtClean="0">
-                <a:sym typeface="Wingdings" panose="05000000000000000000" pitchFamily="2" charset="2"/>
-              </a:rPr>
-              <a:t> </a:t>
-            </a:r>
-            <a:r>
-              <a:rPr lang="en-US" dirty="0" err="1" smtClean="0">
-                <a:sym typeface="Wingdings" panose="05000000000000000000" pitchFamily="2" charset="2"/>
-              </a:rPr>
-              <a:t>sammen</a:t>
-            </a:r>
-            <a:r>
-              <a:rPr lang="en-US" dirty="0" smtClean="0">
-                <a:sym typeface="Wingdings" panose="05000000000000000000" pitchFamily="2" charset="2"/>
-              </a:rPr>
-              <a:t> </a:t>
-            </a:r>
-            <a:r>
-              <a:rPr lang="en-US" dirty="0" err="1" smtClean="0">
-                <a:sym typeface="Wingdings" panose="05000000000000000000" pitchFamily="2" charset="2"/>
-              </a:rPr>
-              <a:t>brancher</a:t>
-            </a:r>
-            <a:r>
-              <a:rPr lang="en-US" dirty="0" smtClean="0">
-                <a:sym typeface="Wingdings" panose="05000000000000000000" pitchFamily="2" charset="2"/>
-              </a:rPr>
-              <a:t>  Merge?</a:t>
-            </a:r>
-            <a:endParaRPr lang="en-US" dirty="0"/>
-          </a:p>
-        </p:txBody>
-      </p:sp>
+        </p:nvGraphicFramePr>
+        <p:xfrm>
+          <a:off x="8570420" y="2171699"/>
+          <a:ext cx="3092336" cy="2194560"/>
+        </p:xfrm>
+        <a:graphic>
+          <a:graphicData uri="http://schemas.openxmlformats.org/drawingml/2006/table">
+            <a:tbl>
+              <a:tblPr firstRow="1" bandRow="1">
+                <a:tableStyleId>{5C22544A-7EE6-4342-B048-85BDC9FD1C3A}</a:tableStyleId>
+              </a:tblPr>
+              <a:tblGrid>
+                <a:gridCol w="1546168">
+                  <a:extLst>
+                    <a:ext uri="{9D8B030D-6E8A-4147-A177-3AD203B41FA5}">
+                      <a16:colId xmlns:a16="http://schemas.microsoft.com/office/drawing/2014/main" val="2557350480"/>
+                    </a:ext>
+                  </a:extLst>
+                </a:gridCol>
+                <a:gridCol w="1546168">
+                  <a:extLst>
+                    <a:ext uri="{9D8B030D-6E8A-4147-A177-3AD203B41FA5}">
+                      <a16:colId xmlns:a16="http://schemas.microsoft.com/office/drawing/2014/main" val="1661458923"/>
+                    </a:ext>
+                  </a:extLst>
+                </a:gridCol>
+              </a:tblGrid>
+              <a:tr h="361488">
+                <a:tc>
+                  <a:txBody>
+                    <a:bodyPr/>
+                    <a:lstStyle/>
+                    <a:p>
+                      <a:r>
+                        <a:rPr lang="en-US" dirty="0" smtClean="0"/>
+                        <a:t>Commit</a:t>
+                      </a:r>
+                      <a:endParaRPr lang="en-US" dirty="0"/>
+                    </a:p>
+                  </a:txBody>
+                  <a:tcPr/>
+                </a:tc>
+                <a:tc>
+                  <a:txBody>
+                    <a:bodyPr/>
+                    <a:lstStyle/>
+                    <a:p>
+                      <a:r>
+                        <a:rPr lang="en-US" dirty="0" smtClean="0"/>
+                        <a:t>Size</a:t>
+                      </a:r>
+                      <a:endParaRPr lang="en-US" dirty="0"/>
+                    </a:p>
+                  </a:txBody>
+                  <a:tcPr/>
+                </a:tc>
+                <a:extLst>
+                  <a:ext uri="{0D108BD9-81ED-4DB2-BD59-A6C34878D82A}">
+                    <a16:rowId xmlns:a16="http://schemas.microsoft.com/office/drawing/2014/main" val="17792059"/>
+                  </a:ext>
+                </a:extLst>
+              </a:tr>
+              <a:tr h="361488">
+                <a:tc>
+                  <a:txBody>
+                    <a:bodyPr/>
+                    <a:lstStyle/>
+                    <a:p>
+                      <a:r>
+                        <a:rPr lang="en-US" dirty="0" smtClean="0"/>
+                        <a:t>Tree</a:t>
+                      </a:r>
+                      <a:endParaRPr lang="en-US" dirty="0"/>
+                    </a:p>
+                  </a:txBody>
+                  <a:tcPr/>
+                </a:tc>
+                <a:tc>
+                  <a:txBody>
+                    <a:bodyPr/>
+                    <a:lstStyle/>
+                    <a:p>
+                      <a:r>
+                        <a:rPr lang="en-US" dirty="0" smtClean="0"/>
+                        <a:t>C12g7</a:t>
+                      </a:r>
+                      <a:endParaRPr lang="en-US" dirty="0"/>
+                    </a:p>
+                  </a:txBody>
+                  <a:tcPr/>
+                </a:tc>
+                <a:extLst>
+                  <a:ext uri="{0D108BD9-81ED-4DB2-BD59-A6C34878D82A}">
+                    <a16:rowId xmlns:a16="http://schemas.microsoft.com/office/drawing/2014/main" val="759684523"/>
+                  </a:ext>
+                </a:extLst>
+              </a:tr>
+              <a:tr h="361488">
+                <a:tc>
+                  <a:txBody>
+                    <a:bodyPr/>
+                    <a:lstStyle/>
+                    <a:p>
+                      <a:r>
+                        <a:rPr lang="en-US" dirty="0" smtClean="0"/>
+                        <a:t>Parent</a:t>
+                      </a:r>
+                      <a:endParaRPr lang="en-US" dirty="0"/>
+                    </a:p>
+                  </a:txBody>
+                  <a:tcPr/>
+                </a:tc>
+                <a:tc>
+                  <a:txBody>
+                    <a:bodyPr/>
+                    <a:lstStyle/>
+                    <a:p>
+                      <a:r>
+                        <a:rPr lang="en-US" dirty="0" smtClean="0"/>
+                        <a:t>C4ec5</a:t>
+                      </a:r>
+                      <a:endParaRPr lang="en-US" dirty="0"/>
+                    </a:p>
+                  </a:txBody>
+                  <a:tcPr/>
+                </a:tc>
+                <a:extLst>
+                  <a:ext uri="{0D108BD9-81ED-4DB2-BD59-A6C34878D82A}">
+                    <a16:rowId xmlns:a16="http://schemas.microsoft.com/office/drawing/2014/main" val="1283523728"/>
+                  </a:ext>
+                </a:extLst>
+              </a:tr>
+              <a:tr h="361488">
+                <a:tc>
+                  <a:txBody>
+                    <a:bodyPr/>
+                    <a:lstStyle/>
+                    <a:p>
+                      <a:r>
+                        <a:rPr lang="en-US" dirty="0" smtClean="0"/>
+                        <a:t>Author</a:t>
+                      </a:r>
+                      <a:endParaRPr lang="en-US" dirty="0"/>
+                    </a:p>
+                  </a:txBody>
+                  <a:tcPr/>
+                </a:tc>
+                <a:tc>
+                  <a:txBody>
+                    <a:bodyPr/>
+                    <a:lstStyle/>
+                    <a:p>
+                      <a:r>
+                        <a:rPr lang="en-US" dirty="0" smtClean="0"/>
+                        <a:t>Ulrik </a:t>
+                      </a:r>
+                      <a:endParaRPr lang="en-US" dirty="0"/>
+                    </a:p>
+                  </a:txBody>
+                  <a:tcPr/>
+                </a:tc>
+                <a:extLst>
+                  <a:ext uri="{0D108BD9-81ED-4DB2-BD59-A6C34878D82A}">
+                    <a16:rowId xmlns:a16="http://schemas.microsoft.com/office/drawing/2014/main" val="3504923733"/>
+                  </a:ext>
+                </a:extLst>
+              </a:tr>
+              <a:tr h="361488">
+                <a:tc>
+                  <a:txBody>
+                    <a:bodyPr/>
+                    <a:lstStyle/>
+                    <a:p>
+                      <a:r>
+                        <a:rPr lang="en-US" dirty="0" err="1" smtClean="0"/>
+                        <a:t>Comitter</a:t>
+                      </a:r>
+                      <a:endParaRPr lang="en-US" dirty="0"/>
+                    </a:p>
+                  </a:txBody>
+                  <a:tcPr/>
+                </a:tc>
+                <a:tc>
+                  <a:txBody>
+                    <a:bodyPr/>
+                    <a:lstStyle/>
+                    <a:p>
+                      <a:r>
+                        <a:rPr lang="en-US" dirty="0" smtClean="0"/>
+                        <a:t>Ulrik</a:t>
+                      </a:r>
+                      <a:endParaRPr lang="en-US" dirty="0"/>
+                    </a:p>
+                  </a:txBody>
+                  <a:tcPr/>
+                </a:tc>
+                <a:extLst>
+                  <a:ext uri="{0D108BD9-81ED-4DB2-BD59-A6C34878D82A}">
+                    <a16:rowId xmlns:a16="http://schemas.microsoft.com/office/drawing/2014/main" val="3390638804"/>
+                  </a:ext>
+                </a:extLst>
+              </a:tr>
+              <a:tr h="361488">
+                <a:tc gridSpan="2">
+                  <a:txBody>
+                    <a:bodyPr/>
+                    <a:lstStyle/>
+                    <a:p>
+                      <a:r>
+                        <a:rPr lang="en-US" dirty="0" smtClean="0"/>
+                        <a:t>“I</a:t>
+                      </a:r>
+                      <a:r>
+                        <a:rPr lang="en-US" baseline="0" dirty="0" smtClean="0"/>
+                        <a:t> am a commit message!”</a:t>
+                      </a:r>
+                      <a:endParaRPr lang="en-US" dirty="0"/>
+                    </a:p>
+                  </a:txBody>
+                  <a:tcPr/>
+                </a:tc>
+                <a:tc hMerge="1">
+                  <a:txBody>
+                    <a:bodyPr/>
+                    <a:lstStyle/>
+                    <a:p>
+                      <a:endParaRPr lang="en-US" dirty="0"/>
+                    </a:p>
+                  </a:txBody>
+                  <a:tcPr/>
+                </a:tc>
+                <a:extLst>
+                  <a:ext uri="{0D108BD9-81ED-4DB2-BD59-A6C34878D82A}">
+                    <a16:rowId xmlns:a16="http://schemas.microsoft.com/office/drawing/2014/main" val="2246327780"/>
+                  </a:ext>
+                </a:extLst>
+              </a:tr>
+            </a:tbl>
+          </a:graphicData>
+        </a:graphic>
+      </p:graphicFrame>
+      <p:graphicFrame>
+        <p:nvGraphicFramePr>
+          <p:cNvPr id="8" name="Content Placeholder 6"/>
+          <p:cNvGraphicFramePr>
+            <a:graphicFrameLocks/>
+          </p:cNvGraphicFramePr>
+          <p:nvPr>
+            <p:extLst>
+              <p:ext uri="{D42A27DB-BD31-4B8C-83A1-F6EECF244321}">
+                <p14:modId xmlns:p14="http://schemas.microsoft.com/office/powerpoint/2010/main" val="1379670907"/>
+              </p:ext>
+            </p:extLst>
+          </p:nvPr>
+        </p:nvGraphicFramePr>
+        <p:xfrm>
+          <a:off x="4707774" y="2173776"/>
+          <a:ext cx="3406834" cy="2194560"/>
+        </p:xfrm>
+        <a:graphic>
+          <a:graphicData uri="http://schemas.openxmlformats.org/drawingml/2006/table">
+            <a:tbl>
+              <a:tblPr firstRow="1" bandRow="1">
+                <a:tableStyleId>{5C22544A-7EE6-4342-B048-85BDC9FD1C3A}</a:tableStyleId>
+              </a:tblPr>
+              <a:tblGrid>
+                <a:gridCol w="1703417">
+                  <a:extLst>
+                    <a:ext uri="{9D8B030D-6E8A-4147-A177-3AD203B41FA5}">
+                      <a16:colId xmlns:a16="http://schemas.microsoft.com/office/drawing/2014/main" val="2557350480"/>
+                    </a:ext>
+                  </a:extLst>
+                </a:gridCol>
+                <a:gridCol w="1703417">
+                  <a:extLst>
+                    <a:ext uri="{9D8B030D-6E8A-4147-A177-3AD203B41FA5}">
+                      <a16:colId xmlns:a16="http://schemas.microsoft.com/office/drawing/2014/main" val="1661458923"/>
+                    </a:ext>
+                  </a:extLst>
+                </a:gridCol>
+              </a:tblGrid>
+              <a:tr h="361488">
+                <a:tc>
+                  <a:txBody>
+                    <a:bodyPr/>
+                    <a:lstStyle/>
+                    <a:p>
+                      <a:r>
+                        <a:rPr lang="en-US" dirty="0" smtClean="0"/>
+                        <a:t>Commit</a:t>
+                      </a:r>
+                      <a:endParaRPr lang="en-US" dirty="0"/>
+                    </a:p>
+                  </a:txBody>
+                  <a:tcPr/>
+                </a:tc>
+                <a:tc>
+                  <a:txBody>
+                    <a:bodyPr/>
+                    <a:lstStyle/>
+                    <a:p>
+                      <a:r>
+                        <a:rPr lang="en-US" dirty="0" smtClean="0"/>
+                        <a:t>Size</a:t>
+                      </a:r>
+                      <a:endParaRPr lang="en-US" dirty="0"/>
+                    </a:p>
+                  </a:txBody>
+                  <a:tcPr/>
+                </a:tc>
+                <a:extLst>
+                  <a:ext uri="{0D108BD9-81ED-4DB2-BD59-A6C34878D82A}">
+                    <a16:rowId xmlns:a16="http://schemas.microsoft.com/office/drawing/2014/main" val="17792059"/>
+                  </a:ext>
+                </a:extLst>
+              </a:tr>
+              <a:tr h="361488">
+                <a:tc>
+                  <a:txBody>
+                    <a:bodyPr/>
+                    <a:lstStyle/>
+                    <a:p>
+                      <a:r>
+                        <a:rPr lang="en-US" dirty="0" smtClean="0"/>
+                        <a:t>Tree</a:t>
+                      </a:r>
+                      <a:endParaRPr lang="en-US" dirty="0"/>
+                    </a:p>
+                  </a:txBody>
+                  <a:tcPr/>
+                </a:tc>
+                <a:tc>
+                  <a:txBody>
+                    <a:bodyPr/>
+                    <a:lstStyle/>
+                    <a:p>
+                      <a:r>
+                        <a:rPr lang="en-US" dirty="0" smtClean="0"/>
+                        <a:t>C4ec5</a:t>
+                      </a:r>
+                      <a:endParaRPr lang="en-US" dirty="0"/>
+                    </a:p>
+                  </a:txBody>
+                  <a:tcPr/>
+                </a:tc>
+                <a:extLst>
+                  <a:ext uri="{0D108BD9-81ED-4DB2-BD59-A6C34878D82A}">
+                    <a16:rowId xmlns:a16="http://schemas.microsoft.com/office/drawing/2014/main" val="759684523"/>
+                  </a:ext>
+                </a:extLst>
+              </a:tr>
+              <a:tr h="361488">
+                <a:tc>
+                  <a:txBody>
+                    <a:bodyPr/>
+                    <a:lstStyle/>
+                    <a:p>
+                      <a:r>
+                        <a:rPr lang="en-US" dirty="0" smtClean="0"/>
+                        <a:t>Parent</a:t>
+                      </a:r>
+                      <a:endParaRPr lang="en-US" dirty="0"/>
+                    </a:p>
+                  </a:txBody>
+                  <a:tcPr/>
+                </a:tc>
+                <a:tc>
+                  <a:txBody>
+                    <a:bodyPr/>
+                    <a:lstStyle/>
+                    <a:p>
+                      <a:r>
+                        <a:rPr lang="en-US" dirty="0" smtClean="0"/>
+                        <a:t>C4e69</a:t>
+                      </a:r>
+                      <a:endParaRPr lang="en-US" dirty="0"/>
+                    </a:p>
+                  </a:txBody>
+                  <a:tcPr/>
+                </a:tc>
+                <a:extLst>
+                  <a:ext uri="{0D108BD9-81ED-4DB2-BD59-A6C34878D82A}">
+                    <a16:rowId xmlns:a16="http://schemas.microsoft.com/office/drawing/2014/main" val="1283523728"/>
+                  </a:ext>
+                </a:extLst>
+              </a:tr>
+              <a:tr h="361488">
+                <a:tc>
+                  <a:txBody>
+                    <a:bodyPr/>
+                    <a:lstStyle/>
+                    <a:p>
+                      <a:r>
+                        <a:rPr lang="en-US" dirty="0" smtClean="0"/>
+                        <a:t>Author</a:t>
+                      </a:r>
+                      <a:endParaRPr lang="en-US" dirty="0"/>
+                    </a:p>
+                  </a:txBody>
+                  <a:tcPr/>
+                </a:tc>
+                <a:tc>
+                  <a:txBody>
+                    <a:bodyPr/>
+                    <a:lstStyle/>
+                    <a:p>
+                      <a:r>
+                        <a:rPr lang="en-US" dirty="0" smtClean="0"/>
+                        <a:t>Ulrik </a:t>
+                      </a:r>
+                      <a:endParaRPr lang="en-US" dirty="0"/>
+                    </a:p>
+                  </a:txBody>
+                  <a:tcPr/>
+                </a:tc>
+                <a:extLst>
+                  <a:ext uri="{0D108BD9-81ED-4DB2-BD59-A6C34878D82A}">
+                    <a16:rowId xmlns:a16="http://schemas.microsoft.com/office/drawing/2014/main" val="3504923733"/>
+                  </a:ext>
+                </a:extLst>
+              </a:tr>
+              <a:tr h="361488">
+                <a:tc>
+                  <a:txBody>
+                    <a:bodyPr/>
+                    <a:lstStyle/>
+                    <a:p>
+                      <a:r>
+                        <a:rPr lang="en-US" dirty="0" err="1" smtClean="0"/>
+                        <a:t>Comitter</a:t>
+                      </a:r>
+                      <a:endParaRPr lang="en-US" dirty="0"/>
+                    </a:p>
+                  </a:txBody>
+                  <a:tcPr/>
+                </a:tc>
+                <a:tc>
+                  <a:txBody>
+                    <a:bodyPr/>
+                    <a:lstStyle/>
+                    <a:p>
+                      <a:r>
+                        <a:rPr lang="en-US" dirty="0" smtClean="0"/>
+                        <a:t>Ulrik</a:t>
+                      </a:r>
+                      <a:endParaRPr lang="en-US" dirty="0"/>
+                    </a:p>
+                  </a:txBody>
+                  <a:tcPr/>
+                </a:tc>
+                <a:extLst>
+                  <a:ext uri="{0D108BD9-81ED-4DB2-BD59-A6C34878D82A}">
+                    <a16:rowId xmlns:a16="http://schemas.microsoft.com/office/drawing/2014/main" val="3390638804"/>
+                  </a:ext>
+                </a:extLst>
+              </a:tr>
+              <a:tr h="361488">
+                <a:tc gridSpan="2">
+                  <a:txBody>
+                    <a:bodyPr/>
+                    <a:lstStyle/>
+                    <a:p>
+                      <a:r>
+                        <a:rPr lang="en-US" dirty="0" smtClean="0"/>
+                        <a:t>“I</a:t>
+                      </a:r>
+                      <a:r>
+                        <a:rPr lang="en-US" baseline="0" dirty="0" smtClean="0"/>
+                        <a:t> am a commit message!”</a:t>
+                      </a:r>
+                      <a:endParaRPr lang="en-US" dirty="0"/>
+                    </a:p>
+                  </a:txBody>
+                  <a:tcPr/>
+                </a:tc>
+                <a:tc hMerge="1">
+                  <a:txBody>
+                    <a:bodyPr/>
+                    <a:lstStyle/>
+                    <a:p>
+                      <a:endParaRPr lang="en-US" dirty="0"/>
+                    </a:p>
+                  </a:txBody>
+                  <a:tcPr/>
+                </a:tc>
+                <a:extLst>
+                  <a:ext uri="{0D108BD9-81ED-4DB2-BD59-A6C34878D82A}">
+                    <a16:rowId xmlns:a16="http://schemas.microsoft.com/office/drawing/2014/main" val="2246327780"/>
+                  </a:ext>
+                </a:extLst>
+              </a:tr>
+            </a:tbl>
+          </a:graphicData>
+        </a:graphic>
+      </p:graphicFrame>
+      <p:graphicFrame>
+        <p:nvGraphicFramePr>
+          <p:cNvPr id="9" name="Content Placeholder 6"/>
+          <p:cNvGraphicFramePr>
+            <a:graphicFrameLocks/>
+          </p:cNvGraphicFramePr>
+          <p:nvPr>
+            <p:extLst>
+              <p:ext uri="{D42A27DB-BD31-4B8C-83A1-F6EECF244321}">
+                <p14:modId xmlns:p14="http://schemas.microsoft.com/office/powerpoint/2010/main" val="3635724817"/>
+              </p:ext>
+            </p:extLst>
+          </p:nvPr>
+        </p:nvGraphicFramePr>
+        <p:xfrm>
+          <a:off x="915788" y="2171699"/>
+          <a:ext cx="3336174" cy="1828800"/>
+        </p:xfrm>
+        <a:graphic>
+          <a:graphicData uri="http://schemas.openxmlformats.org/drawingml/2006/table">
+            <a:tbl>
+              <a:tblPr firstRow="1" bandRow="1">
+                <a:tableStyleId>{5C22544A-7EE6-4342-B048-85BDC9FD1C3A}</a:tableStyleId>
+              </a:tblPr>
+              <a:tblGrid>
+                <a:gridCol w="1668087">
+                  <a:extLst>
+                    <a:ext uri="{9D8B030D-6E8A-4147-A177-3AD203B41FA5}">
+                      <a16:colId xmlns:a16="http://schemas.microsoft.com/office/drawing/2014/main" val="2557350480"/>
+                    </a:ext>
+                  </a:extLst>
+                </a:gridCol>
+                <a:gridCol w="1668087">
+                  <a:extLst>
+                    <a:ext uri="{9D8B030D-6E8A-4147-A177-3AD203B41FA5}">
+                      <a16:colId xmlns:a16="http://schemas.microsoft.com/office/drawing/2014/main" val="1661458923"/>
+                    </a:ext>
+                  </a:extLst>
+                </a:gridCol>
+              </a:tblGrid>
+              <a:tr h="360565">
+                <a:tc>
+                  <a:txBody>
+                    <a:bodyPr/>
+                    <a:lstStyle/>
+                    <a:p>
+                      <a:r>
+                        <a:rPr lang="en-US" dirty="0" smtClean="0"/>
+                        <a:t>Commit</a:t>
+                      </a:r>
+                      <a:endParaRPr lang="en-US" dirty="0"/>
+                    </a:p>
+                  </a:txBody>
+                  <a:tcPr/>
+                </a:tc>
+                <a:tc>
+                  <a:txBody>
+                    <a:bodyPr/>
+                    <a:lstStyle/>
+                    <a:p>
+                      <a:r>
+                        <a:rPr lang="en-US" dirty="0" smtClean="0"/>
+                        <a:t>Size</a:t>
+                      </a:r>
+                      <a:endParaRPr lang="en-US" dirty="0"/>
+                    </a:p>
+                  </a:txBody>
+                  <a:tcPr/>
+                </a:tc>
+                <a:extLst>
+                  <a:ext uri="{0D108BD9-81ED-4DB2-BD59-A6C34878D82A}">
+                    <a16:rowId xmlns:a16="http://schemas.microsoft.com/office/drawing/2014/main" val="17792059"/>
+                  </a:ext>
+                </a:extLst>
+              </a:tr>
+              <a:tr h="360565">
+                <a:tc>
+                  <a:txBody>
+                    <a:bodyPr/>
+                    <a:lstStyle/>
+                    <a:p>
+                      <a:r>
+                        <a:rPr lang="en-US" dirty="0" smtClean="0"/>
+                        <a:t>Tree</a:t>
+                      </a:r>
+                      <a:endParaRPr lang="en-US" dirty="0"/>
+                    </a:p>
+                  </a:txBody>
+                  <a:tcPr/>
+                </a:tc>
+                <a:tc>
+                  <a:txBody>
+                    <a:bodyPr/>
+                    <a:lstStyle/>
+                    <a:p>
+                      <a:r>
+                        <a:rPr lang="en-US" dirty="0" smtClean="0"/>
+                        <a:t>C4e69</a:t>
+                      </a:r>
+                      <a:endParaRPr lang="en-US" dirty="0"/>
+                    </a:p>
+                  </a:txBody>
+                  <a:tcPr/>
+                </a:tc>
+                <a:extLst>
+                  <a:ext uri="{0D108BD9-81ED-4DB2-BD59-A6C34878D82A}">
+                    <a16:rowId xmlns:a16="http://schemas.microsoft.com/office/drawing/2014/main" val="759684523"/>
+                  </a:ext>
+                </a:extLst>
+              </a:tr>
+              <a:tr h="360565">
+                <a:tc>
+                  <a:txBody>
+                    <a:bodyPr/>
+                    <a:lstStyle/>
+                    <a:p>
+                      <a:r>
+                        <a:rPr lang="en-US" dirty="0" smtClean="0"/>
+                        <a:t>Author</a:t>
+                      </a:r>
+                      <a:endParaRPr lang="en-US" dirty="0"/>
+                    </a:p>
+                  </a:txBody>
+                  <a:tcPr/>
+                </a:tc>
+                <a:tc>
+                  <a:txBody>
+                    <a:bodyPr/>
+                    <a:lstStyle/>
+                    <a:p>
+                      <a:r>
+                        <a:rPr lang="en-US" dirty="0" smtClean="0"/>
+                        <a:t>Ulrik </a:t>
+                      </a:r>
+                      <a:endParaRPr lang="en-US" dirty="0"/>
+                    </a:p>
+                  </a:txBody>
+                  <a:tcPr/>
+                </a:tc>
+                <a:extLst>
+                  <a:ext uri="{0D108BD9-81ED-4DB2-BD59-A6C34878D82A}">
+                    <a16:rowId xmlns:a16="http://schemas.microsoft.com/office/drawing/2014/main" val="3504923733"/>
+                  </a:ext>
+                </a:extLst>
+              </a:tr>
+              <a:tr h="360565">
+                <a:tc>
+                  <a:txBody>
+                    <a:bodyPr/>
+                    <a:lstStyle/>
+                    <a:p>
+                      <a:r>
+                        <a:rPr lang="en-US" dirty="0" err="1" smtClean="0"/>
+                        <a:t>Comitter</a:t>
+                      </a:r>
+                      <a:endParaRPr lang="en-US" dirty="0"/>
+                    </a:p>
+                  </a:txBody>
+                  <a:tcPr/>
+                </a:tc>
+                <a:tc>
+                  <a:txBody>
+                    <a:bodyPr/>
+                    <a:lstStyle/>
+                    <a:p>
+                      <a:r>
+                        <a:rPr lang="en-US" dirty="0" smtClean="0"/>
+                        <a:t>Ulrik</a:t>
+                      </a:r>
+                      <a:endParaRPr lang="en-US" dirty="0"/>
+                    </a:p>
+                  </a:txBody>
+                  <a:tcPr/>
+                </a:tc>
+                <a:extLst>
+                  <a:ext uri="{0D108BD9-81ED-4DB2-BD59-A6C34878D82A}">
+                    <a16:rowId xmlns:a16="http://schemas.microsoft.com/office/drawing/2014/main" val="3390638804"/>
+                  </a:ext>
+                </a:extLst>
+              </a:tr>
+              <a:tr h="360565">
+                <a:tc gridSpan="2">
+                  <a:txBody>
+                    <a:bodyPr/>
+                    <a:lstStyle/>
+                    <a:p>
+                      <a:r>
+                        <a:rPr lang="en-US" dirty="0" smtClean="0"/>
+                        <a:t>“Initial</a:t>
+                      </a:r>
+                      <a:r>
+                        <a:rPr lang="en-US" baseline="0" dirty="0" smtClean="0"/>
+                        <a:t> commit!”</a:t>
+                      </a:r>
+                      <a:endParaRPr lang="en-US" dirty="0"/>
+                    </a:p>
+                  </a:txBody>
+                  <a:tcPr/>
+                </a:tc>
+                <a:tc hMerge="1">
+                  <a:txBody>
+                    <a:bodyPr/>
+                    <a:lstStyle/>
+                    <a:p>
+                      <a:endParaRPr lang="en-US" dirty="0"/>
+                    </a:p>
+                  </a:txBody>
+                  <a:tcPr/>
+                </a:tc>
+                <a:extLst>
+                  <a:ext uri="{0D108BD9-81ED-4DB2-BD59-A6C34878D82A}">
+                    <a16:rowId xmlns:a16="http://schemas.microsoft.com/office/drawing/2014/main" val="2246327780"/>
+                  </a:ext>
+                </a:extLst>
+              </a:tr>
+            </a:tbl>
+          </a:graphicData>
+        </a:graphic>
+      </p:graphicFrame>
+      <p:cxnSp>
+        <p:nvCxnSpPr>
+          <p:cNvPr id="13" name="Straight Connector 12"/>
+          <p:cNvCxnSpPr/>
+          <p:nvPr/>
+        </p:nvCxnSpPr>
+        <p:spPr>
+          <a:xfrm flipH="1" flipV="1">
+            <a:off x="4380807" y="2793076"/>
+            <a:ext cx="249382" cy="293023"/>
+          </a:xfrm>
+          <a:prstGeom prst="line">
+            <a:avLst/>
+          </a:prstGeom>
+        </p:spPr>
+        <p:style>
+          <a:lnRef idx="1">
+            <a:schemeClr val="accent1"/>
+          </a:lnRef>
+          <a:fillRef idx="0">
+            <a:schemeClr val="accent1"/>
+          </a:fillRef>
+          <a:effectRef idx="0">
+            <a:schemeClr val="accent1"/>
+          </a:effectRef>
+          <a:fontRef idx="minor">
+            <a:schemeClr val="tx1"/>
+          </a:fontRef>
+        </p:style>
+      </p:cxnSp>
+      <p:cxnSp>
+        <p:nvCxnSpPr>
+          <p:cNvPr id="15" name="Straight Connector 14"/>
+          <p:cNvCxnSpPr/>
+          <p:nvPr/>
+        </p:nvCxnSpPr>
+        <p:spPr>
+          <a:xfrm flipH="1" flipV="1">
+            <a:off x="8192193" y="2793076"/>
+            <a:ext cx="270164" cy="293023"/>
+          </a:xfrm>
+          <a:prstGeom prst="line">
+            <a:avLst/>
+          </a:prstGeom>
+        </p:spPr>
+        <p:style>
+          <a:lnRef idx="1">
+            <a:schemeClr val="accent1"/>
+          </a:lnRef>
+          <a:fillRef idx="0">
+            <a:schemeClr val="accent1"/>
+          </a:fillRef>
+          <a:effectRef idx="0">
+            <a:schemeClr val="accent1"/>
+          </a:effectRef>
+          <a:fontRef idx="minor">
+            <a:schemeClr val="tx1"/>
+          </a:fontRef>
+        </p:style>
+      </p:cxnSp>
     </p:spTree>
     <p:extLst>
       <p:ext uri="{BB962C8B-B14F-4D97-AF65-F5344CB8AC3E}">
-        <p14:creationId xmlns:p14="http://schemas.microsoft.com/office/powerpoint/2010/main" val="3030663113"/>
+        <p14:creationId xmlns:p14="http://schemas.microsoft.com/office/powerpoint/2010/main" val="3227288705"/>
       </p:ext>
     </p:extLst>
   </p:cSld>
   <p:clrMapOvr>
     <a:masterClrMapping/>
   </p:clrMapOvr>
-  <p:timing>
-    <p:tnLst>
-      <p:par>
-        <p:cTn id="1" dur="indefinite" restart="never" nodeType="tmRoot"/>
-      </p:par>
-    </p:tnLst>
-  </p:timing>
 </p:sld>
 </file>
 
@@ -8929,9 +9342,37 @@
           <a:chExt cx="0" cy="0"/>
         </a:xfrm>
       </p:grpSpPr>
+      <p:sp>
+        <p:nvSpPr>
+          <p:cNvPr id="2" name="Title 1"/>
+          <p:cNvSpPr>
+            <a:spLocks noGrp="1"/>
+          </p:cNvSpPr>
+          <p:nvPr>
+            <p:ph type="title"/>
+          </p:nvPr>
+        </p:nvSpPr>
+        <p:spPr>
+          <a:xfrm>
+            <a:off x="1396538" y="685800"/>
+            <a:ext cx="9601200" cy="1485900"/>
+          </a:xfrm>
+        </p:spPr>
+        <p:txBody>
+          <a:bodyPr/>
+          <a:lstStyle/>
+          <a:p>
+            <a:r>
+              <a:rPr lang="en-US" dirty="0" smtClean="0"/>
+              <a:t>Add, Stage, Commit, Checkout</a:t>
+            </a:r>
+            <a:endParaRPr lang="en-US" dirty="0"/>
+          </a:p>
+        </p:txBody>
+      </p:sp>
       <p:pic>
         <p:nvPicPr>
-          <p:cNvPr id="5" name="Picture 4"/>
+          <p:cNvPr id="6" name="Picture 5"/>
           <p:cNvPicPr>
             <a:picLocks noChangeAspect="1"/>
           </p:cNvPicPr>
@@ -8945,8 +9386,128 @@
         </p:blipFill>
         <p:spPr>
           <a:xfrm>
-            <a:off x="3341119" y="282542"/>
-            <a:ext cx="5343507" cy="6348334"/>
+            <a:off x="1665821" y="1687484"/>
+            <a:ext cx="1777913" cy="3994567"/>
+          </a:xfrm>
+          <a:prstGeom prst="rect">
+            <a:avLst/>
+          </a:prstGeom>
+        </p:spPr>
+      </p:pic>
+      <p:pic>
+        <p:nvPicPr>
+          <p:cNvPr id="7" name="Picture 6"/>
+          <p:cNvPicPr>
+            <a:picLocks noChangeAspect="1"/>
+          </p:cNvPicPr>
+          <p:nvPr/>
+        </p:nvPicPr>
+        <p:blipFill>
+          <a:blip r:embed="rId3"/>
+          <a:stretch>
+            <a:fillRect/>
+          </a:stretch>
+        </p:blipFill>
+        <p:spPr>
+          <a:xfrm>
+            <a:off x="5177948" y="1687484"/>
+            <a:ext cx="1777913" cy="3994567"/>
+          </a:xfrm>
+          <a:prstGeom prst="rect">
+            <a:avLst/>
+          </a:prstGeom>
+        </p:spPr>
+      </p:pic>
+      <p:pic>
+        <p:nvPicPr>
+          <p:cNvPr id="8" name="Picture 7"/>
+          <p:cNvPicPr>
+            <a:picLocks noChangeAspect="1"/>
+          </p:cNvPicPr>
+          <p:nvPr/>
+        </p:nvPicPr>
+        <p:blipFill>
+          <a:blip r:embed="rId4"/>
+          <a:stretch>
+            <a:fillRect/>
+          </a:stretch>
+        </p:blipFill>
+        <p:spPr>
+          <a:xfrm>
+            <a:off x="8690075" y="1687484"/>
+            <a:ext cx="1777913" cy="3994567"/>
+          </a:xfrm>
+          <a:prstGeom prst="rect">
+            <a:avLst/>
+          </a:prstGeom>
+        </p:spPr>
+      </p:pic>
+      <p:pic>
+        <p:nvPicPr>
+          <p:cNvPr id="9" name="Picture 8"/>
+          <p:cNvPicPr>
+            <a:picLocks noChangeAspect="1"/>
+          </p:cNvPicPr>
+          <p:nvPr/>
+        </p:nvPicPr>
+        <p:blipFill>
+          <a:blip r:embed="rId5"/>
+          <a:stretch>
+            <a:fillRect/>
+          </a:stretch>
+        </p:blipFill>
+        <p:spPr>
+          <a:xfrm>
+            <a:off x="2664010" y="3173384"/>
+            <a:ext cx="1211325" cy="839933"/>
+          </a:xfrm>
+          <a:prstGeom prst="rect">
+            <a:avLst/>
+          </a:prstGeom>
+        </p:spPr>
+      </p:pic>
+      <p:pic>
+        <p:nvPicPr>
+          <p:cNvPr id="10" name="Picture 9"/>
+          <p:cNvPicPr>
+            <a:picLocks noChangeAspect="1"/>
+          </p:cNvPicPr>
+          <p:nvPr/>
+        </p:nvPicPr>
+        <p:blipFill>
+          <a:blip r:embed="rId5"/>
+          <a:stretch>
+            <a:fillRect/>
+          </a:stretch>
+        </p:blipFill>
+        <p:spPr>
+          <a:xfrm>
+            <a:off x="6197138" y="3840305"/>
+            <a:ext cx="1211325" cy="839933"/>
+          </a:xfrm>
+          <a:prstGeom prst="rect">
+            <a:avLst/>
+          </a:prstGeom>
+        </p:spPr>
+      </p:pic>
+      <p:pic>
+        <p:nvPicPr>
+          <p:cNvPr id="11" name="Picture 10"/>
+          <p:cNvPicPr>
+            <a:picLocks noChangeAspect="1"/>
+          </p:cNvPicPr>
+          <p:nvPr/>
+        </p:nvPicPr>
+        <p:blipFill>
+          <a:blip r:embed="rId6"/>
+          <a:stretch>
+            <a:fillRect/>
+          </a:stretch>
+        </p:blipFill>
+        <p:spPr>
+          <a:xfrm>
+            <a:off x="4057781" y="4841989"/>
+            <a:ext cx="5490038" cy="839933"/>
           </a:xfrm>
           <a:prstGeom prst="rect">
             <a:avLst/>
@@ -8956,7 +9517,7 @@
     </p:spTree>
     <p:extLst>
       <p:ext uri="{BB962C8B-B14F-4D97-AF65-F5344CB8AC3E}">
-        <p14:creationId xmlns:p14="http://schemas.microsoft.com/office/powerpoint/2010/main" val="2166476444"/>
+        <p14:creationId xmlns:p14="http://schemas.microsoft.com/office/powerpoint/2010/main" val="881955558"/>
       </p:ext>
     </p:extLst>
   </p:cSld>
@@ -8966,7 +9527,312 @@
   <p:timing>
     <p:tnLst>
       <p:par>
-        <p:cTn id="1" dur="indefinite" restart="never" nodeType="tmRoot"/>
+        <p:cTn id="1" dur="indefinite" restart="never" nodeType="tmRoot">
+          <p:childTnLst>
+            <p:seq concurrent="1" nextAc="seek">
+              <p:cTn id="2" dur="indefinite" nodeType="mainSeq">
+                <p:childTnLst>
+                  <p:par>
+                    <p:cTn id="3" fill="hold">
+                      <p:stCondLst>
+                        <p:cond delay="indefinite"/>
+                      </p:stCondLst>
+                      <p:childTnLst>
+                        <p:par>
+                          <p:cTn id="4" fill="hold">
+                            <p:stCondLst>
+                              <p:cond delay="0"/>
+                            </p:stCondLst>
+                            <p:childTnLst>
+                              <p:par>
+                                <p:cTn id="5" presetID="10" presetClass="entr" presetSubtype="0" fill="hold" nodeType="clickEffect">
+                                  <p:stCondLst>
+                                    <p:cond delay="0"/>
+                                  </p:stCondLst>
+                                  <p:childTnLst>
+                                    <p:set>
+                                      <p:cBhvr>
+                                        <p:cTn id="6" dur="1" fill="hold">
+                                          <p:stCondLst>
+                                            <p:cond delay="0"/>
+                                          </p:stCondLst>
+                                        </p:cTn>
+                                        <p:tgtEl>
+                                          <p:spTgt spid="6"/>
+                                        </p:tgtEl>
+                                        <p:attrNameLst>
+                                          <p:attrName>style.visibility</p:attrName>
+                                        </p:attrNameLst>
+                                      </p:cBhvr>
+                                      <p:to>
+                                        <p:strVal val="visible"/>
+                                      </p:to>
+                                    </p:set>
+                                    <p:animEffect transition="in" filter="fade">
+                                      <p:cBhvr>
+                                        <p:cTn id="7" dur="500"/>
+                                        <p:tgtEl>
+                                          <p:spTgt spid="6"/>
+                                        </p:tgtEl>
+                                      </p:cBhvr>
+                                    </p:animEffect>
+                                  </p:childTnLst>
+                                </p:cTn>
+                              </p:par>
+                              <p:par>
+                                <p:cTn id="8" presetID="10" presetClass="entr" presetSubtype="0" fill="hold" nodeType="withEffect">
+                                  <p:stCondLst>
+                                    <p:cond delay="0"/>
+                                  </p:stCondLst>
+                                  <p:childTnLst>
+                                    <p:set>
+                                      <p:cBhvr>
+                                        <p:cTn id="9" dur="1" fill="hold">
+                                          <p:stCondLst>
+                                            <p:cond delay="0"/>
+                                          </p:stCondLst>
+                                        </p:cTn>
+                                        <p:tgtEl>
+                                          <p:spTgt spid="9"/>
+                                        </p:tgtEl>
+                                        <p:attrNameLst>
+                                          <p:attrName>style.visibility</p:attrName>
+                                        </p:attrNameLst>
+                                      </p:cBhvr>
+                                      <p:to>
+                                        <p:strVal val="visible"/>
+                                      </p:to>
+                                    </p:set>
+                                    <p:animEffect transition="in" filter="fade">
+                                      <p:cBhvr>
+                                        <p:cTn id="10" dur="500"/>
+                                        <p:tgtEl>
+                                          <p:spTgt spid="9"/>
+                                        </p:tgtEl>
+                                      </p:cBhvr>
+                                    </p:animEffect>
+                                  </p:childTnLst>
+                                </p:cTn>
+                              </p:par>
+                            </p:childTnLst>
+                          </p:cTn>
+                        </p:par>
+                      </p:childTnLst>
+                    </p:cTn>
+                  </p:par>
+                  <p:par>
+                    <p:cTn id="11" fill="hold">
+                      <p:stCondLst>
+                        <p:cond delay="indefinite"/>
+                      </p:stCondLst>
+                      <p:childTnLst>
+                        <p:par>
+                          <p:cTn id="12" fill="hold">
+                            <p:stCondLst>
+                              <p:cond delay="0"/>
+                            </p:stCondLst>
+                            <p:childTnLst>
+                              <p:par>
+                                <p:cTn id="13" presetID="10" presetClass="entr" presetSubtype="0" fill="hold" nodeType="clickEffect">
+                                  <p:stCondLst>
+                                    <p:cond delay="0"/>
+                                  </p:stCondLst>
+                                  <p:childTnLst>
+                                    <p:set>
+                                      <p:cBhvr>
+                                        <p:cTn id="14" dur="1" fill="hold">
+                                          <p:stCondLst>
+                                            <p:cond delay="0"/>
+                                          </p:stCondLst>
+                                        </p:cTn>
+                                        <p:tgtEl>
+                                          <p:spTgt spid="7"/>
+                                        </p:tgtEl>
+                                        <p:attrNameLst>
+                                          <p:attrName>style.visibility</p:attrName>
+                                        </p:attrNameLst>
+                                      </p:cBhvr>
+                                      <p:to>
+                                        <p:strVal val="visible"/>
+                                      </p:to>
+                                    </p:set>
+                                    <p:animEffect transition="in" filter="fade">
+                                      <p:cBhvr>
+                                        <p:cTn id="15" dur="500"/>
+                                        <p:tgtEl>
+                                          <p:spTgt spid="7"/>
+                                        </p:tgtEl>
+                                      </p:cBhvr>
+                                    </p:animEffect>
+                                  </p:childTnLst>
+                                </p:cTn>
+                              </p:par>
+                              <p:par>
+                                <p:cTn id="16" presetID="10" presetClass="entr" presetSubtype="0" fill="hold" nodeType="withEffect">
+                                  <p:stCondLst>
+                                    <p:cond delay="0"/>
+                                  </p:stCondLst>
+                                  <p:childTnLst>
+                                    <p:set>
+                                      <p:cBhvr>
+                                        <p:cTn id="17" dur="1" fill="hold">
+                                          <p:stCondLst>
+                                            <p:cond delay="0"/>
+                                          </p:stCondLst>
+                                        </p:cTn>
+                                        <p:tgtEl>
+                                          <p:spTgt spid="10"/>
+                                        </p:tgtEl>
+                                        <p:attrNameLst>
+                                          <p:attrName>style.visibility</p:attrName>
+                                        </p:attrNameLst>
+                                      </p:cBhvr>
+                                      <p:to>
+                                        <p:strVal val="visible"/>
+                                      </p:to>
+                                    </p:set>
+                                    <p:animEffect transition="in" filter="fade">
+                                      <p:cBhvr>
+                                        <p:cTn id="18" dur="500"/>
+                                        <p:tgtEl>
+                                          <p:spTgt spid="10"/>
+                                        </p:tgtEl>
+                                      </p:cBhvr>
+                                    </p:animEffect>
+                                  </p:childTnLst>
+                                </p:cTn>
+                              </p:par>
+                            </p:childTnLst>
+                          </p:cTn>
+                        </p:par>
+                      </p:childTnLst>
+                    </p:cTn>
+                  </p:par>
+                  <p:par>
+                    <p:cTn id="19" fill="hold">
+                      <p:stCondLst>
+                        <p:cond delay="indefinite"/>
+                      </p:stCondLst>
+                      <p:childTnLst>
+                        <p:par>
+                          <p:cTn id="20" fill="hold">
+                            <p:stCondLst>
+                              <p:cond delay="0"/>
+                            </p:stCondLst>
+                            <p:childTnLst>
+                              <p:par>
+                                <p:cTn id="21" presetID="10" presetClass="entr" presetSubtype="0" fill="hold" nodeType="clickEffect">
+                                  <p:stCondLst>
+                                    <p:cond delay="0"/>
+                                  </p:stCondLst>
+                                  <p:childTnLst>
+                                    <p:set>
+                                      <p:cBhvr>
+                                        <p:cTn id="22" dur="1" fill="hold">
+                                          <p:stCondLst>
+                                            <p:cond delay="0"/>
+                                          </p:stCondLst>
+                                        </p:cTn>
+                                        <p:tgtEl>
+                                          <p:spTgt spid="8"/>
+                                        </p:tgtEl>
+                                        <p:attrNameLst>
+                                          <p:attrName>style.visibility</p:attrName>
+                                        </p:attrNameLst>
+                                      </p:cBhvr>
+                                      <p:to>
+                                        <p:strVal val="visible"/>
+                                      </p:to>
+                                    </p:set>
+                                    <p:animEffect transition="in" filter="fade">
+                                      <p:cBhvr>
+                                        <p:cTn id="23" dur="500"/>
+                                        <p:tgtEl>
+                                          <p:spTgt spid="8"/>
+                                        </p:tgtEl>
+                                      </p:cBhvr>
+                                    </p:animEffect>
+                                  </p:childTnLst>
+                                </p:cTn>
+                              </p:par>
+                            </p:childTnLst>
+                          </p:cTn>
+                        </p:par>
+                      </p:childTnLst>
+                    </p:cTn>
+                  </p:par>
+                  <p:par>
+                    <p:cTn id="24" fill="hold">
+                      <p:stCondLst>
+                        <p:cond delay="indefinite"/>
+                      </p:stCondLst>
+                      <p:childTnLst>
+                        <p:par>
+                          <p:cTn id="25" fill="hold">
+                            <p:stCondLst>
+                              <p:cond delay="0"/>
+                            </p:stCondLst>
+                            <p:childTnLst>
+                              <p:par>
+                                <p:cTn id="26" presetID="10" presetClass="entr" presetSubtype="0" fill="hold" nodeType="clickEffect">
+                                  <p:stCondLst>
+                                    <p:cond delay="0"/>
+                                  </p:stCondLst>
+                                  <p:childTnLst>
+                                    <p:set>
+                                      <p:cBhvr>
+                                        <p:cTn id="27" dur="1" fill="hold">
+                                          <p:stCondLst>
+                                            <p:cond delay="0"/>
+                                          </p:stCondLst>
+                                        </p:cTn>
+                                        <p:tgtEl>
+                                          <p:spTgt spid="11"/>
+                                        </p:tgtEl>
+                                        <p:attrNameLst>
+                                          <p:attrName>style.visibility</p:attrName>
+                                        </p:attrNameLst>
+                                      </p:cBhvr>
+                                      <p:to>
+                                        <p:strVal val="visible"/>
+                                      </p:to>
+                                    </p:set>
+                                    <p:animEffect transition="in" filter="fade">
+                                      <p:cBhvr>
+                                        <p:cTn id="28" dur="500"/>
+                                        <p:tgtEl>
+                                          <p:spTgt spid="11"/>
+                                        </p:tgtEl>
+                                      </p:cBhvr>
+                                    </p:animEffect>
+                                  </p:childTnLst>
+                                </p:cTn>
+                              </p:par>
+                            </p:childTnLst>
+                          </p:cTn>
+                        </p:par>
+                      </p:childTnLst>
+                    </p:cTn>
+                  </p:par>
+                </p:childTnLst>
+              </p:cTn>
+              <p:prevCondLst>
+                <p:cond evt="onPrev" delay="0">
+                  <p:tgtEl>
+                    <p:sldTgt/>
+                  </p:tgtEl>
+                </p:cond>
+              </p:prevCondLst>
+              <p:nextCondLst>
+                <p:cond evt="onNext" delay="0">
+                  <p:tgtEl>
+                    <p:sldTgt/>
+                  </p:tgtEl>
+                </p:cond>
+              </p:nextCondLst>
+            </p:seq>
+          </p:childTnLst>
+        </p:cTn>
       </p:par>
     </p:tnLst>
   </p:timing>

</xml_diff>

<commit_message>
Feedback from Bjarne, ned images on basic
</commit_message>
<xml_diff>
--- a/GIT.pptx
+++ b/GIT.pptx
@@ -5,10 +5,10 @@
     <p:sldMasterId id="2147483648" r:id="rId1"/>
   </p:sldMasterIdLst>
   <p:sldIdLst>
-    <p:sldId id="266" r:id="rId2"/>
-    <p:sldId id="260" r:id="rId3"/>
-    <p:sldId id="256" r:id="rId4"/>
-    <p:sldId id="261" r:id="rId5"/>
+    <p:sldId id="260" r:id="rId2"/>
+    <p:sldId id="256" r:id="rId3"/>
+    <p:sldId id="261" r:id="rId4"/>
+    <p:sldId id="293" r:id="rId5"/>
     <p:sldId id="274" r:id="rId6"/>
     <p:sldId id="275" r:id="rId7"/>
     <p:sldId id="276" r:id="rId8"/>
@@ -27,16 +27,15 @@
     <p:sldId id="281" r:id="rId21"/>
     <p:sldId id="285" r:id="rId22"/>
     <p:sldId id="290" r:id="rId23"/>
-    <p:sldId id="286" r:id="rId24"/>
-    <p:sldId id="292" r:id="rId25"/>
-    <p:sldId id="271" r:id="rId26"/>
+    <p:sldId id="292" r:id="rId24"/>
+    <p:sldId id="271" r:id="rId25"/>
+    <p:sldId id="286" r:id="rId26"/>
     <p:sldId id="291" r:id="rId27"/>
     <p:sldId id="283" r:id="rId28"/>
     <p:sldId id="284" r:id="rId29"/>
-    <p:sldId id="270" r:id="rId30"/>
-    <p:sldId id="265" r:id="rId31"/>
-    <p:sldId id="264" r:id="rId32"/>
-    <p:sldId id="282" r:id="rId33"/>
+    <p:sldId id="265" r:id="rId30"/>
+    <p:sldId id="264" r:id="rId31"/>
+    <p:sldId id="282" r:id="rId32"/>
   </p:sldIdLst>
   <p:sldSz cx="12192000" cy="6858000"/>
   <p:notesSz cx="6858000" cy="9144000"/>
@@ -343,7 +342,7 @@
             <a:fld id="{87DE6118-2437-4B30-8E3C-4D2BE6020583}" type="datetimeFigureOut">
               <a:rPr lang="en-US" dirty="0"/>
               <a:pPr/>
-              <a:t>6/19/2016</a:t>
+              <a:t>6/20/2016</a:t>
             </a:fld>
             <a:endParaRPr lang="en-US" dirty="0"/>
           </a:p>
@@ -669,7 +668,7 @@
           <a:p>
             <a:fld id="{87DE6118-2437-4B30-8E3C-4D2BE6020583}" type="datetimeFigureOut">
               <a:rPr lang="en-US" dirty="0"/>
-              <a:t>6/19/2016</a:t>
+              <a:t>6/20/2016</a:t>
             </a:fld>
             <a:endParaRPr lang="en-US" dirty="0"/>
           </a:p>
@@ -844,7 +843,7 @@
           <a:p>
             <a:fld id="{87DE6118-2437-4B30-8E3C-4D2BE6020583}" type="datetimeFigureOut">
               <a:rPr lang="en-US" dirty="0"/>
-              <a:t>6/19/2016</a:t>
+              <a:t>6/20/2016</a:t>
             </a:fld>
             <a:endParaRPr lang="en-US" dirty="0"/>
           </a:p>
@@ -1009,7 +1008,7 @@
           <a:p>
             <a:fld id="{87DE6118-2437-4B30-8E3C-4D2BE6020583}" type="datetimeFigureOut">
               <a:rPr lang="en-US" dirty="0"/>
-              <a:t>6/19/2016</a:t>
+              <a:t>6/20/2016</a:t>
             </a:fld>
             <a:endParaRPr lang="en-US" dirty="0"/>
           </a:p>
@@ -1282,7 +1281,7 @@
             <a:fld id="{87DE6118-2437-4B30-8E3C-4D2BE6020583}" type="datetimeFigureOut">
               <a:rPr lang="en-US" dirty="0"/>
               <a:pPr/>
-              <a:t>6/19/2016</a:t>
+              <a:t>6/20/2016</a:t>
             </a:fld>
             <a:endParaRPr lang="en-US" dirty="0"/>
           </a:p>
@@ -1672,7 +1671,7 @@
           <a:p>
             <a:fld id="{87DE6118-2437-4B30-8E3C-4D2BE6020583}" type="datetimeFigureOut">
               <a:rPr lang="en-US" dirty="0"/>
-              <a:t>6/19/2016</a:t>
+              <a:t>6/20/2016</a:t>
             </a:fld>
             <a:endParaRPr lang="en-US" dirty="0"/>
           </a:p>
@@ -2144,7 +2143,7 @@
           <a:p>
             <a:fld id="{87DE6118-2437-4B30-8E3C-4D2BE6020583}" type="datetimeFigureOut">
               <a:rPr lang="en-US" dirty="0"/>
-              <a:t>6/19/2016</a:t>
+              <a:t>6/20/2016</a:t>
             </a:fld>
             <a:endParaRPr lang="en-US" dirty="0"/>
           </a:p>
@@ -2257,7 +2256,7 @@
           <a:p>
             <a:fld id="{87DE6118-2437-4B30-8E3C-4D2BE6020583}" type="datetimeFigureOut">
               <a:rPr lang="en-US" dirty="0"/>
-              <a:t>6/19/2016</a:t>
+              <a:t>6/20/2016</a:t>
             </a:fld>
             <a:endParaRPr lang="en-US" dirty="0"/>
           </a:p>
@@ -2347,7 +2346,7 @@
           <a:p>
             <a:fld id="{87DE6118-2437-4B30-8E3C-4D2BE6020583}" type="datetimeFigureOut">
               <a:rPr lang="en-US" dirty="0"/>
-              <a:t>6/19/2016</a:t>
+              <a:t>6/20/2016</a:t>
             </a:fld>
             <a:endParaRPr lang="en-US" dirty="0"/>
           </a:p>
@@ -2689,7 +2688,7 @@
             <a:fld id="{87DE6118-2437-4B30-8E3C-4D2BE6020583}" type="datetimeFigureOut">
               <a:rPr lang="en-US" dirty="0"/>
               <a:pPr/>
-              <a:t>6/19/2016</a:t>
+              <a:t>6/20/2016</a:t>
             </a:fld>
             <a:endParaRPr lang="en-US" dirty="0"/>
           </a:p>
@@ -3074,7 +3073,7 @@
             <a:fld id="{87DE6118-2437-4B30-8E3C-4D2BE6020583}" type="datetimeFigureOut">
               <a:rPr lang="en-US" dirty="0"/>
               <a:pPr/>
-              <a:t>6/19/2016</a:t>
+              <a:t>6/20/2016</a:t>
             </a:fld>
             <a:endParaRPr lang="en-US" dirty="0"/>
           </a:p>
@@ -3349,7 +3348,7 @@
             <a:fld id="{87DE6118-2437-4B30-8E3C-4D2BE6020583}" type="datetimeFigureOut">
               <a:rPr lang="en-US" dirty="0"/>
               <a:pPr/>
-              <a:t>6/19/2016</a:t>
+              <a:t>6/20/2016</a:t>
             </a:fld>
             <a:endParaRPr lang="en-US" dirty="0"/>
           </a:p>
@@ -3859,7 +3858,7 @@
       </p:grpSpPr>
       <p:sp>
         <p:nvSpPr>
-          <p:cNvPr id="4" name="Title 3"/>
+          <p:cNvPr id="2" name="Title 1"/>
           <p:cNvSpPr>
             <a:spLocks noGrp="1"/>
           </p:cNvSpPr>
@@ -3867,42 +3866,204 @@
             <p:ph type="title"/>
           </p:nvPr>
         </p:nvSpPr>
-        <p:spPr/>
+        <p:spPr>
+          <a:xfrm>
+            <a:off x="1371600" y="685800"/>
+            <a:ext cx="9601200" cy="625764"/>
+          </a:xfrm>
+        </p:spPr>
         <p:txBody>
-          <a:bodyPr/>
+          <a:bodyPr>
+            <a:normAutofit fontScale="90000"/>
+          </a:bodyPr>
           <a:lstStyle/>
           <a:p>
             <a:r>
               <a:rPr lang="en-US" dirty="0" smtClean="0"/>
-              <a:t>CLONE POWERPOIINT</a:t>
+              <a:t>Meg </a:t>
+            </a:r>
+            <a:r>
+              <a:rPr lang="en-US" dirty="0" err="1" smtClean="0"/>
+              <a:t>og</a:t>
+            </a:r>
+            <a:r>
+              <a:rPr lang="en-US" dirty="0" smtClean="0"/>
+              <a:t> mine </a:t>
+            </a:r>
+            <a:r>
+              <a:rPr lang="en-US" dirty="0" err="1" smtClean="0"/>
+              <a:t>prosjekter</a:t>
+            </a:r>
+            <a:r>
+              <a:rPr lang="en-US" dirty="0" smtClean="0"/>
+              <a:t> </a:t>
+            </a:r>
+            <a:r>
+              <a:rPr lang="en-US" dirty="0" err="1" smtClean="0"/>
+              <a:t>før</a:t>
+            </a:r>
+            <a:r>
+              <a:rPr lang="en-US" dirty="0" smtClean="0"/>
+              <a:t> </a:t>
+            </a:r>
+            <a:r>
+              <a:rPr lang="en-US" dirty="0" err="1" smtClean="0"/>
+              <a:t>versjonskontroll</a:t>
             </a:r>
             <a:endParaRPr lang="en-US" dirty="0"/>
           </a:p>
         </p:txBody>
       </p:sp>
-      <p:sp>
-        <p:nvSpPr>
-          <p:cNvPr id="5" name="Content Placeholder 4"/>
-          <p:cNvSpPr>
-            <a:spLocks noGrp="1"/>
-          </p:cNvSpPr>
+      <p:pic>
+        <p:nvPicPr>
+          <p:cNvPr id="4" name="Content Placeholder 3"/>
+          <p:cNvPicPr>
+            <a:picLocks noGrp="1" noChangeAspect="1"/>
+          </p:cNvPicPr>
           <p:nvPr>
             <p:ph idx="1"/>
           </p:nvPr>
-        </p:nvSpPr>
-        <p:spPr/>
-        <p:txBody>
-          <a:bodyPr/>
-          <a:lstStyle/>
-          <a:p>
-            <a:endParaRPr lang="en-US"/>
-          </a:p>
-        </p:txBody>
-      </p:sp>
+        </p:nvPicPr>
+        <p:blipFill>
+          <a:blip r:embed="rId2"/>
+          <a:stretch>
+            <a:fillRect/>
+          </a:stretch>
+        </p:blipFill>
+        <p:spPr>
+          <a:xfrm>
+            <a:off x="1666894" y="1859320"/>
+            <a:ext cx="1879688" cy="3832271"/>
+          </a:xfrm>
+          <a:prstGeom prst="rect">
+            <a:avLst/>
+          </a:prstGeom>
+        </p:spPr>
+      </p:pic>
+      <p:pic>
+        <p:nvPicPr>
+          <p:cNvPr id="5" name="Picture 4"/>
+          <p:cNvPicPr>
+            <a:picLocks noChangeAspect="1"/>
+          </p:cNvPicPr>
+          <p:nvPr/>
+        </p:nvPicPr>
+        <p:blipFill>
+          <a:blip r:embed="rId3"/>
+          <a:stretch>
+            <a:fillRect/>
+          </a:stretch>
+        </p:blipFill>
+        <p:spPr>
+          <a:xfrm>
+            <a:off x="3804284" y="3237880"/>
+            <a:ext cx="1582538" cy="1259900"/>
+          </a:xfrm>
+          <a:prstGeom prst="rect">
+            <a:avLst/>
+          </a:prstGeom>
+        </p:spPr>
+      </p:pic>
+      <p:pic>
+        <p:nvPicPr>
+          <p:cNvPr id="6" name="Picture 5"/>
+          <p:cNvPicPr>
+            <a:picLocks noChangeAspect="1"/>
+          </p:cNvPicPr>
+          <p:nvPr/>
+        </p:nvPicPr>
+        <p:blipFill>
+          <a:blip r:embed="rId4"/>
+          <a:stretch>
+            <a:fillRect/>
+          </a:stretch>
+        </p:blipFill>
+        <p:spPr>
+          <a:xfrm>
+            <a:off x="5700447" y="2212380"/>
+            <a:ext cx="1221094" cy="1025500"/>
+          </a:xfrm>
+          <a:prstGeom prst="rect">
+            <a:avLst/>
+          </a:prstGeom>
+        </p:spPr>
+      </p:pic>
+      <p:pic>
+        <p:nvPicPr>
+          <p:cNvPr id="7" name="Picture 6"/>
+          <p:cNvPicPr>
+            <a:picLocks noChangeAspect="1"/>
+          </p:cNvPicPr>
+          <p:nvPr/>
+        </p:nvPicPr>
+        <p:blipFill>
+          <a:blip r:embed="rId5"/>
+          <a:stretch>
+            <a:fillRect/>
+          </a:stretch>
+        </p:blipFill>
+        <p:spPr>
+          <a:xfrm>
+            <a:off x="5700447" y="3867830"/>
+            <a:ext cx="1221094" cy="1025500"/>
+          </a:xfrm>
+          <a:prstGeom prst="rect">
+            <a:avLst/>
+          </a:prstGeom>
+        </p:spPr>
+      </p:pic>
+      <p:pic>
+        <p:nvPicPr>
+          <p:cNvPr id="10" name="Picture 9"/>
+          <p:cNvPicPr>
+            <a:picLocks noChangeAspect="1"/>
+          </p:cNvPicPr>
+          <p:nvPr/>
+        </p:nvPicPr>
+        <p:blipFill>
+          <a:blip r:embed="rId6"/>
+          <a:stretch>
+            <a:fillRect/>
+          </a:stretch>
+        </p:blipFill>
+        <p:spPr>
+          <a:xfrm>
+            <a:off x="7436946" y="3208990"/>
+            <a:ext cx="703350" cy="703200"/>
+          </a:xfrm>
+          <a:prstGeom prst="rect">
+            <a:avLst/>
+          </a:prstGeom>
+        </p:spPr>
+      </p:pic>
+      <p:pic>
+        <p:nvPicPr>
+          <p:cNvPr id="11" name="Picture 10"/>
+          <p:cNvPicPr>
+            <a:picLocks noChangeAspect="1"/>
+          </p:cNvPicPr>
+          <p:nvPr/>
+        </p:nvPicPr>
+        <p:blipFill>
+          <a:blip r:embed="rId7"/>
+          <a:stretch>
+            <a:fillRect/>
+          </a:stretch>
+        </p:blipFill>
+        <p:spPr>
+          <a:xfrm>
+            <a:off x="8655701" y="2964823"/>
+            <a:ext cx="1514156" cy="1621267"/>
+          </a:xfrm>
+          <a:prstGeom prst="rect">
+            <a:avLst/>
+          </a:prstGeom>
+        </p:spPr>
+      </p:pic>
     </p:spTree>
     <p:extLst>
       <p:ext uri="{BB962C8B-B14F-4D97-AF65-F5344CB8AC3E}">
-        <p14:creationId xmlns:p14="http://schemas.microsoft.com/office/powerpoint/2010/main" val="82257342"/>
+        <p14:creationId xmlns:p14="http://schemas.microsoft.com/office/powerpoint/2010/main" val="232783837"/>
       </p:ext>
     </p:extLst>
   </p:cSld>
@@ -3912,7 +4073,312 @@
   <p:timing>
     <p:tnLst>
       <p:par>
-        <p:cTn id="1" dur="indefinite" restart="never" nodeType="tmRoot"/>
+        <p:cTn id="1" dur="indefinite" restart="never" nodeType="tmRoot">
+          <p:childTnLst>
+            <p:seq concurrent="1" nextAc="seek">
+              <p:cTn id="2" dur="indefinite" nodeType="mainSeq">
+                <p:childTnLst>
+                  <p:par>
+                    <p:cTn id="3" fill="hold">
+                      <p:stCondLst>
+                        <p:cond delay="indefinite"/>
+                      </p:stCondLst>
+                      <p:childTnLst>
+                        <p:par>
+                          <p:cTn id="4" fill="hold">
+                            <p:stCondLst>
+                              <p:cond delay="0"/>
+                            </p:stCondLst>
+                            <p:childTnLst>
+                              <p:par>
+                                <p:cTn id="5" presetID="10" presetClass="entr" presetSubtype="0" fill="hold" nodeType="clickEffect">
+                                  <p:stCondLst>
+                                    <p:cond delay="0"/>
+                                  </p:stCondLst>
+                                  <p:childTnLst>
+                                    <p:set>
+                                      <p:cBhvr>
+                                        <p:cTn id="6" dur="1" fill="hold">
+                                          <p:stCondLst>
+                                            <p:cond delay="0"/>
+                                          </p:stCondLst>
+                                        </p:cTn>
+                                        <p:tgtEl>
+                                          <p:spTgt spid="4"/>
+                                        </p:tgtEl>
+                                        <p:attrNameLst>
+                                          <p:attrName>style.visibility</p:attrName>
+                                        </p:attrNameLst>
+                                      </p:cBhvr>
+                                      <p:to>
+                                        <p:strVal val="visible"/>
+                                      </p:to>
+                                    </p:set>
+                                    <p:animEffect transition="in" filter="fade">
+                                      <p:cBhvr>
+                                        <p:cTn id="7" dur="500"/>
+                                        <p:tgtEl>
+                                          <p:spTgt spid="4"/>
+                                        </p:tgtEl>
+                                      </p:cBhvr>
+                                    </p:animEffect>
+                                  </p:childTnLst>
+                                </p:cTn>
+                              </p:par>
+                            </p:childTnLst>
+                          </p:cTn>
+                        </p:par>
+                      </p:childTnLst>
+                    </p:cTn>
+                  </p:par>
+                  <p:par>
+                    <p:cTn id="8" fill="hold">
+                      <p:stCondLst>
+                        <p:cond delay="indefinite"/>
+                      </p:stCondLst>
+                      <p:childTnLst>
+                        <p:par>
+                          <p:cTn id="9" fill="hold">
+                            <p:stCondLst>
+                              <p:cond delay="0"/>
+                            </p:stCondLst>
+                            <p:childTnLst>
+                              <p:par>
+                                <p:cTn id="10" presetID="10" presetClass="entr" presetSubtype="0" fill="hold" nodeType="clickEffect">
+                                  <p:stCondLst>
+                                    <p:cond delay="0"/>
+                                  </p:stCondLst>
+                                  <p:childTnLst>
+                                    <p:set>
+                                      <p:cBhvr>
+                                        <p:cTn id="11" dur="1" fill="hold">
+                                          <p:stCondLst>
+                                            <p:cond delay="0"/>
+                                          </p:stCondLst>
+                                        </p:cTn>
+                                        <p:tgtEl>
+                                          <p:spTgt spid="5"/>
+                                        </p:tgtEl>
+                                        <p:attrNameLst>
+                                          <p:attrName>style.visibility</p:attrName>
+                                        </p:attrNameLst>
+                                      </p:cBhvr>
+                                      <p:to>
+                                        <p:strVal val="visible"/>
+                                      </p:to>
+                                    </p:set>
+                                    <p:animEffect transition="in" filter="fade">
+                                      <p:cBhvr>
+                                        <p:cTn id="12" dur="500"/>
+                                        <p:tgtEl>
+                                          <p:spTgt spid="5"/>
+                                        </p:tgtEl>
+                                      </p:cBhvr>
+                                    </p:animEffect>
+                                  </p:childTnLst>
+                                </p:cTn>
+                              </p:par>
+                            </p:childTnLst>
+                          </p:cTn>
+                        </p:par>
+                      </p:childTnLst>
+                    </p:cTn>
+                  </p:par>
+                  <p:par>
+                    <p:cTn id="13" fill="hold">
+                      <p:stCondLst>
+                        <p:cond delay="indefinite"/>
+                      </p:stCondLst>
+                      <p:childTnLst>
+                        <p:par>
+                          <p:cTn id="14" fill="hold">
+                            <p:stCondLst>
+                              <p:cond delay="0"/>
+                            </p:stCondLst>
+                            <p:childTnLst>
+                              <p:par>
+                                <p:cTn id="15" presetID="10" presetClass="entr" presetSubtype="0" fill="hold" nodeType="clickEffect">
+                                  <p:stCondLst>
+                                    <p:cond delay="0"/>
+                                  </p:stCondLst>
+                                  <p:childTnLst>
+                                    <p:set>
+                                      <p:cBhvr>
+                                        <p:cTn id="16" dur="1" fill="hold">
+                                          <p:stCondLst>
+                                            <p:cond delay="0"/>
+                                          </p:stCondLst>
+                                        </p:cTn>
+                                        <p:tgtEl>
+                                          <p:spTgt spid="6"/>
+                                        </p:tgtEl>
+                                        <p:attrNameLst>
+                                          <p:attrName>style.visibility</p:attrName>
+                                        </p:attrNameLst>
+                                      </p:cBhvr>
+                                      <p:to>
+                                        <p:strVal val="visible"/>
+                                      </p:to>
+                                    </p:set>
+                                    <p:animEffect transition="in" filter="fade">
+                                      <p:cBhvr>
+                                        <p:cTn id="17" dur="500"/>
+                                        <p:tgtEl>
+                                          <p:spTgt spid="6"/>
+                                        </p:tgtEl>
+                                      </p:cBhvr>
+                                    </p:animEffect>
+                                  </p:childTnLst>
+                                </p:cTn>
+                              </p:par>
+                              <p:par>
+                                <p:cTn id="18" presetID="10" presetClass="entr" presetSubtype="0" fill="hold" nodeType="withEffect">
+                                  <p:stCondLst>
+                                    <p:cond delay="0"/>
+                                  </p:stCondLst>
+                                  <p:childTnLst>
+                                    <p:set>
+                                      <p:cBhvr>
+                                        <p:cTn id="19" dur="1" fill="hold">
+                                          <p:stCondLst>
+                                            <p:cond delay="0"/>
+                                          </p:stCondLst>
+                                        </p:cTn>
+                                        <p:tgtEl>
+                                          <p:spTgt spid="10"/>
+                                        </p:tgtEl>
+                                        <p:attrNameLst>
+                                          <p:attrName>style.visibility</p:attrName>
+                                        </p:attrNameLst>
+                                      </p:cBhvr>
+                                      <p:to>
+                                        <p:strVal val="visible"/>
+                                      </p:to>
+                                    </p:set>
+                                    <p:animEffect transition="in" filter="fade">
+                                      <p:cBhvr>
+                                        <p:cTn id="20" dur="500"/>
+                                        <p:tgtEl>
+                                          <p:spTgt spid="10"/>
+                                        </p:tgtEl>
+                                      </p:cBhvr>
+                                    </p:animEffect>
+                                  </p:childTnLst>
+                                </p:cTn>
+                              </p:par>
+                              <p:par>
+                                <p:cTn id="21" presetID="10" presetClass="entr" presetSubtype="0" fill="hold" nodeType="withEffect">
+                                  <p:stCondLst>
+                                    <p:cond delay="0"/>
+                                  </p:stCondLst>
+                                  <p:childTnLst>
+                                    <p:set>
+                                      <p:cBhvr>
+                                        <p:cTn id="22" dur="1" fill="hold">
+                                          <p:stCondLst>
+                                            <p:cond delay="0"/>
+                                          </p:stCondLst>
+                                        </p:cTn>
+                                        <p:tgtEl>
+                                          <p:spTgt spid="11"/>
+                                        </p:tgtEl>
+                                        <p:attrNameLst>
+                                          <p:attrName>style.visibility</p:attrName>
+                                        </p:attrNameLst>
+                                      </p:cBhvr>
+                                      <p:to>
+                                        <p:strVal val="visible"/>
+                                      </p:to>
+                                    </p:set>
+                                    <p:animEffect transition="in" filter="fade">
+                                      <p:cBhvr>
+                                        <p:cTn id="23" dur="500"/>
+                                        <p:tgtEl>
+                                          <p:spTgt spid="11"/>
+                                        </p:tgtEl>
+                                      </p:cBhvr>
+                                    </p:animEffect>
+                                  </p:childTnLst>
+                                </p:cTn>
+                              </p:par>
+                            </p:childTnLst>
+                          </p:cTn>
+                        </p:par>
+                      </p:childTnLst>
+                    </p:cTn>
+                  </p:par>
+                  <p:par>
+                    <p:cTn id="24" fill="hold">
+                      <p:stCondLst>
+                        <p:cond delay="indefinite"/>
+                      </p:stCondLst>
+                      <p:childTnLst>
+                        <p:par>
+                          <p:cTn id="25" fill="hold">
+                            <p:stCondLst>
+                              <p:cond delay="0"/>
+                            </p:stCondLst>
+                            <p:childTnLst>
+                              <p:par>
+                                <p:cTn id="26" presetID="10" presetClass="entr" presetSubtype="0" fill="hold" nodeType="clickEffect">
+                                  <p:stCondLst>
+                                    <p:cond delay="0"/>
+                                  </p:stCondLst>
+                                  <p:childTnLst>
+                                    <p:set>
+                                      <p:cBhvr>
+                                        <p:cTn id="27" dur="1" fill="hold">
+                                          <p:stCondLst>
+                                            <p:cond delay="0"/>
+                                          </p:stCondLst>
+                                        </p:cTn>
+                                        <p:tgtEl>
+                                          <p:spTgt spid="7"/>
+                                        </p:tgtEl>
+                                        <p:attrNameLst>
+                                          <p:attrName>style.visibility</p:attrName>
+                                        </p:attrNameLst>
+                                      </p:cBhvr>
+                                      <p:to>
+                                        <p:strVal val="visible"/>
+                                      </p:to>
+                                    </p:set>
+                                    <p:animEffect transition="in" filter="fade">
+                                      <p:cBhvr>
+                                        <p:cTn id="28" dur="500"/>
+                                        <p:tgtEl>
+                                          <p:spTgt spid="7"/>
+                                        </p:tgtEl>
+                                      </p:cBhvr>
+                                    </p:animEffect>
+                                  </p:childTnLst>
+                                </p:cTn>
+                              </p:par>
+                            </p:childTnLst>
+                          </p:cTn>
+                        </p:par>
+                      </p:childTnLst>
+                    </p:cTn>
+                  </p:par>
+                </p:childTnLst>
+              </p:cTn>
+              <p:prevCondLst>
+                <p:cond evt="onPrev" delay="0">
+                  <p:tgtEl>
+                    <p:sldTgt/>
+                  </p:tgtEl>
+                </p:cond>
+              </p:prevCondLst>
+              <p:nextCondLst>
+                <p:cond evt="onNext" delay="0">
+                  <p:tgtEl>
+                    <p:sldTgt/>
+                  </p:tgtEl>
+                </p:cond>
+              </p:nextCondLst>
+            </p:seq>
+          </p:childTnLst>
+        </p:cTn>
       </p:par>
     </p:tnLst>
   </p:timing>
@@ -3983,7 +4449,7 @@
         </p:blipFill>
         <p:spPr>
           <a:xfrm>
-            <a:off x="5082955" y="1598122"/>
+            <a:off x="5082955" y="2080261"/>
             <a:ext cx="2028859" cy="2468555"/>
           </a:xfrm>
           <a:prstGeom prst="rect">
@@ -4057,7 +4523,7 @@
       </p:sp>
       <p:pic>
         <p:nvPicPr>
-          <p:cNvPr id="6" name="Picture 5"/>
+          <p:cNvPr id="3" name="Picture 2"/>
           <p:cNvPicPr>
             <a:picLocks noChangeAspect="1"/>
           </p:cNvPicPr>
@@ -4071,8 +4537,8 @@
         </p:blipFill>
         <p:spPr>
           <a:xfrm>
-            <a:off x="3346096" y="2735566"/>
-            <a:ext cx="5499807" cy="1386867"/>
+            <a:off x="3900942" y="2619188"/>
+            <a:ext cx="4959632" cy="1578739"/>
           </a:xfrm>
           <a:prstGeom prst="rect">
             <a:avLst/>
@@ -4137,34 +4603,7 @@
             </a:r>
             <a:r>
               <a:rPr lang="en-US" dirty="0" smtClean="0"/>
-              <a:t> Add</a:t>
-            </a:r>
-            <a:endParaRPr lang="en-US" dirty="0"/>
-          </a:p>
-        </p:txBody>
-      </p:sp>
-      <p:sp>
-        <p:nvSpPr>
-          <p:cNvPr id="3" name="Content Placeholder 2"/>
-          <p:cNvSpPr>
-            <a:spLocks noGrp="1"/>
-          </p:cNvSpPr>
-          <p:nvPr>
-            <p:ph idx="1"/>
-          </p:nvPr>
-        </p:nvSpPr>
-        <p:spPr/>
-        <p:txBody>
-          <a:bodyPr/>
-          <a:lstStyle/>
-          <a:p>
-            <a:r>
-              <a:rPr lang="en-US" dirty="0" err="1" smtClean="0"/>
-              <a:t>Git</a:t>
-            </a:r>
-            <a:r>
-              <a:rPr lang="en-US" dirty="0" smtClean="0"/>
-              <a:t> add . -n</a:t>
+              <a:t> Add . -n</a:t>
             </a:r>
             <a:endParaRPr lang="en-US" dirty="0"/>
           </a:p>
@@ -4172,7 +4611,7 @@
       </p:sp>
       <p:pic>
         <p:nvPicPr>
-          <p:cNvPr id="4" name="Picture 3"/>
+          <p:cNvPr id="8" name="Picture 7"/>
           <p:cNvPicPr>
             <a:picLocks noChangeAspect="1"/>
           </p:cNvPicPr>
@@ -4186,8 +4625,8 @@
         </p:blipFill>
         <p:spPr>
           <a:xfrm>
-            <a:off x="3919673" y="1428750"/>
-            <a:ext cx="5499807" cy="4990767"/>
+            <a:off x="4965146" y="685800"/>
+            <a:ext cx="6418069" cy="5918601"/>
           </a:xfrm>
           <a:prstGeom prst="rect">
             <a:avLst/>
@@ -5046,523 +5485,6 @@
           </a:fontRef>
         </p:style>
       </p:cxnSp>
-      <p:graphicFrame>
-        <p:nvGraphicFramePr>
-          <p:cNvPr id="17" name="Content Placeholder 6"/>
-          <p:cNvGraphicFramePr>
-            <a:graphicFrameLocks/>
-          </p:cNvGraphicFramePr>
-          <p:nvPr>
-            <p:extLst>
-              <p:ext uri="{D42A27DB-BD31-4B8C-83A1-F6EECF244321}">
-                <p14:modId xmlns:p14="http://schemas.microsoft.com/office/powerpoint/2010/main" val="653937568"/>
-              </p:ext>
-            </p:extLst>
-          </p:nvPr>
-        </p:nvGraphicFramePr>
-        <p:xfrm>
-          <a:off x="4743104" y="2537459"/>
-          <a:ext cx="3336174" cy="1097280"/>
-        </p:xfrm>
-        <a:graphic>
-          <a:graphicData uri="http://schemas.openxmlformats.org/drawingml/2006/table">
-            <a:tbl>
-              <a:tblPr firstRow="1" bandRow="1">
-                <a:tableStyleId>{5C22544A-7EE6-4342-B048-85BDC9FD1C3A}</a:tableStyleId>
-              </a:tblPr>
-              <a:tblGrid>
-                <a:gridCol w="1668087">
-                  <a:extLst>
-                    <a:ext uri="{9D8B030D-6E8A-4147-A177-3AD203B41FA5}">
-                      <a16:colId xmlns:a16="http://schemas.microsoft.com/office/drawing/2014/main" val="2557350480"/>
-                    </a:ext>
-                  </a:extLst>
-                </a:gridCol>
-                <a:gridCol w="1668087">
-                  <a:extLst>
-                    <a:ext uri="{9D8B030D-6E8A-4147-A177-3AD203B41FA5}">
-                      <a16:colId xmlns:a16="http://schemas.microsoft.com/office/drawing/2014/main" val="1661458923"/>
-                    </a:ext>
-                  </a:extLst>
-                </a:gridCol>
-              </a:tblGrid>
-              <a:tr h="360565">
-                <a:tc>
-                  <a:txBody>
-                    <a:bodyPr/>
-                    <a:lstStyle/>
-                    <a:p>
-                      <a:r>
-                        <a:rPr lang="en-US" dirty="0" smtClean="0"/>
-                        <a:t>Tree</a:t>
-                      </a:r>
-                      <a:endParaRPr lang="en-US" dirty="0"/>
-                    </a:p>
-                  </a:txBody>
-                  <a:tcPr/>
-                </a:tc>
-                <a:tc>
-                  <a:txBody>
-                    <a:bodyPr/>
-                    <a:lstStyle/>
-                    <a:p>
-                      <a:r>
-                        <a:rPr lang="en-US" dirty="0" smtClean="0"/>
-                        <a:t>Size</a:t>
-                      </a:r>
-                      <a:endParaRPr lang="en-US" dirty="0"/>
-                    </a:p>
-                  </a:txBody>
-                  <a:tcPr/>
-                </a:tc>
-                <a:extLst>
-                  <a:ext uri="{0D108BD9-81ED-4DB2-BD59-A6C34878D82A}">
-                    <a16:rowId xmlns:a16="http://schemas.microsoft.com/office/drawing/2014/main" val="17792059"/>
-                  </a:ext>
-                </a:extLst>
-              </a:tr>
-              <a:tr h="360565">
-                <a:tc>
-                  <a:txBody>
-                    <a:bodyPr/>
-                    <a:lstStyle/>
-                    <a:p>
-                      <a:r>
-                        <a:rPr lang="en-US" dirty="0" smtClean="0"/>
-                        <a:t>Blob</a:t>
-                      </a:r>
-                      <a:endParaRPr lang="en-US" dirty="0"/>
-                    </a:p>
-                  </a:txBody>
-                  <a:tcPr/>
-                </a:tc>
-                <a:tc>
-                  <a:txBody>
-                    <a:bodyPr/>
-                    <a:lstStyle/>
-                    <a:p>
-                      <a:r>
-                        <a:rPr lang="en-US" dirty="0" smtClean="0"/>
-                        <a:t>A</a:t>
-                      </a:r>
-                      <a:endParaRPr lang="en-US" dirty="0"/>
-                    </a:p>
-                  </a:txBody>
-                  <a:tcPr/>
-                </a:tc>
-                <a:extLst>
-                  <a:ext uri="{0D108BD9-81ED-4DB2-BD59-A6C34878D82A}">
-                    <a16:rowId xmlns:a16="http://schemas.microsoft.com/office/drawing/2014/main" val="759684523"/>
-                  </a:ext>
-                </a:extLst>
-              </a:tr>
-              <a:tr h="360565">
-                <a:tc>
-                  <a:txBody>
-                    <a:bodyPr/>
-                    <a:lstStyle/>
-                    <a:p>
-                      <a:r>
-                        <a:rPr lang="en-US" dirty="0" smtClean="0"/>
-                        <a:t>Blob</a:t>
-                      </a:r>
-                      <a:endParaRPr lang="en-US" dirty="0"/>
-                    </a:p>
-                  </a:txBody>
-                  <a:tcPr/>
-                </a:tc>
-                <a:tc>
-                  <a:txBody>
-                    <a:bodyPr/>
-                    <a:lstStyle/>
-                    <a:p>
-                      <a:r>
-                        <a:rPr lang="en-US" dirty="0" smtClean="0"/>
-                        <a:t>B</a:t>
-                      </a:r>
-                      <a:endParaRPr lang="en-US" dirty="0"/>
-                    </a:p>
-                  </a:txBody>
-                  <a:tcPr/>
-                </a:tc>
-                <a:extLst>
-                  <a:ext uri="{0D108BD9-81ED-4DB2-BD59-A6C34878D82A}">
-                    <a16:rowId xmlns:a16="http://schemas.microsoft.com/office/drawing/2014/main" val="3504923733"/>
-                  </a:ext>
-                </a:extLst>
-              </a:tr>
-            </a:tbl>
-          </a:graphicData>
-        </a:graphic>
-      </p:graphicFrame>
-      <p:graphicFrame>
-        <p:nvGraphicFramePr>
-          <p:cNvPr id="18" name="Content Placeholder 6"/>
-          <p:cNvGraphicFramePr>
-            <a:graphicFrameLocks/>
-          </p:cNvGraphicFramePr>
-          <p:nvPr>
-            <p:extLst>
-              <p:ext uri="{D42A27DB-BD31-4B8C-83A1-F6EECF244321}">
-                <p14:modId xmlns:p14="http://schemas.microsoft.com/office/powerpoint/2010/main" val="4147536238"/>
-              </p:ext>
-            </p:extLst>
-          </p:nvPr>
-        </p:nvGraphicFramePr>
-        <p:xfrm>
-          <a:off x="8114608" y="4454581"/>
-          <a:ext cx="3336174" cy="1808020"/>
-        </p:xfrm>
-        <a:graphic>
-          <a:graphicData uri="http://schemas.openxmlformats.org/drawingml/2006/table">
-            <a:tbl>
-              <a:tblPr firstRow="1" bandRow="1">
-                <a:tableStyleId>{F5AB1C69-6EDB-4FF4-983F-18BD219EF322}</a:tableStyleId>
-              </a:tblPr>
-              <a:tblGrid>
-                <a:gridCol w="1668087">
-                  <a:extLst>
-                    <a:ext uri="{9D8B030D-6E8A-4147-A177-3AD203B41FA5}">
-                      <a16:colId xmlns:a16="http://schemas.microsoft.com/office/drawing/2014/main" val="2557350480"/>
-                    </a:ext>
-                  </a:extLst>
-                </a:gridCol>
-                <a:gridCol w="1668087">
-                  <a:extLst>
-                    <a:ext uri="{9D8B030D-6E8A-4147-A177-3AD203B41FA5}">
-                      <a16:colId xmlns:a16="http://schemas.microsoft.com/office/drawing/2014/main" val="1661458923"/>
-                    </a:ext>
-                  </a:extLst>
-                </a:gridCol>
-              </a:tblGrid>
-              <a:tr h="360565">
-                <a:tc>
-                  <a:txBody>
-                    <a:bodyPr/>
-                    <a:lstStyle/>
-                    <a:p>
-                      <a:r>
-                        <a:rPr lang="en-US" dirty="0" smtClean="0"/>
-                        <a:t>Blob</a:t>
-                      </a:r>
-                      <a:endParaRPr lang="en-US" dirty="0"/>
-                    </a:p>
-                  </a:txBody>
-                  <a:tcPr/>
-                </a:tc>
-                <a:tc>
-                  <a:txBody>
-                    <a:bodyPr/>
-                    <a:lstStyle/>
-                    <a:p>
-                      <a:r>
-                        <a:rPr lang="en-US" dirty="0" smtClean="0"/>
-                        <a:t>Size</a:t>
-                      </a:r>
-                      <a:endParaRPr lang="en-US" dirty="0"/>
-                    </a:p>
-                  </a:txBody>
-                  <a:tcPr/>
-                </a:tc>
-                <a:extLst>
-                  <a:ext uri="{0D108BD9-81ED-4DB2-BD59-A6C34878D82A}">
-                    <a16:rowId xmlns:a16="http://schemas.microsoft.com/office/drawing/2014/main" val="17792059"/>
-                  </a:ext>
-                </a:extLst>
-              </a:tr>
-              <a:tr h="1442260">
-                <a:tc gridSpan="2">
-                  <a:txBody>
-                    <a:bodyPr/>
-                    <a:lstStyle/>
-                    <a:p>
-                      <a:r>
-                        <a:rPr lang="en-US" dirty="0" err="1" smtClean="0"/>
-                        <a:t>Dette</a:t>
-                      </a:r>
-                      <a:r>
-                        <a:rPr lang="en-US" baseline="0" dirty="0" smtClean="0"/>
-                        <a:t> </a:t>
-                      </a:r>
-                      <a:r>
-                        <a:rPr lang="en-US" baseline="0" dirty="0" err="1" smtClean="0"/>
-                        <a:t>er</a:t>
-                      </a:r>
-                      <a:r>
-                        <a:rPr lang="en-US" baseline="0" dirty="0" smtClean="0"/>
-                        <a:t> </a:t>
-                      </a:r>
-                      <a:r>
-                        <a:rPr lang="en-US" baseline="0" dirty="0" err="1" smtClean="0"/>
-                        <a:t>en</a:t>
-                      </a:r>
-                      <a:r>
-                        <a:rPr lang="en-US" baseline="0" dirty="0" smtClean="0"/>
-                        <a:t> </a:t>
-                      </a:r>
-                      <a:r>
-                        <a:rPr lang="en-US" baseline="0" dirty="0" err="1" smtClean="0"/>
-                        <a:t>testfil</a:t>
-                      </a:r>
-                      <a:r>
-                        <a:rPr lang="en-US" baseline="0" dirty="0" smtClean="0"/>
-                        <a:t> med </a:t>
-                      </a:r>
-                      <a:r>
-                        <a:rPr lang="en-US" baseline="0" dirty="0" err="1" smtClean="0"/>
-                        <a:t>navn</a:t>
-                      </a:r>
-                      <a:r>
-                        <a:rPr lang="en-US" baseline="0" dirty="0" smtClean="0"/>
-                        <a:t> A</a:t>
-                      </a:r>
-                      <a:endParaRPr lang="en-US" dirty="0"/>
-                    </a:p>
-                  </a:txBody>
-                  <a:tcPr/>
-                </a:tc>
-                <a:tc hMerge="1">
-                  <a:txBody>
-                    <a:bodyPr/>
-                    <a:lstStyle/>
-                    <a:p>
-                      <a:endParaRPr lang="en-US" dirty="0"/>
-                    </a:p>
-                  </a:txBody>
-                  <a:tcPr/>
-                </a:tc>
-                <a:extLst>
-                  <a:ext uri="{0D108BD9-81ED-4DB2-BD59-A6C34878D82A}">
-                    <a16:rowId xmlns:a16="http://schemas.microsoft.com/office/drawing/2014/main" val="759684523"/>
-                  </a:ext>
-                </a:extLst>
-              </a:tr>
-            </a:tbl>
-          </a:graphicData>
-        </a:graphic>
-      </p:graphicFrame>
-      <p:graphicFrame>
-        <p:nvGraphicFramePr>
-          <p:cNvPr id="19" name="Content Placeholder 6"/>
-          <p:cNvGraphicFramePr>
-            <a:graphicFrameLocks/>
-          </p:cNvGraphicFramePr>
-          <p:nvPr>
-            <p:extLst>
-              <p:ext uri="{D42A27DB-BD31-4B8C-83A1-F6EECF244321}">
-                <p14:modId xmlns:p14="http://schemas.microsoft.com/office/powerpoint/2010/main" val="2093922283"/>
-              </p:ext>
-            </p:extLst>
-          </p:nvPr>
-        </p:nvGraphicFramePr>
-        <p:xfrm>
-          <a:off x="7915103" y="235871"/>
-          <a:ext cx="3336174" cy="1808020"/>
-        </p:xfrm>
-        <a:graphic>
-          <a:graphicData uri="http://schemas.openxmlformats.org/drawingml/2006/table">
-            <a:tbl>
-              <a:tblPr firstRow="1" bandRow="1">
-                <a:tableStyleId>{F5AB1C69-6EDB-4FF4-983F-18BD219EF322}</a:tableStyleId>
-              </a:tblPr>
-              <a:tblGrid>
-                <a:gridCol w="1668087">
-                  <a:extLst>
-                    <a:ext uri="{9D8B030D-6E8A-4147-A177-3AD203B41FA5}">
-                      <a16:colId xmlns:a16="http://schemas.microsoft.com/office/drawing/2014/main" val="2557350480"/>
-                    </a:ext>
-                  </a:extLst>
-                </a:gridCol>
-                <a:gridCol w="1668087">
-                  <a:extLst>
-                    <a:ext uri="{9D8B030D-6E8A-4147-A177-3AD203B41FA5}">
-                      <a16:colId xmlns:a16="http://schemas.microsoft.com/office/drawing/2014/main" val="1661458923"/>
-                    </a:ext>
-                  </a:extLst>
-                </a:gridCol>
-              </a:tblGrid>
-              <a:tr h="360565">
-                <a:tc>
-                  <a:txBody>
-                    <a:bodyPr/>
-                    <a:lstStyle/>
-                    <a:p>
-                      <a:r>
-                        <a:rPr lang="en-US" dirty="0" smtClean="0"/>
-                        <a:t>Blob</a:t>
-                      </a:r>
-                      <a:endParaRPr lang="en-US" dirty="0"/>
-                    </a:p>
-                  </a:txBody>
-                  <a:tcPr/>
-                </a:tc>
-                <a:tc>
-                  <a:txBody>
-                    <a:bodyPr/>
-                    <a:lstStyle/>
-                    <a:p>
-                      <a:r>
-                        <a:rPr lang="en-US" dirty="0" smtClean="0"/>
-                        <a:t>Size</a:t>
-                      </a:r>
-                      <a:endParaRPr lang="en-US" dirty="0"/>
-                    </a:p>
-                  </a:txBody>
-                  <a:tcPr/>
-                </a:tc>
-                <a:extLst>
-                  <a:ext uri="{0D108BD9-81ED-4DB2-BD59-A6C34878D82A}">
-                    <a16:rowId xmlns:a16="http://schemas.microsoft.com/office/drawing/2014/main" val="17792059"/>
-                  </a:ext>
-                </a:extLst>
-              </a:tr>
-              <a:tr h="1442260">
-                <a:tc gridSpan="2">
-                  <a:txBody>
-                    <a:bodyPr/>
-                    <a:lstStyle/>
-                    <a:p>
-                      <a:r>
-                        <a:rPr lang="en-US" dirty="0" err="1" smtClean="0"/>
-                        <a:t>Dette</a:t>
-                      </a:r>
-                      <a:r>
-                        <a:rPr lang="en-US" baseline="0" dirty="0" smtClean="0"/>
-                        <a:t> </a:t>
-                      </a:r>
-                      <a:r>
-                        <a:rPr lang="en-US" baseline="0" dirty="0" err="1" smtClean="0"/>
-                        <a:t>er</a:t>
-                      </a:r>
-                      <a:r>
-                        <a:rPr lang="en-US" baseline="0" dirty="0" smtClean="0"/>
-                        <a:t> </a:t>
-                      </a:r>
-                      <a:r>
-                        <a:rPr lang="en-US" baseline="0" dirty="0" err="1" smtClean="0"/>
-                        <a:t>en</a:t>
-                      </a:r>
-                      <a:r>
-                        <a:rPr lang="en-US" baseline="0" dirty="0" smtClean="0"/>
-                        <a:t> </a:t>
-                      </a:r>
-                      <a:r>
-                        <a:rPr lang="en-US" baseline="0" dirty="0" err="1" smtClean="0"/>
-                        <a:t>testfil</a:t>
-                      </a:r>
-                      <a:r>
-                        <a:rPr lang="en-US" baseline="0" dirty="0" smtClean="0"/>
-                        <a:t> med </a:t>
-                      </a:r>
-                      <a:r>
-                        <a:rPr lang="en-US" baseline="0" dirty="0" err="1" smtClean="0"/>
-                        <a:t>navn</a:t>
-                      </a:r>
-                      <a:r>
-                        <a:rPr lang="en-US" baseline="0" dirty="0" smtClean="0"/>
-                        <a:t> B. </a:t>
-                      </a:r>
-                      <a:endParaRPr lang="en-US" dirty="0"/>
-                    </a:p>
-                  </a:txBody>
-                  <a:tcPr/>
-                </a:tc>
-                <a:tc hMerge="1">
-                  <a:txBody>
-                    <a:bodyPr/>
-                    <a:lstStyle/>
-                    <a:p>
-                      <a:endParaRPr lang="en-US" dirty="0"/>
-                    </a:p>
-                  </a:txBody>
-                  <a:tcPr/>
-                </a:tc>
-                <a:extLst>
-                  <a:ext uri="{0D108BD9-81ED-4DB2-BD59-A6C34878D82A}">
-                    <a16:rowId xmlns:a16="http://schemas.microsoft.com/office/drawing/2014/main" val="759684523"/>
-                  </a:ext>
-                </a:extLst>
-              </a:tr>
-            </a:tbl>
-          </a:graphicData>
-        </a:graphic>
-      </p:graphicFrame>
-      <p:cxnSp>
-        <p:nvCxnSpPr>
-          <p:cNvPr id="21" name="Straight Connector 20"/>
-          <p:cNvCxnSpPr/>
-          <p:nvPr/>
-        </p:nvCxnSpPr>
-        <p:spPr>
-          <a:xfrm flipV="1">
-            <a:off x="7082444" y="1559155"/>
-            <a:ext cx="1379913" cy="1458365"/>
-          </a:xfrm>
-          <a:prstGeom prst="line">
-            <a:avLst/>
-          </a:prstGeom>
-          <a:ln>
-            <a:solidFill>
-              <a:schemeClr val="accent6">
-                <a:lumMod val="60000"/>
-                <a:lumOff val="40000"/>
-              </a:schemeClr>
-            </a:solidFill>
-          </a:ln>
-        </p:spPr>
-        <p:style>
-          <a:lnRef idx="1">
-            <a:schemeClr val="accent1"/>
-          </a:lnRef>
-          <a:fillRef idx="0">
-            <a:schemeClr val="accent1"/>
-          </a:fillRef>
-          <a:effectRef idx="0">
-            <a:schemeClr val="accent1"/>
-          </a:effectRef>
-          <a:fontRef idx="minor">
-            <a:schemeClr val="tx1"/>
-          </a:fontRef>
-        </p:style>
-      </p:cxnSp>
-      <p:cxnSp>
-        <p:nvCxnSpPr>
-          <p:cNvPr id="23" name="Straight Connector 22"/>
-          <p:cNvCxnSpPr/>
-          <p:nvPr/>
-        </p:nvCxnSpPr>
-        <p:spPr>
-          <a:xfrm>
-            <a:off x="7082444" y="3480952"/>
-            <a:ext cx="1379913" cy="1997135"/>
-          </a:xfrm>
-          <a:prstGeom prst="line">
-            <a:avLst/>
-          </a:prstGeom>
-          <a:ln>
-            <a:solidFill>
-              <a:schemeClr val="accent6">
-                <a:lumMod val="60000"/>
-                <a:lumOff val="40000"/>
-              </a:schemeClr>
-            </a:solidFill>
-          </a:ln>
-        </p:spPr>
-        <p:style>
-          <a:lnRef idx="1">
-            <a:schemeClr val="accent1"/>
-          </a:lnRef>
-          <a:fillRef idx="0">
-            <a:schemeClr val="accent1"/>
-          </a:fillRef>
-          <a:effectRef idx="0">
-            <a:schemeClr val="accent1"/>
-          </a:effectRef>
-          <a:fontRef idx="minor">
-            <a:schemeClr val="tx1"/>
-          </a:fontRef>
-        </p:style>
-      </p:cxnSp>
     </p:spTree>
     <p:extLst>
       <p:ext uri="{BB962C8B-B14F-4D97-AF65-F5344CB8AC3E}">
@@ -5573,357 +5495,18 @@
   <p:clrMapOvr>
     <a:masterClrMapping/>
   </p:clrMapOvr>
-  <mc:AlternateContent xmlns:mc="http://schemas.openxmlformats.org/markup-compatibility/2006">
-    <mc:Choice xmlns:p14="http://schemas.microsoft.com/office/powerpoint/2010/main" Requires="p14">
+  <mc:AlternateContent xmlns:mc="http://schemas.openxmlformats.org/markup-compatibility/2006" xmlns:p14="http://schemas.microsoft.com/office/powerpoint/2010/main">
+    <mc:Choice Requires="p14">
       <p:transition p14:dur="10"/>
     </mc:Choice>
-    <mc:Fallback>
+    <mc:Fallback xmlns="">
       <p:transition/>
     </mc:Fallback>
   </mc:AlternateContent>
   <p:timing>
     <p:tnLst>
       <p:par>
-        <p:cTn id="1" dur="indefinite" restart="never" nodeType="tmRoot">
-          <p:childTnLst>
-            <p:seq concurrent="1" nextAc="seek">
-              <p:cTn id="2" dur="indefinite" nodeType="mainSeq">
-                <p:childTnLst>
-                  <p:par>
-                    <p:cTn id="3" fill="hold">
-                      <p:stCondLst>
-                        <p:cond delay="indefinite"/>
-                      </p:stCondLst>
-                      <p:childTnLst>
-                        <p:par>
-                          <p:cTn id="4" fill="hold">
-                            <p:stCondLst>
-                              <p:cond delay="0"/>
-                            </p:stCondLst>
-                            <p:childTnLst>
-                              <p:par>
-                                <p:cTn id="5" presetID="10" presetClass="exit" presetSubtype="0" fill="hold" nodeType="clickEffect">
-                                  <p:stCondLst>
-                                    <p:cond delay="0"/>
-                                  </p:stCondLst>
-                                  <p:childTnLst>
-                                    <p:animEffect transition="out" filter="fade">
-                                      <p:cBhvr>
-                                        <p:cTn id="6" dur="500"/>
-                                        <p:tgtEl>
-                                          <p:spTgt spid="8"/>
-                                        </p:tgtEl>
-                                      </p:cBhvr>
-                                    </p:animEffect>
-                                    <p:set>
-                                      <p:cBhvr>
-                                        <p:cTn id="7" dur="1" fill="hold">
-                                          <p:stCondLst>
-                                            <p:cond delay="499"/>
-                                          </p:stCondLst>
-                                        </p:cTn>
-                                        <p:tgtEl>
-                                          <p:spTgt spid="8"/>
-                                        </p:tgtEl>
-                                        <p:attrNameLst>
-                                          <p:attrName>style.visibility</p:attrName>
-                                        </p:attrNameLst>
-                                      </p:cBhvr>
-                                      <p:to>
-                                        <p:strVal val="hidden"/>
-                                      </p:to>
-                                    </p:set>
-                                  </p:childTnLst>
-                                </p:cTn>
-                              </p:par>
-                              <p:par>
-                                <p:cTn id="8" presetID="10" presetClass="exit" presetSubtype="0" fill="hold" nodeType="withEffect">
-                                  <p:stCondLst>
-                                    <p:cond delay="0"/>
-                                  </p:stCondLst>
-                                  <p:childTnLst>
-                                    <p:animEffect transition="out" filter="fade">
-                                      <p:cBhvr>
-                                        <p:cTn id="9" dur="500"/>
-                                        <p:tgtEl>
-                                          <p:spTgt spid="7"/>
-                                        </p:tgtEl>
-                                      </p:cBhvr>
-                                    </p:animEffect>
-                                    <p:set>
-                                      <p:cBhvr>
-                                        <p:cTn id="10" dur="1" fill="hold">
-                                          <p:stCondLst>
-                                            <p:cond delay="499"/>
-                                          </p:stCondLst>
-                                        </p:cTn>
-                                        <p:tgtEl>
-                                          <p:spTgt spid="7"/>
-                                        </p:tgtEl>
-                                        <p:attrNameLst>
-                                          <p:attrName>style.visibility</p:attrName>
-                                        </p:attrNameLst>
-                                      </p:cBhvr>
-                                      <p:to>
-                                        <p:strVal val="hidden"/>
-                                      </p:to>
-                                    </p:set>
-                                  </p:childTnLst>
-                                </p:cTn>
-                              </p:par>
-                              <p:par>
-                                <p:cTn id="11" presetID="10" presetClass="exit" presetSubtype="0" fill="hold" nodeType="withEffect">
-                                  <p:stCondLst>
-                                    <p:cond delay="0"/>
-                                  </p:stCondLst>
-                                  <p:childTnLst>
-                                    <p:animEffect transition="out" filter="fade">
-                                      <p:cBhvr>
-                                        <p:cTn id="12" dur="500"/>
-                                        <p:tgtEl>
-                                          <p:spTgt spid="15"/>
-                                        </p:tgtEl>
-                                      </p:cBhvr>
-                                    </p:animEffect>
-                                    <p:set>
-                                      <p:cBhvr>
-                                        <p:cTn id="13" dur="1" fill="hold">
-                                          <p:stCondLst>
-                                            <p:cond delay="499"/>
-                                          </p:stCondLst>
-                                        </p:cTn>
-                                        <p:tgtEl>
-                                          <p:spTgt spid="15"/>
-                                        </p:tgtEl>
-                                        <p:attrNameLst>
-                                          <p:attrName>style.visibility</p:attrName>
-                                        </p:attrNameLst>
-                                      </p:cBhvr>
-                                      <p:to>
-                                        <p:strVal val="hidden"/>
-                                      </p:to>
-                                    </p:set>
-                                  </p:childTnLst>
-                                </p:cTn>
-                              </p:par>
-                            </p:childTnLst>
-                          </p:cTn>
-                        </p:par>
-                      </p:childTnLst>
-                    </p:cTn>
-                  </p:par>
-                  <p:par>
-                    <p:cTn id="14" fill="hold">
-                      <p:stCondLst>
-                        <p:cond delay="indefinite"/>
-                      </p:stCondLst>
-                      <p:childTnLst>
-                        <p:par>
-                          <p:cTn id="15" fill="hold">
-                            <p:stCondLst>
-                              <p:cond delay="0"/>
-                            </p:stCondLst>
-                            <p:childTnLst>
-                              <p:par>
-                                <p:cTn id="16" presetID="10" presetClass="entr" presetSubtype="0" fill="hold" nodeType="clickEffect">
-                                  <p:stCondLst>
-                                    <p:cond delay="0"/>
-                                  </p:stCondLst>
-                                  <p:childTnLst>
-                                    <p:set>
-                                      <p:cBhvr>
-                                        <p:cTn id="17" dur="1" fill="hold">
-                                          <p:stCondLst>
-                                            <p:cond delay="0"/>
-                                          </p:stCondLst>
-                                        </p:cTn>
-                                        <p:tgtEl>
-                                          <p:spTgt spid="17"/>
-                                        </p:tgtEl>
-                                        <p:attrNameLst>
-                                          <p:attrName>style.visibility</p:attrName>
-                                        </p:attrNameLst>
-                                      </p:cBhvr>
-                                      <p:to>
-                                        <p:strVal val="visible"/>
-                                      </p:to>
-                                    </p:set>
-                                    <p:animEffect transition="in" filter="fade">
-                                      <p:cBhvr>
-                                        <p:cTn id="18" dur="500"/>
-                                        <p:tgtEl>
-                                          <p:spTgt spid="17"/>
-                                        </p:tgtEl>
-                                      </p:cBhvr>
-                                    </p:animEffect>
-                                  </p:childTnLst>
-                                </p:cTn>
-                              </p:par>
-                              <p:par>
-                                <p:cTn id="19" presetID="10" presetClass="entr" presetSubtype="0" fill="hold" nodeType="withEffect">
-                                  <p:stCondLst>
-                                    <p:cond delay="0"/>
-                                  </p:stCondLst>
-                                  <p:childTnLst>
-                                    <p:set>
-                                      <p:cBhvr>
-                                        <p:cTn id="20" dur="1" fill="hold">
-                                          <p:stCondLst>
-                                            <p:cond delay="0"/>
-                                          </p:stCondLst>
-                                        </p:cTn>
-                                        <p:tgtEl>
-                                          <p:spTgt spid="21"/>
-                                        </p:tgtEl>
-                                        <p:attrNameLst>
-                                          <p:attrName>style.visibility</p:attrName>
-                                        </p:attrNameLst>
-                                      </p:cBhvr>
-                                      <p:to>
-                                        <p:strVal val="visible"/>
-                                      </p:to>
-                                    </p:set>
-                                    <p:animEffect transition="in" filter="fade">
-                                      <p:cBhvr>
-                                        <p:cTn id="21" dur="500"/>
-                                        <p:tgtEl>
-                                          <p:spTgt spid="21"/>
-                                        </p:tgtEl>
-                                      </p:cBhvr>
-                                    </p:animEffect>
-                                  </p:childTnLst>
-                                </p:cTn>
-                              </p:par>
-                              <p:par>
-                                <p:cTn id="22" presetID="10" presetClass="entr" presetSubtype="0" fill="hold" nodeType="withEffect">
-                                  <p:stCondLst>
-                                    <p:cond delay="0"/>
-                                  </p:stCondLst>
-                                  <p:childTnLst>
-                                    <p:set>
-                                      <p:cBhvr>
-                                        <p:cTn id="23" dur="1" fill="hold">
-                                          <p:stCondLst>
-                                            <p:cond delay="0"/>
-                                          </p:stCondLst>
-                                        </p:cTn>
-                                        <p:tgtEl>
-                                          <p:spTgt spid="23"/>
-                                        </p:tgtEl>
-                                        <p:attrNameLst>
-                                          <p:attrName>style.visibility</p:attrName>
-                                        </p:attrNameLst>
-                                      </p:cBhvr>
-                                      <p:to>
-                                        <p:strVal val="visible"/>
-                                      </p:to>
-                                    </p:set>
-                                    <p:animEffect transition="in" filter="fade">
-                                      <p:cBhvr>
-                                        <p:cTn id="24" dur="500"/>
-                                        <p:tgtEl>
-                                          <p:spTgt spid="23"/>
-                                        </p:tgtEl>
-                                      </p:cBhvr>
-                                    </p:animEffect>
-                                  </p:childTnLst>
-                                </p:cTn>
-                              </p:par>
-                              <p:par>
-                                <p:cTn id="25" presetID="10" presetClass="entr" presetSubtype="0" fill="hold" nodeType="withEffect">
-                                  <p:stCondLst>
-                                    <p:cond delay="0"/>
-                                  </p:stCondLst>
-                                  <p:childTnLst>
-                                    <p:set>
-                                      <p:cBhvr>
-                                        <p:cTn id="26" dur="1" fill="hold">
-                                          <p:stCondLst>
-                                            <p:cond delay="0"/>
-                                          </p:stCondLst>
-                                        </p:cTn>
-                                        <p:tgtEl>
-                                          <p:spTgt spid="18"/>
-                                        </p:tgtEl>
-                                        <p:attrNameLst>
-                                          <p:attrName>style.visibility</p:attrName>
-                                        </p:attrNameLst>
-                                      </p:cBhvr>
-                                      <p:to>
-                                        <p:strVal val="visible"/>
-                                      </p:to>
-                                    </p:set>
-                                    <p:animEffect transition="in" filter="fade">
-                                      <p:cBhvr>
-                                        <p:cTn id="27" dur="500"/>
-                                        <p:tgtEl>
-                                          <p:spTgt spid="18"/>
-                                        </p:tgtEl>
-                                      </p:cBhvr>
-                                    </p:animEffect>
-                                  </p:childTnLst>
-                                </p:cTn>
-                              </p:par>
-                              <p:par>
-                                <p:cTn id="28" presetID="10" presetClass="entr" presetSubtype="0" fill="hold" nodeType="withEffect">
-                                  <p:stCondLst>
-                                    <p:cond delay="0"/>
-                                  </p:stCondLst>
-                                  <p:childTnLst>
-                                    <p:set>
-                                      <p:cBhvr>
-                                        <p:cTn id="29" dur="1" fill="hold">
-                                          <p:stCondLst>
-                                            <p:cond delay="0"/>
-                                          </p:stCondLst>
-                                        </p:cTn>
-                                        <p:tgtEl>
-                                          <p:spTgt spid="19"/>
-                                        </p:tgtEl>
-                                        <p:attrNameLst>
-                                          <p:attrName>style.visibility</p:attrName>
-                                        </p:attrNameLst>
-                                      </p:cBhvr>
-                                      <p:to>
-                                        <p:strVal val="visible"/>
-                                      </p:to>
-                                    </p:set>
-                                    <p:animEffect transition="in" filter="fade">
-                                      <p:cBhvr>
-                                        <p:cTn id="30" dur="500"/>
-                                        <p:tgtEl>
-                                          <p:spTgt spid="19"/>
-                                        </p:tgtEl>
-                                      </p:cBhvr>
-                                    </p:animEffect>
-                                  </p:childTnLst>
-                                </p:cTn>
-                              </p:par>
-                            </p:childTnLst>
-                          </p:cTn>
-                        </p:par>
-                      </p:childTnLst>
-                    </p:cTn>
-                  </p:par>
-                </p:childTnLst>
-              </p:cTn>
-              <p:prevCondLst>
-                <p:cond evt="onPrev" delay="0">
-                  <p:tgtEl>
-                    <p:sldTgt/>
-                  </p:tgtEl>
-                </p:cond>
-              </p:prevCondLst>
-              <p:nextCondLst>
-                <p:cond evt="onNext" delay="0">
-                  <p:tgtEl>
-                    <p:sldTgt/>
-                  </p:tgtEl>
-                </p:cond>
-              </p:nextCondLst>
-            </p:seq>
-          </p:childTnLst>
-        </p:cTn>
+        <p:cTn id="1" dur="indefinite" restart="never" nodeType="tmRoot"/>
       </p:par>
     </p:tnLst>
   </p:timing>
@@ -5986,14 +5569,20 @@
           <a:lstStyle/>
           <a:p>
             <a:r>
+              <a:rPr lang="en-US" dirty="0"/>
+              <a:t> </a:t>
+            </a:r>
+            <a:r>
               <a:rPr lang="en-US" dirty="0" smtClean="0">
                 <a:solidFill>
-                  <a:schemeClr val="accent2">
-                    <a:lumMod val="75000"/>
-                  </a:schemeClr>
+                  <a:srgbClr val="FFC000"/>
                 </a:solidFill>
               </a:rPr>
-              <a:t>0fe1ea12bad0d454628ed93045e460f66bc35e4d</a:t>
+              <a:t>7e865</a:t>
+            </a:r>
+            <a:r>
+              <a:rPr lang="en-US" dirty="0" smtClean="0"/>
+              <a:t>d7c60b5d5ef2fc6ccc541d2980d871b4372</a:t>
             </a:r>
           </a:p>
           <a:p>
@@ -6003,7 +5592,15 @@
             </a:r>
             <a:r>
               <a:rPr lang="en-US" dirty="0" smtClean="0"/>
-              <a:t> Checksum, </a:t>
+              <a:t> </a:t>
+            </a:r>
+            <a:r>
+              <a:rPr lang="en-US" dirty="0" err="1" smtClean="0"/>
+              <a:t>sjekksum</a:t>
+            </a:r>
+            <a:r>
+              <a:rPr lang="en-US" dirty="0" smtClean="0"/>
+              <a:t>, </a:t>
             </a:r>
             <a:r>
               <a:rPr lang="en-US" dirty="0" err="1" smtClean="0"/>
@@ -6024,12 +5621,16 @@
           </a:p>
           <a:p>
             <a:r>
-              <a:rPr lang="en-US" dirty="0" smtClean="0"/>
-              <a:t>De 7 </a:t>
-            </a:r>
-            <a:r>
               <a:rPr lang="en-US" dirty="0" err="1" smtClean="0"/>
-              <a:t>første</a:t>
+              <a:t>Trenger</a:t>
+            </a:r>
+            <a:r>
+              <a:rPr lang="en-US" dirty="0" smtClean="0"/>
+              <a:t> bare å </a:t>
+            </a:r>
+            <a:r>
+              <a:rPr lang="en-US" dirty="0" err="1" smtClean="0"/>
+              <a:t>skrive</a:t>
             </a:r>
             <a:r>
               <a:rPr lang="en-US" dirty="0" smtClean="0"/>
@@ -6037,11 +5638,59 @@
             </a:r>
             <a:r>
               <a:rPr lang="en-US" dirty="0" err="1" smtClean="0"/>
-              <a:t>karakterene</a:t>
+              <a:t>nok</a:t>
             </a:r>
             <a:r>
               <a:rPr lang="en-US" dirty="0" smtClean="0"/>
               <a:t> </a:t>
+            </a:r>
+            <a:r>
+              <a:rPr lang="en-US" dirty="0" err="1" smtClean="0"/>
+              <a:t>tegn</a:t>
+            </a:r>
+            <a:r>
+              <a:rPr lang="en-US" dirty="0" smtClean="0"/>
+              <a:t> </a:t>
+            </a:r>
+            <a:r>
+              <a:rPr lang="en-US" dirty="0" err="1" smtClean="0"/>
+              <a:t>til</a:t>
+            </a:r>
+            <a:r>
+              <a:rPr lang="en-US" dirty="0" smtClean="0"/>
+              <a:t> at </a:t>
+            </a:r>
+            <a:r>
+              <a:rPr lang="en-US" dirty="0" err="1" smtClean="0"/>
+              <a:t>comitten</a:t>
+            </a:r>
+            <a:r>
+              <a:rPr lang="en-US" dirty="0" smtClean="0"/>
+              <a:t> </a:t>
+            </a:r>
+            <a:r>
+              <a:rPr lang="en-US" dirty="0" err="1" smtClean="0"/>
+              <a:t>er</a:t>
+            </a:r>
+            <a:r>
+              <a:rPr lang="en-US" dirty="0" smtClean="0"/>
+              <a:t> </a:t>
+            </a:r>
+            <a:r>
+              <a:rPr lang="en-US" dirty="0" err="1" smtClean="0"/>
+              <a:t>unik</a:t>
+            </a:r>
+            <a:r>
+              <a:rPr lang="en-US" dirty="0" smtClean="0"/>
+              <a:t>, </a:t>
+            </a:r>
+            <a:r>
+              <a:rPr lang="en-US" dirty="0" err="1" smtClean="0"/>
+              <a:t>ofte</a:t>
+            </a:r>
+            <a:r>
+              <a:rPr lang="en-US" dirty="0" smtClean="0"/>
+              <a:t> bare ~4</a:t>
             </a:r>
           </a:p>
           <a:p>
@@ -6049,6 +5698,30 @@
           </a:p>
         </p:txBody>
       </p:sp>
+      <p:pic>
+        <p:nvPicPr>
+          <p:cNvPr id="7" name="Picture 6"/>
+          <p:cNvPicPr>
+            <a:picLocks noChangeAspect="1"/>
+          </p:cNvPicPr>
+          <p:nvPr/>
+        </p:nvPicPr>
+        <p:blipFill>
+          <a:blip r:embed="rId2"/>
+          <a:stretch>
+            <a:fillRect/>
+          </a:stretch>
+        </p:blipFill>
+        <p:spPr>
+          <a:xfrm>
+            <a:off x="1371600" y="1695376"/>
+            <a:ext cx="5249008" cy="533474"/>
+          </a:xfrm>
+          <a:prstGeom prst="rect">
+            <a:avLst/>
+          </a:prstGeom>
+        </p:spPr>
+      </p:pic>
     </p:spTree>
     <p:extLst>
       <p:ext uri="{BB962C8B-B14F-4D97-AF65-F5344CB8AC3E}">
@@ -6113,30 +5786,6 @@
           </a:p>
         </p:txBody>
       </p:sp>
-      <p:pic>
-        <p:nvPicPr>
-          <p:cNvPr id="4" name="Picture 3"/>
-          <p:cNvPicPr>
-            <a:picLocks noChangeAspect="1"/>
-          </p:cNvPicPr>
-          <p:nvPr/>
-        </p:nvPicPr>
-        <p:blipFill>
-          <a:blip r:embed="rId2"/>
-          <a:stretch>
-            <a:fillRect/>
-          </a:stretch>
-        </p:blipFill>
-        <p:spPr>
-          <a:xfrm>
-            <a:off x="6558456" y="1620981"/>
-            <a:ext cx="5403549" cy="3817880"/>
-          </a:xfrm>
-          <a:prstGeom prst="rect">
-            <a:avLst/>
-          </a:prstGeom>
-        </p:spPr>
-      </p:pic>
       <p:graphicFrame>
         <p:nvGraphicFramePr>
           <p:cNvPr id="6" name="Table 5"/>
@@ -6146,36 +5795,29 @@
           <p:nvPr>
             <p:extLst>
               <p:ext uri="{D42A27DB-BD31-4B8C-83A1-F6EECF244321}">
-                <p14:modId xmlns:p14="http://schemas.microsoft.com/office/powerpoint/2010/main" val="2050025088"/>
+                <p14:modId xmlns:p14="http://schemas.microsoft.com/office/powerpoint/2010/main" val="3516993999"/>
               </p:ext>
             </p:extLst>
           </p:nvPr>
         </p:nvGraphicFramePr>
         <p:xfrm>
-          <a:off x="1093267" y="1620981"/>
-          <a:ext cx="5186856" cy="3736952"/>
+          <a:off x="1093266" y="1620981"/>
+          <a:ext cx="3985809" cy="3543560"/>
         </p:xfrm>
         <a:graphic>
           <a:graphicData uri="http://schemas.openxmlformats.org/drawingml/2006/table">
             <a:tbl>
               <a:tblPr/>
               <a:tblGrid>
-                <a:gridCol w="2593428">
+                <a:gridCol w="3985809">
                   <a:extLst>
                     <a:ext uri="{9D8B030D-6E8A-4147-A177-3AD203B41FA5}">
                       <a16:colId xmlns:a16="http://schemas.microsoft.com/office/drawing/2014/main" val="285825280"/>
                     </a:ext>
                   </a:extLst>
                 </a:gridCol>
-                <a:gridCol w="2593428">
-                  <a:extLst>
-                    <a:ext uri="{9D8B030D-6E8A-4147-A177-3AD203B41FA5}">
-                      <a16:colId xmlns:a16="http://schemas.microsoft.com/office/drawing/2014/main" val="1455022201"/>
-                    </a:ext>
-                  </a:extLst>
-                </a:gridCol>
               </a:tblGrid>
-              <a:tr h="209944">
+              <a:tr h="175139">
                 <a:tc>
                   <a:txBody>
                     <a:bodyPr/>
@@ -6183,56 +5825,11 @@
                     <a:p>
                       <a:pPr algn="l"/>
                       <a:r>
-                        <a:rPr lang="en-US" sz="1000" b="1">
+                        <a:rPr lang="en-US" sz="1000" b="1" dirty="0">
                           <a:effectLst/>
                           <a:latin typeface="Arial" panose="020B0604020202020204" pitchFamily="34" charset="0"/>
                         </a:rPr>
                         <a:t>Option</a:t>
-                      </a:r>
-                    </a:p>
-                  </a:txBody>
-                  <a:tcPr marL="30874" marR="30874" marT="30874" marB="30874" anchor="ctr">
-                    <a:lnL>
-                      <a:noFill/>
-                    </a:lnL>
-                    <a:lnR>
-                      <a:noFill/>
-                    </a:lnR>
-                    <a:lnT w="9525" cap="flat" cmpd="sng" algn="ctr">
-                      <a:solidFill>
-                        <a:srgbClr val="888888"/>
-                      </a:solidFill>
-                      <a:prstDash val="solid"/>
-                      <a:round/>
-                      <a:headEnd type="none" w="med" len="med"/>
-                      <a:tailEnd type="none" w="med" len="med"/>
-                    </a:lnT>
-                    <a:lnB w="9525" cap="flat" cmpd="sng" algn="ctr">
-                      <a:solidFill>
-                        <a:srgbClr val="888888"/>
-                      </a:solidFill>
-                      <a:prstDash val="solid"/>
-                      <a:round/>
-                      <a:headEnd type="none" w="med" len="med"/>
-                      <a:tailEnd type="none" w="med" len="med"/>
-                    </a:lnB>
-                    <a:solidFill>
-                      <a:srgbClr val="FCFCFA"/>
-                    </a:solidFill>
-                  </a:tcPr>
-                </a:tc>
-                <a:tc>
-                  <a:txBody>
-                    <a:bodyPr/>
-                    <a:lstStyle/>
-                    <a:p>
-                      <a:pPr algn="l"/>
-                      <a:r>
-                        <a:rPr lang="en-US" sz="1000" b="1">
-                          <a:effectLst/>
-                          <a:latin typeface="Arial" panose="020B0604020202020204" pitchFamily="34" charset="0"/>
-                        </a:rPr>
-                        <a:t>Description</a:t>
                       </a:r>
                     </a:p>
                   </a:txBody>
@@ -6272,69 +5869,25 @@
                   </a:ext>
                 </a:extLst>
               </a:tr>
-              <a:tr h="209944">
+              <a:tr h="225171">
                 <a:tc>
                   <a:txBody>
                     <a:bodyPr/>
                     <a:lstStyle/>
                     <a:p>
                       <a:r>
-                        <a:rPr lang="en-US" sz="1000">
-                          <a:effectLst/>
-                          <a:latin typeface="+mn-lt"/>
-                        </a:rPr>
-                        <a:t>-p</a:t>
-                      </a:r>
-                    </a:p>
-                  </a:txBody>
-                  <a:tcPr marL="30874" marR="30874" marT="30874" marB="30874" anchor="ctr">
-                    <a:lnL>
-                      <a:noFill/>
-                    </a:lnL>
-                    <a:lnR>
-                      <a:noFill/>
-                    </a:lnR>
-                    <a:lnT w="9525" cap="flat" cmpd="sng" algn="ctr">
-                      <a:solidFill>
-                        <a:srgbClr val="888888"/>
-                      </a:solidFill>
-                      <a:prstDash val="solid"/>
-                      <a:round/>
-                      <a:headEnd type="none" w="med" len="med"/>
-                      <a:tailEnd type="none" w="med" len="med"/>
-                    </a:lnT>
-                    <a:lnB>
-                      <a:noFill/>
-                    </a:lnB>
-                    <a:solidFill>
-                      <a:srgbClr val="FCFCFA"/>
-                    </a:solidFill>
-                  </a:tcPr>
-                </a:tc>
-                <a:tc>
-                  <a:txBody>
-                    <a:bodyPr/>
-                    <a:lstStyle/>
-                    <a:p>
-                      <a:r>
-                        <a:rPr lang="en-US" sz="1000" dirty="0" smtClean="0">
-                          <a:latin typeface="+mn-lt"/>
-                        </a:rPr>
-                        <a:t> </a:t>
-                      </a:r>
-                      <a:r>
-                        <a:rPr lang="en-US" sz="1000" dirty="0" err="1" smtClean="0">
+                        <a:rPr lang="en-US" sz="1600" dirty="0" err="1" smtClean="0">
                           <a:latin typeface="+mn-lt"/>
                         </a:rPr>
                         <a:t>git</a:t>
                       </a:r>
                       <a:r>
-                        <a:rPr lang="en-US" sz="1000" dirty="0" smtClean="0">
+                        <a:rPr lang="en-US" sz="1600" dirty="0" smtClean="0">
                           <a:latin typeface="+mn-lt"/>
                         </a:rPr>
                         <a:t> log --since "10 hours ago"</a:t>
                       </a:r>
-                      <a:endParaRPr lang="en-US" sz="1000" dirty="0">
+                      <a:endParaRPr lang="en-US" sz="1600" dirty="0">
                         <a:latin typeface="+mn-lt"/>
                       </a:endParaRPr>
                     </a:p>
@@ -6369,61 +5922,29 @@
                   </a:ext>
                 </a:extLst>
               </a:tr>
-              <a:tr h="358140">
+              <a:tr h="404843">
                 <a:tc>
                   <a:txBody>
                     <a:bodyPr/>
                     <a:lstStyle/>
                     <a:p>
                       <a:r>
-                        <a:rPr lang="en-US" sz="1000" dirty="0">
-                          <a:effectLst/>
-                          <a:latin typeface="+mn-lt"/>
-                        </a:rPr>
-                        <a:t>--stat</a:t>
-                      </a:r>
-                    </a:p>
-                  </a:txBody>
-                  <a:tcPr marL="30874" marR="30874" marT="30874" marB="30874" anchor="ctr">
-                    <a:lnL>
-                      <a:noFill/>
-                    </a:lnL>
-                    <a:lnR>
-                      <a:noFill/>
-                    </a:lnR>
-                    <a:lnT>
-                      <a:noFill/>
-                    </a:lnT>
-                    <a:lnB>
-                      <a:noFill/>
-                    </a:lnB>
-                    <a:solidFill>
-                      <a:srgbClr val="FCFCFA"/>
-                    </a:solidFill>
-                  </a:tcPr>
-                </a:tc>
-                <a:tc>
-                  <a:txBody>
-                    <a:bodyPr/>
-                    <a:lstStyle/>
-                    <a:p>
-                      <a:r>
-                        <a:rPr lang="en-US" sz="1000" dirty="0" err="1" smtClean="0"/>
+                        <a:rPr lang="en-US" sz="1600" dirty="0" err="1" smtClean="0"/>
                         <a:t>git</a:t>
                       </a:r>
                       <a:r>
-                        <a:rPr lang="en-US" sz="1000" dirty="0" smtClean="0"/>
+                        <a:rPr lang="en-US" sz="1600" dirty="0" smtClean="0"/>
                         <a:t> </a:t>
                       </a:r>
                       <a:r>
-                        <a:rPr lang="en-US" sz="1000" dirty="0" err="1" smtClean="0"/>
+                        <a:rPr lang="en-US" sz="1600" dirty="0" err="1" smtClean="0"/>
                         <a:t>whatchanged</a:t>
                       </a:r>
                       <a:r>
-                        <a:rPr lang="en-US" sz="1000" dirty="0" smtClean="0"/>
+                        <a:rPr lang="en-US" sz="1600" dirty="0" smtClean="0"/>
                         <a:t> --since '04/14/2013' --until '05/22/2014</a:t>
                       </a:r>
-                      <a:endParaRPr lang="en-US" sz="1000" dirty="0">
+                      <a:endParaRPr lang="en-US" sz="1600" dirty="0">
                         <a:latin typeface="+mn-lt"/>
                       </a:endParaRPr>
                     </a:p>
@@ -6452,68 +5973,37 @@
                   </a:ext>
                 </a:extLst>
               </a:tr>
-              <a:tr h="358140">
+              <a:tr h="225171">
                 <a:tc>
                   <a:txBody>
                     <a:bodyPr/>
                     <a:lstStyle/>
                     <a:p>
                       <a:r>
-                        <a:rPr lang="en-US" sz="1000" dirty="0">
-                          <a:effectLst/>
-                          <a:latin typeface="+mn-lt"/>
-                        </a:rPr>
+                        <a:rPr lang="en-US" sz="1600" dirty="0" err="1" smtClean="0"/>
+                        <a:t>git</a:t>
+                      </a:r>
+                      <a:r>
+                        <a:rPr lang="en-US" sz="1600" dirty="0" smtClean="0"/>
+                        <a:t> log</a:t>
+                      </a:r>
+                      <a:r>
+                        <a:rPr lang="en-US" sz="1600" baseline="0" dirty="0" smtClean="0"/>
+                        <a:t> </a:t>
+                      </a:r>
+                      <a:r>
+                        <a:rPr lang="en-US" sz="1600" dirty="0" smtClean="0"/>
                         <a:t>--</a:t>
                       </a:r>
                       <a:r>
-                        <a:rPr lang="en-US" sz="1000" dirty="0" err="1">
-                          <a:effectLst/>
-                          <a:latin typeface="+mn-lt"/>
-                        </a:rPr>
-                        <a:t>shortstat</a:t>
-                      </a:r>
-                      <a:endParaRPr lang="en-US" sz="1000" dirty="0">
-                        <a:effectLst/>
-                        <a:latin typeface="+mn-lt"/>
-                      </a:endParaRPr>
-                    </a:p>
-                  </a:txBody>
-                  <a:tcPr marL="30874" marR="30874" marT="30874" marB="30874" anchor="ctr">
-                    <a:lnL>
-                      <a:noFill/>
-                    </a:lnL>
-                    <a:lnR>
-                      <a:noFill/>
-                    </a:lnR>
-                    <a:lnT>
-                      <a:noFill/>
-                    </a:lnT>
-                    <a:lnB>
-                      <a:noFill/>
-                    </a:lnB>
-                    <a:solidFill>
-                      <a:srgbClr val="FCFCFA"/>
-                    </a:solidFill>
-                  </a:tcPr>
-                </a:tc>
-                <a:tc>
-                  <a:txBody>
-                    <a:bodyPr/>
-                    <a:lstStyle/>
-                    <a:p>
-                      <a:r>
-                        <a:rPr lang="en-US" sz="1000" dirty="0" smtClean="0"/>
-                        <a:t>--</a:t>
-                      </a:r>
-                      <a:r>
-                        <a:rPr lang="en-US" sz="1000" dirty="0" err="1" smtClean="0"/>
+                        <a:rPr lang="en-US" sz="1600" dirty="0" err="1" smtClean="0"/>
                         <a:t>oneline</a:t>
                       </a:r>
                       <a:r>
-                        <a:rPr lang="en-US" sz="1000" dirty="0" smtClean="0"/>
+                        <a:rPr lang="en-US" sz="1600" dirty="0" smtClean="0"/>
                         <a:t> </a:t>
                       </a:r>
-                      <a:endParaRPr lang="en-US" sz="1000" dirty="0">
+                      <a:endParaRPr lang="en-US" sz="1600" dirty="0">
                         <a:latin typeface="+mn-lt"/>
                       </a:endParaRPr>
                     </a:p>
@@ -6542,39 +6032,7 @@
                   </a:ext>
                 </a:extLst>
               </a:tr>
-              <a:tr h="358140">
-                <a:tc>
-                  <a:txBody>
-                    <a:bodyPr/>
-                    <a:lstStyle/>
-                    <a:p>
-                      <a:r>
-                        <a:rPr lang="en-US" sz="1000" dirty="0">
-                          <a:effectLst/>
-                          <a:latin typeface="+mn-lt"/>
-                        </a:rPr>
-                        <a:t>--name-only</a:t>
-                      </a:r>
-                    </a:p>
-                  </a:txBody>
-                  <a:tcPr marL="30874" marR="30874" marT="30874" marB="30874" anchor="ctr">
-                    <a:lnL>
-                      <a:noFill/>
-                    </a:lnL>
-                    <a:lnR>
-                      <a:noFill/>
-                    </a:lnR>
-                    <a:lnT>
-                      <a:noFill/>
-                    </a:lnT>
-                    <a:lnB>
-                      <a:noFill/>
-                    </a:lnB>
-                    <a:solidFill>
-                      <a:srgbClr val="FCFCFA"/>
-                    </a:solidFill>
-                  </a:tcPr>
-                </a:tc>
+              <a:tr h="274850">
                 <a:tc>
                   <a:txBody>
                     <a:bodyPr/>
@@ -6598,18 +6056,7 @@
                         <a:defRPr/>
                       </a:pPr>
                       <a:r>
-                        <a:rPr lang="en-US" sz="1800" kern="1200" dirty="0" smtClean="0">
-                          <a:solidFill>
-                            <a:schemeClr val="tx1"/>
-                          </a:solidFill>
-                          <a:latin typeface="+mn-lt"/>
-                          <a:ea typeface="+mn-ea"/>
-                          <a:cs typeface="+mn-cs"/>
-                        </a:rPr>
-                        <a:t> </a:t>
-                      </a:r>
-                      <a:r>
-                        <a:rPr lang="en-US" sz="1000" kern="1200" dirty="0" err="1" smtClean="0">
+                        <a:rPr lang="en-US" sz="1600" kern="1200" dirty="0" err="1" smtClean="0">
                           <a:solidFill>
                             <a:schemeClr val="tx1"/>
                           </a:solidFill>
@@ -6620,7 +6067,7 @@
                         <a:t>git</a:t>
                       </a:r>
                       <a:r>
-                        <a:rPr lang="en-US" sz="1000" kern="1200" dirty="0" smtClean="0">
+                        <a:rPr lang="en-US" sz="1600" kern="1200" dirty="0" smtClean="0">
                           <a:solidFill>
                             <a:schemeClr val="tx1"/>
                           </a:solidFill>
@@ -6630,11 +6077,6 @@
                         </a:rPr>
                         <a:t> diff --name-status "@{3 days ago}"</a:t>
                       </a:r>
-                    </a:p>
-                    <a:p>
-                      <a:endParaRPr lang="en-US" sz="1000" dirty="0">
-                        <a:latin typeface="+mn-lt"/>
-                      </a:endParaRPr>
                     </a:p>
                   </a:txBody>
                   <a:tcPr marL="30874" marR="30874" marT="30874" marB="30874" anchor="ctr">
@@ -6661,69 +6103,37 @@
                   </a:ext>
                 </a:extLst>
               </a:tr>
-              <a:tr h="358140">
+              <a:tr h="225171">
                 <a:tc>
                   <a:txBody>
                     <a:bodyPr/>
                     <a:lstStyle/>
                     <a:p>
                       <a:r>
-                        <a:rPr lang="en-US" sz="1000">
-                          <a:effectLst/>
+                        <a:rPr lang="en-US" sz="1600" dirty="0" err="1" smtClean="0">
                           <a:latin typeface="+mn-lt"/>
                         </a:rPr>
-                        <a:t>--name-status</a:t>
-                      </a:r>
-                    </a:p>
-                  </a:txBody>
-                  <a:tcPr marL="30874" marR="30874" marT="30874" marB="30874" anchor="ctr">
-                    <a:lnL>
-                      <a:noFill/>
-                    </a:lnL>
-                    <a:lnR>
-                      <a:noFill/>
-                    </a:lnR>
-                    <a:lnT>
-                      <a:noFill/>
-                    </a:lnT>
-                    <a:lnB>
-                      <a:noFill/>
-                    </a:lnB>
-                    <a:solidFill>
-                      <a:srgbClr val="FCFCFA"/>
-                    </a:solidFill>
-                  </a:tcPr>
-                </a:tc>
-                <a:tc>
-                  <a:txBody>
-                    <a:bodyPr/>
-                    <a:lstStyle/>
-                    <a:p>
-                      <a:r>
-                        <a:rPr lang="en-US" sz="1000" dirty="0" err="1" smtClean="0">
-                          <a:latin typeface="+mn-lt"/>
-                        </a:rPr>
-                        <a:t>Git</a:t>
+                        <a:t>git</a:t>
                       </a:r>
                       <a:r>
-                        <a:rPr lang="en-US" sz="1000" dirty="0" smtClean="0">
+                        <a:rPr lang="en-US" sz="1600" dirty="0" smtClean="0">
                           <a:latin typeface="+mn-lt"/>
                         </a:rPr>
                         <a:t> log –-</a:t>
                       </a:r>
                       <a:r>
-                        <a:rPr lang="en-US" sz="1000" dirty="0" err="1" smtClean="0">
+                        <a:rPr lang="en-US" sz="1600" dirty="0" err="1" smtClean="0">
                           <a:latin typeface="+mn-lt"/>
                         </a:rPr>
                         <a:t>oneline</a:t>
                       </a:r>
                       <a:r>
-                        <a:rPr lang="en-US" sz="1000" baseline="0" dirty="0" smtClean="0">
+                        <a:rPr lang="en-US" sz="1600" baseline="0" dirty="0" smtClean="0">
                           <a:latin typeface="+mn-lt"/>
                         </a:rPr>
-                        <a:t> ---graph --decorate</a:t>
+                        <a:t> ---graph –decorate</a:t>
                       </a:r>
-                      <a:endParaRPr lang="en-US" sz="1000" dirty="0">
+                      <a:endParaRPr lang="en-US" sz="1600" dirty="0">
                         <a:latin typeface="+mn-lt"/>
                       </a:endParaRPr>
                     </a:p>
@@ -6752,93 +6162,61 @@
                   </a:ext>
                 </a:extLst>
               </a:tr>
-              <a:tr h="358140">
+              <a:tr h="404843">
                 <a:tc>
                   <a:txBody>
                     <a:bodyPr/>
                     <a:lstStyle/>
                     <a:p>
                       <a:r>
-                        <a:rPr lang="en-US" sz="1000" dirty="0">
-                          <a:effectLst/>
+                        <a:rPr lang="en-US" sz="1600" dirty="0" err="1" smtClean="0">
                           <a:latin typeface="+mn-lt"/>
                         </a:rPr>
-                        <a:t>--abbrev-commit</a:t>
-                      </a:r>
-                    </a:p>
-                  </a:txBody>
-                  <a:tcPr marL="30874" marR="30874" marT="30874" marB="30874" anchor="ctr">
-                    <a:lnL>
-                      <a:noFill/>
-                    </a:lnL>
-                    <a:lnR>
-                      <a:noFill/>
-                    </a:lnR>
-                    <a:lnT>
-                      <a:noFill/>
-                    </a:lnT>
-                    <a:lnB>
-                      <a:noFill/>
-                    </a:lnB>
-                    <a:solidFill>
-                      <a:srgbClr val="FCFCFA"/>
-                    </a:solidFill>
-                  </a:tcPr>
-                </a:tc>
-                <a:tc>
-                  <a:txBody>
-                    <a:bodyPr/>
-                    <a:lstStyle/>
-                    <a:p>
-                      <a:r>
-                        <a:rPr lang="en-US" sz="1000" dirty="0" err="1" smtClean="0">
-                          <a:latin typeface="+mn-lt"/>
-                        </a:rPr>
-                        <a:t>Git</a:t>
+                        <a:t>git</a:t>
                       </a:r>
                       <a:r>
-                        <a:rPr lang="en-US" sz="1000" dirty="0" smtClean="0">
+                        <a:rPr lang="en-US" sz="1600" dirty="0" smtClean="0">
                           <a:latin typeface="+mn-lt"/>
                         </a:rPr>
                         <a:t> </a:t>
                       </a:r>
                       <a:r>
-                        <a:rPr lang="en-US" sz="1000" dirty="0" err="1" smtClean="0">
+                        <a:rPr lang="en-US" sz="1600" dirty="0" err="1" smtClean="0">
                           <a:latin typeface="+mn-lt"/>
                         </a:rPr>
                         <a:t>config</a:t>
                       </a:r>
                       <a:r>
-                        <a:rPr lang="en-US" sz="1000" dirty="0" smtClean="0">
+                        <a:rPr lang="en-US" sz="1600" dirty="0" smtClean="0">
                           <a:latin typeface="+mn-lt"/>
                         </a:rPr>
                         <a:t> </a:t>
                       </a:r>
                       <a:r>
-                        <a:rPr lang="en-US" sz="1000" dirty="0" err="1" smtClean="0">
+                        <a:rPr lang="en-US" sz="1600" dirty="0" err="1" smtClean="0">
                           <a:latin typeface="+mn-lt"/>
                         </a:rPr>
                         <a:t>alias.lol</a:t>
                       </a:r>
                       <a:r>
-                        <a:rPr lang="en-US" sz="1000" dirty="0" smtClean="0">
+                        <a:rPr lang="en-US" sz="1600" dirty="0" smtClean="0">
                           <a:latin typeface="+mn-lt"/>
                         </a:rPr>
                         <a:t> "log --</a:t>
                       </a:r>
                       <a:r>
-                        <a:rPr lang="en-US" sz="1000" dirty="0" err="1" smtClean="0">
+                        <a:rPr lang="en-US" sz="1600" dirty="0" err="1" smtClean="0">
                           <a:latin typeface="+mn-lt"/>
                         </a:rPr>
                         <a:t>oneline</a:t>
                       </a:r>
                       <a:r>
-                        <a:rPr lang="en-US" sz="1000" dirty="0" smtClean="0">
+                        <a:rPr lang="en-US" sz="1600" dirty="0" smtClean="0">
                           <a:latin typeface="+mn-lt"/>
                         </a:rPr>
                         <a:t> --graph --decorate"</a:t>
                       </a:r>
-                      <a:endParaRPr lang="en-US" sz="1000" dirty="0">
+                      <a:endParaRPr lang="en-US" sz="1600" dirty="0">
                         <a:latin typeface="+mn-lt"/>
                       </a:endParaRPr>
                     </a:p>
@@ -6867,47 +6245,13 @@
                   </a:ext>
                 </a:extLst>
               </a:tr>
-              <a:tr h="506336">
+              <a:tr h="274894">
                 <a:tc>
                   <a:txBody>
                     <a:bodyPr/>
                     <a:lstStyle/>
                     <a:p>
-                      <a:r>
-                        <a:rPr lang="en-US" sz="1000" dirty="0">
-                          <a:effectLst/>
-                          <a:latin typeface="+mn-lt"/>
-                        </a:rPr>
-                        <a:t>--relative-date</a:t>
-                      </a:r>
-                    </a:p>
-                  </a:txBody>
-                  <a:tcPr marL="30874" marR="30874" marT="30874" marB="30874" anchor="ctr">
-                    <a:lnL>
-                      <a:noFill/>
-                    </a:lnL>
-                    <a:lnR>
-                      <a:noFill/>
-                    </a:lnR>
-                    <a:lnT>
-                      <a:noFill/>
-                    </a:lnT>
-                    <a:lnB>
-                      <a:noFill/>
-                    </a:lnB>
-                    <a:solidFill>
-                      <a:srgbClr val="FCFCFA"/>
-                    </a:solidFill>
-                  </a:tcPr>
-                </a:tc>
-                <a:tc>
-                  <a:txBody>
-                    <a:bodyPr/>
-                    <a:lstStyle/>
-                    <a:p>
-                      <a:endParaRPr lang="en-US" sz="1000" dirty="0">
-                        <a:latin typeface="+mn-lt"/>
-                      </a:endParaRPr>
+                      <a:endParaRPr lang="en-US"/>
                     </a:p>
                   </a:txBody>
                   <a:tcPr marL="30874" marR="30874" marT="30874" marB="30874" anchor="ctr">
@@ -6934,47 +6278,13 @@
                   </a:ext>
                 </a:extLst>
               </a:tr>
-              <a:tr h="358140">
+              <a:tr h="274850">
                 <a:tc>
                   <a:txBody>
                     <a:bodyPr/>
                     <a:lstStyle/>
                     <a:p>
-                      <a:r>
-                        <a:rPr lang="en-US" sz="1000" dirty="0">
-                          <a:effectLst/>
-                          <a:latin typeface="+mn-lt"/>
-                        </a:rPr>
-                        <a:t>--graph</a:t>
-                      </a:r>
-                    </a:p>
-                  </a:txBody>
-                  <a:tcPr marL="30874" marR="30874" marT="30874" marB="30874" anchor="ctr">
-                    <a:lnL>
-                      <a:noFill/>
-                    </a:lnL>
-                    <a:lnR>
-                      <a:noFill/>
-                    </a:lnR>
-                    <a:lnT>
-                      <a:noFill/>
-                    </a:lnT>
-                    <a:lnB>
-                      <a:noFill/>
-                    </a:lnB>
-                    <a:solidFill>
-                      <a:srgbClr val="FCFCFA"/>
-                    </a:solidFill>
-                  </a:tcPr>
-                </a:tc>
-                <a:tc>
-                  <a:txBody>
-                    <a:bodyPr/>
-                    <a:lstStyle/>
-                    <a:p>
-                      <a:endParaRPr lang="en-US" sz="1000">
-                        <a:latin typeface="+mn-lt"/>
-                      </a:endParaRPr>
+                      <a:endParaRPr lang="en-US"/>
                     </a:p>
                   </a:txBody>
                   <a:tcPr marL="30874" marR="30874" marT="30874" marB="30874" anchor="ctr">
@@ -7001,47 +6311,13 @@
                   </a:ext>
                 </a:extLst>
               </a:tr>
-              <a:tr h="506336">
+              <a:tr h="274894">
                 <a:tc>
                   <a:txBody>
                     <a:bodyPr/>
                     <a:lstStyle/>
                     <a:p>
-                      <a:r>
-                        <a:rPr lang="en-US" sz="1000">
-                          <a:effectLst/>
-                          <a:latin typeface="+mn-lt"/>
-                        </a:rPr>
-                        <a:t>--pretty</a:t>
-                      </a:r>
-                    </a:p>
-                  </a:txBody>
-                  <a:tcPr marL="30874" marR="30874" marT="30874" marB="30874" anchor="ctr">
-                    <a:lnL>
-                      <a:noFill/>
-                    </a:lnL>
-                    <a:lnR>
-                      <a:noFill/>
-                    </a:lnR>
-                    <a:lnT>
-                      <a:noFill/>
-                    </a:lnT>
-                    <a:lnB>
-                      <a:noFill/>
-                    </a:lnB>
-                    <a:solidFill>
-                      <a:srgbClr val="FCFCFA"/>
-                    </a:solidFill>
-                  </a:tcPr>
-                </a:tc>
-                <a:tc>
-                  <a:txBody>
-                    <a:bodyPr/>
-                    <a:lstStyle/>
-                    <a:p>
-                      <a:endParaRPr lang="en-US" sz="1000" dirty="0">
-                        <a:latin typeface="+mn-lt"/>
-                      </a:endParaRPr>
+                      <a:endParaRPr lang="en-US" dirty="0"/>
                     </a:p>
                   </a:txBody>
                   <a:tcPr marL="30874" marR="30874" marT="30874" marB="30874" anchor="ctr">
@@ -7072,6 +6348,30 @@
           </a:graphicData>
         </a:graphic>
       </p:graphicFrame>
+      <p:pic>
+        <p:nvPicPr>
+          <p:cNvPr id="3" name="Picture 2"/>
+          <p:cNvPicPr>
+            <a:picLocks noChangeAspect="1"/>
+          </p:cNvPicPr>
+          <p:nvPr/>
+        </p:nvPicPr>
+        <p:blipFill>
+          <a:blip r:embed="rId2"/>
+          <a:stretch>
+            <a:fillRect/>
+          </a:stretch>
+        </p:blipFill>
+        <p:spPr>
+          <a:xfrm>
+            <a:off x="5177930" y="1620981"/>
+            <a:ext cx="6897063" cy="3181794"/>
+          </a:xfrm>
+          <a:prstGeom prst="rect">
+            <a:avLst/>
+          </a:prstGeom>
+        </p:spPr>
+      </p:pic>
     </p:spTree>
     <p:extLst>
       <p:ext uri="{BB962C8B-B14F-4D97-AF65-F5344CB8AC3E}">
@@ -7125,41 +6425,6 @@
                                         </p:cTn>
                                         <p:tgtEl>
                                           <p:spTgt spid="6"/>
-                                        </p:tgtEl>
-                                        <p:attrNameLst>
-                                          <p:attrName>style.visibility</p:attrName>
-                                        </p:attrNameLst>
-                                      </p:cBhvr>
-                                      <p:to>
-                                        <p:strVal val="hidden"/>
-                                      </p:to>
-                                    </p:set>
-                                  </p:childTnLst>
-                                </p:cTn>
-                              </p:par>
-                              <p:par>
-                                <p:cTn id="8" presetID="10" presetClass="exit" presetSubtype="0" fill="hold" nodeType="withEffect">
-                                  <p:stCondLst>
-                                    <p:cond delay="0"/>
-                                  </p:stCondLst>
-                                  <p:childTnLst>
-                                    <p:animEffect transition="out" filter="fade">
-                                      <p:cBhvr>
-                                        <p:cTn id="9" dur="500"/>
-                                        <p:tgtEl>
-                                          <p:spTgt spid="4"/>
-                                        </p:tgtEl>
-                                      </p:cBhvr>
-                                    </p:animEffect>
-                                    <p:set>
-                                      <p:cBhvr>
-                                        <p:cTn id="10" dur="1" fill="hold">
-                                          <p:stCondLst>
-                                            <p:cond delay="499"/>
-                                          </p:stCondLst>
-                                        </p:cTn>
-                                        <p:tgtEl>
-                                          <p:spTgt spid="4"/>
                                         </p:tgtEl>
                                         <p:attrNameLst>
                                           <p:attrName>style.visibility</p:attrName>
@@ -7312,7 +6577,7 @@
         </p:blipFill>
         <p:spPr>
           <a:xfrm>
-            <a:off x="8690075" y="1687484"/>
+            <a:off x="8690075" y="1687355"/>
             <a:ext cx="1777913" cy="3994567"/>
           </a:xfrm>
           <a:prstGeom prst="rect">
@@ -7949,6 +7214,46 @@
               </a:rPr>
               <a:t>Commit that shit.  Log?</a:t>
             </a:r>
+          </a:p>
+          <a:p>
+            <a:r>
+              <a:rPr lang="en-US" dirty="0" smtClean="0">
+                <a:sym typeface="Wingdings" panose="05000000000000000000" pitchFamily="2" charset="2"/>
+              </a:rPr>
+              <a:t>Lag </a:t>
+            </a:r>
+            <a:r>
+              <a:rPr lang="en-US" dirty="0" err="1" smtClean="0">
+                <a:sym typeface="Wingdings" panose="05000000000000000000" pitchFamily="2" charset="2"/>
+              </a:rPr>
+              <a:t>en</a:t>
+            </a:r>
+            <a:r>
+              <a:rPr lang="en-US" dirty="0" smtClean="0">
+                <a:sym typeface="Wingdings" panose="05000000000000000000" pitchFamily="2" charset="2"/>
+              </a:rPr>
+              <a:t> </a:t>
+            </a:r>
+            <a:r>
+              <a:rPr lang="en-US" dirty="0" err="1" smtClean="0">
+                <a:sym typeface="Wingdings" panose="05000000000000000000" pitchFamily="2" charset="2"/>
+              </a:rPr>
+              <a:t>til</a:t>
+            </a:r>
+            <a:r>
+              <a:rPr lang="en-US" dirty="0" smtClean="0">
+                <a:sym typeface="Wingdings" panose="05000000000000000000" pitchFamily="2" charset="2"/>
+              </a:rPr>
+              <a:t> fil  Commit  Explorer.exe  Checkout!</a:t>
+            </a:r>
+          </a:p>
+          <a:p>
+            <a:r>
+              <a:rPr lang="en-US" dirty="0" smtClean="0">
+                <a:sym typeface="Wingdings" panose="05000000000000000000" pitchFamily="2" charset="2"/>
+              </a:rPr>
+              <a:t>Checkout!</a:t>
+            </a:r>
             <a:endParaRPr lang="en-US" dirty="0" smtClean="0"/>
           </a:p>
           <a:p>
@@ -8455,522 +7760,67 @@
             <a:spLocks noGrp="1"/>
           </p:cNvSpPr>
           <p:nvPr>
-            <p:ph type="title"/>
+            <p:ph type="ctrTitle"/>
           </p:nvPr>
         </p:nvSpPr>
-        <p:spPr>
-          <a:xfrm>
-            <a:off x="1371600" y="685800"/>
-            <a:ext cx="9601200" cy="625764"/>
-          </a:xfrm>
-        </p:spPr>
+        <p:spPr/>
         <p:txBody>
-          <a:bodyPr>
-            <a:normAutofit fontScale="90000"/>
-          </a:bodyPr>
+          <a:bodyPr/>
           <a:lstStyle/>
           <a:p>
             <a:r>
-              <a:rPr lang="en-US" dirty="0" smtClean="0"/>
-              <a:t>Meg </a:t>
-            </a:r>
-            <a:r>
-              <a:rPr lang="en-US" dirty="0" err="1" smtClean="0"/>
-              <a:t>og</a:t>
-            </a:r>
-            <a:r>
-              <a:rPr lang="en-US" dirty="0" smtClean="0"/>
-              <a:t> mine </a:t>
-            </a:r>
-            <a:r>
-              <a:rPr lang="en-US" dirty="0" err="1" smtClean="0"/>
-              <a:t>prosjekter</a:t>
-            </a:r>
-            <a:r>
-              <a:rPr lang="en-US" dirty="0" smtClean="0"/>
-              <a:t> </a:t>
-            </a:r>
-            <a:r>
-              <a:rPr lang="en-US" dirty="0" err="1" smtClean="0"/>
-              <a:t>før</a:t>
-            </a:r>
-            <a:r>
-              <a:rPr lang="en-US" dirty="0" smtClean="0"/>
-              <a:t> </a:t>
-            </a:r>
-            <a:r>
-              <a:rPr lang="en-US" dirty="0" err="1" smtClean="0"/>
-              <a:t>versjonskontroll</a:t>
+              <a:rPr lang="en-US" smtClean="0"/>
+              <a:t>GIT</a:t>
             </a:r>
             <a:endParaRPr lang="en-US" dirty="0"/>
           </a:p>
         </p:txBody>
       </p:sp>
-      <p:pic>
-        <p:nvPicPr>
-          <p:cNvPr id="4" name="Content Placeholder 3"/>
-          <p:cNvPicPr>
-            <a:picLocks noGrp="1" noChangeAspect="1"/>
-          </p:cNvPicPr>
+      <p:sp>
+        <p:nvSpPr>
+          <p:cNvPr id="3" name="Subtitle 2"/>
+          <p:cNvSpPr>
+            <a:spLocks noGrp="1"/>
+          </p:cNvSpPr>
           <p:nvPr>
-            <p:ph idx="1"/>
+            <p:ph type="subTitle" idx="1"/>
           </p:nvPr>
-        </p:nvPicPr>
-        <p:blipFill>
-          <a:blip r:embed="rId2"/>
-          <a:stretch>
-            <a:fillRect/>
-          </a:stretch>
-        </p:blipFill>
-        <p:spPr>
-          <a:xfrm>
-            <a:off x="1666894" y="1859320"/>
-            <a:ext cx="1879688" cy="3832271"/>
-          </a:xfrm>
-          <a:prstGeom prst="rect">
-            <a:avLst/>
-          </a:prstGeom>
-        </p:spPr>
-      </p:pic>
-      <p:pic>
-        <p:nvPicPr>
-          <p:cNvPr id="5" name="Picture 4"/>
-          <p:cNvPicPr>
-            <a:picLocks noChangeAspect="1"/>
-          </p:cNvPicPr>
-          <p:nvPr/>
-        </p:nvPicPr>
-        <p:blipFill>
-          <a:blip r:embed="rId3"/>
-          <a:stretch>
-            <a:fillRect/>
-          </a:stretch>
-        </p:blipFill>
-        <p:spPr>
-          <a:xfrm>
-            <a:off x="3804284" y="3237880"/>
-            <a:ext cx="1582538" cy="1259900"/>
-          </a:xfrm>
-          <a:prstGeom prst="rect">
-            <a:avLst/>
-          </a:prstGeom>
-        </p:spPr>
-      </p:pic>
-      <p:pic>
-        <p:nvPicPr>
-          <p:cNvPr id="6" name="Picture 5"/>
-          <p:cNvPicPr>
-            <a:picLocks noChangeAspect="1"/>
-          </p:cNvPicPr>
-          <p:nvPr/>
-        </p:nvPicPr>
-        <p:blipFill>
-          <a:blip r:embed="rId4"/>
-          <a:stretch>
-            <a:fillRect/>
-          </a:stretch>
-        </p:blipFill>
-        <p:spPr>
-          <a:xfrm>
-            <a:off x="5700447" y="2212380"/>
-            <a:ext cx="1221094" cy="1025500"/>
-          </a:xfrm>
-          <a:prstGeom prst="rect">
-            <a:avLst/>
-          </a:prstGeom>
-        </p:spPr>
-      </p:pic>
-      <p:pic>
-        <p:nvPicPr>
-          <p:cNvPr id="7" name="Picture 6"/>
-          <p:cNvPicPr>
-            <a:picLocks noChangeAspect="1"/>
-          </p:cNvPicPr>
-          <p:nvPr/>
-        </p:nvPicPr>
-        <p:blipFill>
-          <a:blip r:embed="rId5"/>
-          <a:stretch>
-            <a:fillRect/>
-          </a:stretch>
-        </p:blipFill>
-        <p:spPr>
-          <a:xfrm>
-            <a:off x="5700447" y="3867830"/>
-            <a:ext cx="1221094" cy="1025500"/>
-          </a:xfrm>
-          <a:prstGeom prst="rect">
-            <a:avLst/>
-          </a:prstGeom>
-        </p:spPr>
-      </p:pic>
-      <p:pic>
-        <p:nvPicPr>
-          <p:cNvPr id="10" name="Picture 9"/>
-          <p:cNvPicPr>
-            <a:picLocks noChangeAspect="1"/>
-          </p:cNvPicPr>
-          <p:nvPr/>
-        </p:nvPicPr>
-        <p:blipFill>
-          <a:blip r:embed="rId6"/>
-          <a:stretch>
-            <a:fillRect/>
-          </a:stretch>
-        </p:blipFill>
-        <p:spPr>
-          <a:xfrm>
-            <a:off x="7436946" y="3208990"/>
-            <a:ext cx="703350" cy="703200"/>
-          </a:xfrm>
-          <a:prstGeom prst="rect">
-            <a:avLst/>
-          </a:prstGeom>
-        </p:spPr>
-      </p:pic>
-      <p:pic>
-        <p:nvPicPr>
-          <p:cNvPr id="11" name="Picture 10"/>
-          <p:cNvPicPr>
-            <a:picLocks noChangeAspect="1"/>
-          </p:cNvPicPr>
-          <p:nvPr/>
-        </p:nvPicPr>
-        <p:blipFill>
-          <a:blip r:embed="rId7"/>
-          <a:stretch>
-            <a:fillRect/>
-          </a:stretch>
-        </p:blipFill>
-        <p:spPr>
-          <a:xfrm>
-            <a:off x="8655701" y="2964823"/>
-            <a:ext cx="1514156" cy="1621267"/>
-          </a:xfrm>
-          <a:prstGeom prst="rect">
-            <a:avLst/>
-          </a:prstGeom>
-        </p:spPr>
-      </p:pic>
+        </p:nvSpPr>
+        <p:spPr/>
+        <p:txBody>
+          <a:bodyPr/>
+          <a:lstStyle/>
+          <a:p>
+            <a:r>
+              <a:rPr lang="en-US" smtClean="0"/>
+              <a:t>Distribuert versjonskontroll</a:t>
+            </a:r>
+            <a:endParaRPr lang="en-US" dirty="0"/>
+          </a:p>
+        </p:txBody>
+      </p:sp>
     </p:spTree>
     <p:extLst>
       <p:ext uri="{BB962C8B-B14F-4D97-AF65-F5344CB8AC3E}">
-        <p14:creationId xmlns:p14="http://schemas.microsoft.com/office/powerpoint/2010/main" val="232783837"/>
+        <p14:creationId xmlns:p14="http://schemas.microsoft.com/office/powerpoint/2010/main" val="4195604889"/>
       </p:ext>
     </p:extLst>
   </p:cSld>
   <p:clrMapOvr>
     <a:masterClrMapping/>
   </p:clrMapOvr>
+  <mc:AlternateContent xmlns:mc="http://schemas.openxmlformats.org/markup-compatibility/2006" xmlns:p14="http://schemas.microsoft.com/office/powerpoint/2010/main">
+    <mc:Choice Requires="p14">
+      <p:transition p14:dur="10"/>
+    </mc:Choice>
+    <mc:Fallback xmlns="">
+      <p:transition/>
+    </mc:Fallback>
+  </mc:AlternateContent>
   <p:timing>
     <p:tnLst>
       <p:par>
-        <p:cTn id="1" dur="indefinite" restart="never" nodeType="tmRoot">
-          <p:childTnLst>
-            <p:seq concurrent="1" nextAc="seek">
-              <p:cTn id="2" dur="indefinite" nodeType="mainSeq">
-                <p:childTnLst>
-                  <p:par>
-                    <p:cTn id="3" fill="hold">
-                      <p:stCondLst>
-                        <p:cond delay="indefinite"/>
-                      </p:stCondLst>
-                      <p:childTnLst>
-                        <p:par>
-                          <p:cTn id="4" fill="hold">
-                            <p:stCondLst>
-                              <p:cond delay="0"/>
-                            </p:stCondLst>
-                            <p:childTnLst>
-                              <p:par>
-                                <p:cTn id="5" presetID="10" presetClass="entr" presetSubtype="0" fill="hold" nodeType="clickEffect">
-                                  <p:stCondLst>
-                                    <p:cond delay="0"/>
-                                  </p:stCondLst>
-                                  <p:childTnLst>
-                                    <p:set>
-                                      <p:cBhvr>
-                                        <p:cTn id="6" dur="1" fill="hold">
-                                          <p:stCondLst>
-                                            <p:cond delay="0"/>
-                                          </p:stCondLst>
-                                        </p:cTn>
-                                        <p:tgtEl>
-                                          <p:spTgt spid="4"/>
-                                        </p:tgtEl>
-                                        <p:attrNameLst>
-                                          <p:attrName>style.visibility</p:attrName>
-                                        </p:attrNameLst>
-                                      </p:cBhvr>
-                                      <p:to>
-                                        <p:strVal val="visible"/>
-                                      </p:to>
-                                    </p:set>
-                                    <p:animEffect transition="in" filter="fade">
-                                      <p:cBhvr>
-                                        <p:cTn id="7" dur="500"/>
-                                        <p:tgtEl>
-                                          <p:spTgt spid="4"/>
-                                        </p:tgtEl>
-                                      </p:cBhvr>
-                                    </p:animEffect>
-                                  </p:childTnLst>
-                                </p:cTn>
-                              </p:par>
-                            </p:childTnLst>
-                          </p:cTn>
-                        </p:par>
-                      </p:childTnLst>
-                    </p:cTn>
-                  </p:par>
-                  <p:par>
-                    <p:cTn id="8" fill="hold">
-                      <p:stCondLst>
-                        <p:cond delay="indefinite"/>
-                      </p:stCondLst>
-                      <p:childTnLst>
-                        <p:par>
-                          <p:cTn id="9" fill="hold">
-                            <p:stCondLst>
-                              <p:cond delay="0"/>
-                            </p:stCondLst>
-                            <p:childTnLst>
-                              <p:par>
-                                <p:cTn id="10" presetID="10" presetClass="entr" presetSubtype="0" fill="hold" nodeType="clickEffect">
-                                  <p:stCondLst>
-                                    <p:cond delay="0"/>
-                                  </p:stCondLst>
-                                  <p:childTnLst>
-                                    <p:set>
-                                      <p:cBhvr>
-                                        <p:cTn id="11" dur="1" fill="hold">
-                                          <p:stCondLst>
-                                            <p:cond delay="0"/>
-                                          </p:stCondLst>
-                                        </p:cTn>
-                                        <p:tgtEl>
-                                          <p:spTgt spid="5"/>
-                                        </p:tgtEl>
-                                        <p:attrNameLst>
-                                          <p:attrName>style.visibility</p:attrName>
-                                        </p:attrNameLst>
-                                      </p:cBhvr>
-                                      <p:to>
-                                        <p:strVal val="visible"/>
-                                      </p:to>
-                                    </p:set>
-                                    <p:animEffect transition="in" filter="fade">
-                                      <p:cBhvr>
-                                        <p:cTn id="12" dur="500"/>
-                                        <p:tgtEl>
-                                          <p:spTgt spid="5"/>
-                                        </p:tgtEl>
-                                      </p:cBhvr>
-                                    </p:animEffect>
-                                  </p:childTnLst>
-                                </p:cTn>
-                              </p:par>
-                            </p:childTnLst>
-                          </p:cTn>
-                        </p:par>
-                      </p:childTnLst>
-                    </p:cTn>
-                  </p:par>
-                  <p:par>
-                    <p:cTn id="13" fill="hold">
-                      <p:stCondLst>
-                        <p:cond delay="indefinite"/>
-                      </p:stCondLst>
-                      <p:childTnLst>
-                        <p:par>
-                          <p:cTn id="14" fill="hold">
-                            <p:stCondLst>
-                              <p:cond delay="0"/>
-                            </p:stCondLst>
-                            <p:childTnLst>
-                              <p:par>
-                                <p:cTn id="15" presetID="10" presetClass="entr" presetSubtype="0" fill="hold" nodeType="clickEffect">
-                                  <p:stCondLst>
-                                    <p:cond delay="0"/>
-                                  </p:stCondLst>
-                                  <p:childTnLst>
-                                    <p:set>
-                                      <p:cBhvr>
-                                        <p:cTn id="16" dur="1" fill="hold">
-                                          <p:stCondLst>
-                                            <p:cond delay="0"/>
-                                          </p:stCondLst>
-                                        </p:cTn>
-                                        <p:tgtEl>
-                                          <p:spTgt spid="6"/>
-                                        </p:tgtEl>
-                                        <p:attrNameLst>
-                                          <p:attrName>style.visibility</p:attrName>
-                                        </p:attrNameLst>
-                                      </p:cBhvr>
-                                      <p:to>
-                                        <p:strVal val="visible"/>
-                                      </p:to>
-                                    </p:set>
-                                    <p:animEffect transition="in" filter="fade">
-                                      <p:cBhvr>
-                                        <p:cTn id="17" dur="500"/>
-                                        <p:tgtEl>
-                                          <p:spTgt spid="6"/>
-                                        </p:tgtEl>
-                                      </p:cBhvr>
-                                    </p:animEffect>
-                                  </p:childTnLst>
-                                </p:cTn>
-                              </p:par>
-                              <p:par>
-                                <p:cTn id="18" presetID="10" presetClass="entr" presetSubtype="0" fill="hold" nodeType="withEffect">
-                                  <p:stCondLst>
-                                    <p:cond delay="0"/>
-                                  </p:stCondLst>
-                                  <p:childTnLst>
-                                    <p:set>
-                                      <p:cBhvr>
-                                        <p:cTn id="19" dur="1" fill="hold">
-                                          <p:stCondLst>
-                                            <p:cond delay="0"/>
-                                          </p:stCondLst>
-                                        </p:cTn>
-                                        <p:tgtEl>
-                                          <p:spTgt spid="10"/>
-                                        </p:tgtEl>
-                                        <p:attrNameLst>
-                                          <p:attrName>style.visibility</p:attrName>
-                                        </p:attrNameLst>
-                                      </p:cBhvr>
-                                      <p:to>
-                                        <p:strVal val="visible"/>
-                                      </p:to>
-                                    </p:set>
-                                    <p:animEffect transition="in" filter="fade">
-                                      <p:cBhvr>
-                                        <p:cTn id="20" dur="500"/>
-                                        <p:tgtEl>
-                                          <p:spTgt spid="10"/>
-                                        </p:tgtEl>
-                                      </p:cBhvr>
-                                    </p:animEffect>
-                                  </p:childTnLst>
-                                </p:cTn>
-                              </p:par>
-                              <p:par>
-                                <p:cTn id="21" presetID="10" presetClass="entr" presetSubtype="0" fill="hold" nodeType="withEffect">
-                                  <p:stCondLst>
-                                    <p:cond delay="0"/>
-                                  </p:stCondLst>
-                                  <p:childTnLst>
-                                    <p:set>
-                                      <p:cBhvr>
-                                        <p:cTn id="22" dur="1" fill="hold">
-                                          <p:stCondLst>
-                                            <p:cond delay="0"/>
-                                          </p:stCondLst>
-                                        </p:cTn>
-                                        <p:tgtEl>
-                                          <p:spTgt spid="11"/>
-                                        </p:tgtEl>
-                                        <p:attrNameLst>
-                                          <p:attrName>style.visibility</p:attrName>
-                                        </p:attrNameLst>
-                                      </p:cBhvr>
-                                      <p:to>
-                                        <p:strVal val="visible"/>
-                                      </p:to>
-                                    </p:set>
-                                    <p:animEffect transition="in" filter="fade">
-                                      <p:cBhvr>
-                                        <p:cTn id="23" dur="500"/>
-                                        <p:tgtEl>
-                                          <p:spTgt spid="11"/>
-                                        </p:tgtEl>
-                                      </p:cBhvr>
-                                    </p:animEffect>
-                                  </p:childTnLst>
-                                </p:cTn>
-                              </p:par>
-                            </p:childTnLst>
-                          </p:cTn>
-                        </p:par>
-                      </p:childTnLst>
-                    </p:cTn>
-                  </p:par>
-                  <p:par>
-                    <p:cTn id="24" fill="hold">
-                      <p:stCondLst>
-                        <p:cond delay="indefinite"/>
-                      </p:stCondLst>
-                      <p:childTnLst>
-                        <p:par>
-                          <p:cTn id="25" fill="hold">
-                            <p:stCondLst>
-                              <p:cond delay="0"/>
-                            </p:stCondLst>
-                            <p:childTnLst>
-                              <p:par>
-                                <p:cTn id="26" presetID="10" presetClass="entr" presetSubtype="0" fill="hold" nodeType="clickEffect">
-                                  <p:stCondLst>
-                                    <p:cond delay="0"/>
-                                  </p:stCondLst>
-                                  <p:childTnLst>
-                                    <p:set>
-                                      <p:cBhvr>
-                                        <p:cTn id="27" dur="1" fill="hold">
-                                          <p:stCondLst>
-                                            <p:cond delay="0"/>
-                                          </p:stCondLst>
-                                        </p:cTn>
-                                        <p:tgtEl>
-                                          <p:spTgt spid="7"/>
-                                        </p:tgtEl>
-                                        <p:attrNameLst>
-                                          <p:attrName>style.visibility</p:attrName>
-                                        </p:attrNameLst>
-                                      </p:cBhvr>
-                                      <p:to>
-                                        <p:strVal val="visible"/>
-                                      </p:to>
-                                    </p:set>
-                                    <p:animEffect transition="in" filter="fade">
-                                      <p:cBhvr>
-                                        <p:cTn id="28" dur="500"/>
-                                        <p:tgtEl>
-                                          <p:spTgt spid="7"/>
-                                        </p:tgtEl>
-                                      </p:cBhvr>
-                                    </p:animEffect>
-                                  </p:childTnLst>
-                                </p:cTn>
-                              </p:par>
-                            </p:childTnLst>
-                          </p:cTn>
-                        </p:par>
-                      </p:childTnLst>
-                    </p:cTn>
-                  </p:par>
-                </p:childTnLst>
-              </p:cTn>
-              <p:prevCondLst>
-                <p:cond evt="onPrev" delay="0">
-                  <p:tgtEl>
-                    <p:sldTgt/>
-                  </p:tgtEl>
-                </p:cond>
-              </p:prevCondLst>
-              <p:nextCondLst>
-                <p:cond evt="onNext" delay="0">
-                  <p:tgtEl>
-                    <p:sldTgt/>
-                  </p:tgtEl>
-                </p:cond>
-              </p:nextCondLst>
-            </p:seq>
-          </p:childTnLst>
-        </p:cTn>
+        <p:cTn id="1" dur="indefinite" restart="never" nodeType="tmRoot"/>
       </p:par>
     </p:tnLst>
   </p:timing>
@@ -9373,32 +8223,8 @@
         </p:blipFill>
         <p:spPr>
           <a:xfrm>
-            <a:off x="1964386" y="2442045"/>
+            <a:off x="2096262" y="3190191"/>
             <a:ext cx="7531707" cy="1924034"/>
-          </a:xfrm>
-          <a:prstGeom prst="rect">
-            <a:avLst/>
-          </a:prstGeom>
-        </p:spPr>
-      </p:pic>
-      <p:pic>
-        <p:nvPicPr>
-          <p:cNvPr id="6" name="Picture 5"/>
-          <p:cNvPicPr>
-            <a:picLocks noChangeAspect="1"/>
-          </p:cNvPicPr>
-          <p:nvPr/>
-        </p:nvPicPr>
-        <p:blipFill>
-          <a:blip r:embed="rId3"/>
-          <a:stretch>
-            <a:fillRect/>
-          </a:stretch>
-        </p:blipFill>
-        <p:spPr>
-          <a:xfrm>
-            <a:off x="1964386" y="3555446"/>
-            <a:ext cx="7795463" cy="810633"/>
           </a:xfrm>
           <a:prstGeom prst="rect">
             <a:avLst/>
@@ -9435,6 +8261,30 @@
           </a:p>
         </p:txBody>
       </p:sp>
+      <p:pic>
+        <p:nvPicPr>
+          <p:cNvPr id="3" name="Picture 2"/>
+          <p:cNvPicPr>
+            <a:picLocks noChangeAspect="1"/>
+          </p:cNvPicPr>
+          <p:nvPr/>
+        </p:nvPicPr>
+        <p:blipFill>
+          <a:blip r:embed="rId3"/>
+          <a:stretch>
+            <a:fillRect/>
+          </a:stretch>
+        </p:blipFill>
+        <p:spPr>
+          <a:xfrm>
+            <a:off x="1994509" y="4244992"/>
+            <a:ext cx="8205751" cy="869233"/>
+          </a:xfrm>
+          <a:prstGeom prst="rect">
+            <a:avLst/>
+          </a:prstGeom>
+        </p:spPr>
+      </p:pic>
     </p:spTree>
     <p:extLst>
       <p:ext uri="{BB962C8B-B14F-4D97-AF65-F5344CB8AC3E}">
@@ -9554,7 +8404,7 @@
                             </p:stCondLst>
                             <p:childTnLst>
                               <p:par>
-                                <p:cTn id="13" presetID="10" presetClass="entr" presetSubtype="0" fill="hold" nodeType="clickEffect">
+                                <p:cTn id="13" presetID="1" presetClass="entr" presetSubtype="0" fill="hold" nodeType="clickEffect">
                                   <p:stCondLst>
                                     <p:cond delay="0"/>
                                   </p:stCondLst>
@@ -9567,7 +8417,7 @@
                                           </p:stCondLst>
                                         </p:cTn>
                                         <p:tgtEl>
-                                          <p:spTgt spid="6"/>
+                                          <p:spTgt spid="3"/>
                                         </p:tgtEl>
                                         <p:attrNameLst>
                                           <p:attrName>style.visibility</p:attrName>
@@ -9577,14 +8427,6 @@
                                         <p:strVal val="visible"/>
                                       </p:to>
                                     </p:set>
-                                    <p:animEffect transition="in" filter="fade">
-                                      <p:cBhvr>
-                                        <p:cTn id="15" dur="500"/>
-                                        <p:tgtEl>
-                                          <p:spTgt spid="6"/>
-                                        </p:tgtEl>
-                                      </p:cBhvr>
-                                    </p:animEffect>
                                   </p:childTnLst>
                                 </p:cTn>
                               </p:par>
@@ -9924,90 +8766,6 @@
           <a:p>
             <a:r>
               <a:rPr lang="en-US" dirty="0" smtClean="0"/>
-              <a:t>Remote</a:t>
-            </a:r>
-            <a:endParaRPr lang="en-US" dirty="0"/>
-          </a:p>
-        </p:txBody>
-      </p:sp>
-      <p:pic>
-        <p:nvPicPr>
-          <p:cNvPr id="4" name="Picture 3"/>
-          <p:cNvPicPr>
-            <a:picLocks noChangeAspect="1"/>
-          </p:cNvPicPr>
-          <p:nvPr/>
-        </p:nvPicPr>
-        <p:blipFill>
-          <a:blip r:embed="rId2"/>
-          <a:stretch>
-            <a:fillRect/>
-          </a:stretch>
-        </p:blipFill>
-        <p:spPr>
-          <a:xfrm>
-            <a:off x="3656590" y="2251120"/>
-            <a:ext cx="3731663" cy="859467"/>
-          </a:xfrm>
-          <a:prstGeom prst="rect">
-            <a:avLst/>
-          </a:prstGeom>
-        </p:spPr>
-      </p:pic>
-    </p:spTree>
-    <p:extLst>
-      <p:ext uri="{BB962C8B-B14F-4D97-AF65-F5344CB8AC3E}">
-        <p14:creationId xmlns:p14="http://schemas.microsoft.com/office/powerpoint/2010/main" val="3297310689"/>
-      </p:ext>
-    </p:extLst>
-  </p:cSld>
-  <p:clrMapOvr>
-    <a:masterClrMapping/>
-  </p:clrMapOvr>
-  <p:timing>
-    <p:tnLst>
-      <p:par>
-        <p:cTn id="1" dur="indefinite" restart="never" nodeType="tmRoot"/>
-      </p:par>
-    </p:tnLst>
-  </p:timing>
-</p:sld>
-</file>
-
-<file path=ppt/slides/slide24.xml><?xml version="1.0" encoding="utf-8"?>
-<p:sld xmlns:a="http://schemas.openxmlformats.org/drawingml/2006/main" xmlns:r="http://schemas.openxmlformats.org/officeDocument/2006/relationships" xmlns:p="http://schemas.openxmlformats.org/presentationml/2006/main">
-  <p:cSld>
-    <p:spTree>
-      <p:nvGrpSpPr>
-        <p:cNvPr id="1" name=""/>
-        <p:cNvGrpSpPr/>
-        <p:nvPr/>
-      </p:nvGrpSpPr>
-      <p:grpSpPr>
-        <a:xfrm>
-          <a:off x="0" y="0"/>
-          <a:ext cx="0" cy="0"/>
-          <a:chOff x="0" y="0"/>
-          <a:chExt cx="0" cy="0"/>
-        </a:xfrm>
-      </p:grpSpPr>
-      <p:sp>
-        <p:nvSpPr>
-          <p:cNvPr id="2" name="Title 1"/>
-          <p:cNvSpPr>
-            <a:spLocks noGrp="1"/>
-          </p:cNvSpPr>
-          <p:nvPr>
-            <p:ph type="title"/>
-          </p:nvPr>
-        </p:nvSpPr>
-        <p:spPr/>
-        <p:txBody>
-          <a:bodyPr/>
-          <a:lstStyle/>
-          <a:p>
-            <a:r>
-              <a:rPr lang="en-US" dirty="0" smtClean="0"/>
               <a:t>Se </a:t>
             </a:r>
             <a:r>
@@ -10065,7 +8823,7 @@
 </p:sld>
 </file>
 
-<file path=ppt/slides/slide25.xml><?xml version="1.0" encoding="utf-8"?>
+<file path=ppt/slides/slide24.xml><?xml version="1.0" encoding="utf-8"?>
 <p:sld xmlns:a="http://schemas.openxmlformats.org/drawingml/2006/main" xmlns:r="http://schemas.openxmlformats.org/officeDocument/2006/relationships" xmlns:p="http://schemas.openxmlformats.org/presentationml/2006/main">
   <p:cSld>
     <p:spTree>
@@ -10110,6 +8868,90 @@
     <p:extLst>
       <p:ext uri="{BB962C8B-B14F-4D97-AF65-F5344CB8AC3E}">
         <p14:creationId xmlns:p14="http://schemas.microsoft.com/office/powerpoint/2010/main" val="2166476444"/>
+      </p:ext>
+    </p:extLst>
+  </p:cSld>
+  <p:clrMapOvr>
+    <a:masterClrMapping/>
+  </p:clrMapOvr>
+  <p:timing>
+    <p:tnLst>
+      <p:par>
+        <p:cTn id="1" dur="indefinite" restart="never" nodeType="tmRoot"/>
+      </p:par>
+    </p:tnLst>
+  </p:timing>
+</p:sld>
+</file>
+
+<file path=ppt/slides/slide25.xml><?xml version="1.0" encoding="utf-8"?>
+<p:sld xmlns:a="http://schemas.openxmlformats.org/drawingml/2006/main" xmlns:r="http://schemas.openxmlformats.org/officeDocument/2006/relationships" xmlns:p="http://schemas.openxmlformats.org/presentationml/2006/main">
+  <p:cSld>
+    <p:spTree>
+      <p:nvGrpSpPr>
+        <p:cNvPr id="1" name=""/>
+        <p:cNvGrpSpPr/>
+        <p:nvPr/>
+      </p:nvGrpSpPr>
+      <p:grpSpPr>
+        <a:xfrm>
+          <a:off x="0" y="0"/>
+          <a:ext cx="0" cy="0"/>
+          <a:chOff x="0" y="0"/>
+          <a:chExt cx="0" cy="0"/>
+        </a:xfrm>
+      </p:grpSpPr>
+      <p:sp>
+        <p:nvSpPr>
+          <p:cNvPr id="2" name="Title 1"/>
+          <p:cNvSpPr>
+            <a:spLocks noGrp="1"/>
+          </p:cNvSpPr>
+          <p:nvPr>
+            <p:ph type="title"/>
+          </p:nvPr>
+        </p:nvSpPr>
+        <p:spPr/>
+        <p:txBody>
+          <a:bodyPr/>
+          <a:lstStyle/>
+          <a:p>
+            <a:r>
+              <a:rPr lang="en-US" dirty="0" smtClean="0"/>
+              <a:t>Remote</a:t>
+            </a:r>
+            <a:endParaRPr lang="en-US" dirty="0"/>
+          </a:p>
+        </p:txBody>
+      </p:sp>
+      <p:pic>
+        <p:nvPicPr>
+          <p:cNvPr id="4" name="Picture 3"/>
+          <p:cNvPicPr>
+            <a:picLocks noChangeAspect="1"/>
+          </p:cNvPicPr>
+          <p:nvPr/>
+        </p:nvPicPr>
+        <p:blipFill>
+          <a:blip r:embed="rId2"/>
+          <a:stretch>
+            <a:fillRect/>
+          </a:stretch>
+        </p:blipFill>
+        <p:spPr>
+          <a:xfrm>
+            <a:off x="3656590" y="2251120"/>
+            <a:ext cx="3731663" cy="859467"/>
+          </a:xfrm>
+          <a:prstGeom prst="rect">
+            <a:avLst/>
+          </a:prstGeom>
+        </p:spPr>
+      </p:pic>
+    </p:spTree>
+    <p:extLst>
+      <p:ext uri="{BB962C8B-B14F-4D97-AF65-F5344CB8AC3E}">
+        <p14:creationId xmlns:p14="http://schemas.microsoft.com/office/powerpoint/2010/main" val="3297310689"/>
       </p:ext>
     </p:extLst>
   </p:cSld>
@@ -10426,11 +9268,7 @@
           <a:p>
             <a:r>
               <a:rPr lang="en-US" dirty="0" err="1" smtClean="0"/>
-              <a:t>Git</a:t>
-            </a:r>
-            <a:r>
-              <a:rPr lang="en-US" dirty="0" smtClean="0"/>
-              <a:t> clone – Lab it up!</a:t>
+              <a:t>Github</a:t>
             </a:r>
             <a:endParaRPr lang="en-US" dirty="0"/>
           </a:p>
@@ -10452,8 +9290,12 @@
           <a:lstStyle/>
           <a:p>
             <a:r>
+              <a:rPr lang="en-US" dirty="0" smtClean="0"/>
+              <a:t>Vi </a:t>
+            </a:r>
+            <a:r>
               <a:rPr lang="en-US" dirty="0" err="1" smtClean="0"/>
-              <a:t>Gå</a:t>
+              <a:t>flytter</a:t>
             </a:r>
             <a:r>
               <a:rPr lang="en-US" dirty="0" smtClean="0"/>
@@ -10461,7 +9303,7 @@
             </a:r>
             <a:r>
               <a:rPr lang="en-US" dirty="0" err="1" smtClean="0"/>
-              <a:t>sammen</a:t>
+              <a:t>prosjektet</a:t>
             </a:r>
             <a:r>
               <a:rPr lang="en-US" dirty="0" smtClean="0"/>
@@ -10469,35 +9311,70 @@
             </a:r>
             <a:r>
               <a:rPr lang="en-US" dirty="0" err="1" smtClean="0"/>
-              <a:t>i</a:t>
-            </a:r>
-            <a:r>
-              <a:rPr lang="en-US" dirty="0" smtClean="0"/>
-              <a:t> par, lag repository.</a:t>
-            </a:r>
-          </a:p>
-          <a:p>
-            <a:r>
-              <a:rPr lang="en-US" dirty="0" smtClean="0"/>
-              <a:t>Merge</a:t>
-            </a:r>
-            <a:endParaRPr lang="en-US" dirty="0"/>
-          </a:p>
-          <a:p>
-            <a:r>
-              <a:rPr lang="en-US" dirty="0"/>
-              <a:t>Merge conflict.</a:t>
-            </a:r>
-          </a:p>
-          <a:p>
-            <a:endParaRPr lang="en-US" dirty="0"/>
+              <a:t>vårt</a:t>
+            </a:r>
+            <a:r>
+              <a:rPr lang="en-US" dirty="0" smtClean="0"/>
+              <a:t> </a:t>
+            </a:r>
+            <a:r>
+              <a:rPr lang="en-US" dirty="0" err="1" smtClean="0"/>
+              <a:t>opp</a:t>
+            </a:r>
+            <a:r>
+              <a:rPr lang="en-US" dirty="0" smtClean="0"/>
+              <a:t> I </a:t>
+            </a:r>
+            <a:r>
+              <a:rPr lang="en-US" dirty="0" err="1" smtClean="0"/>
+              <a:t>skya</a:t>
+            </a:r>
+            <a:r>
+              <a:rPr lang="en-US" dirty="0" smtClean="0"/>
+              <a:t>!</a:t>
+            </a:r>
+          </a:p>
+          <a:p>
+            <a:pPr lvl="1"/>
+            <a:r>
+              <a:rPr lang="en-US" dirty="0" smtClean="0"/>
+              <a:t>Add origin</a:t>
+            </a:r>
+          </a:p>
+          <a:p>
+            <a:pPr lvl="1"/>
+            <a:r>
+              <a:rPr lang="en-US" dirty="0" smtClean="0"/>
+              <a:t>Push remote</a:t>
+            </a:r>
+          </a:p>
+          <a:p>
+            <a:pPr lvl="1"/>
+            <a:r>
+              <a:rPr lang="en-US" dirty="0" smtClean="0"/>
+              <a:t>Clone</a:t>
+            </a:r>
+          </a:p>
+          <a:p>
+            <a:pPr lvl="1"/>
+            <a:r>
+              <a:rPr lang="en-US" dirty="0" smtClean="0"/>
+              <a:t>Push</a:t>
+            </a:r>
+          </a:p>
+          <a:p>
+            <a:pPr lvl="1"/>
+            <a:r>
+              <a:rPr lang="en-US" dirty="0" smtClean="0"/>
+              <a:t>Pull</a:t>
+            </a:r>
           </a:p>
         </p:txBody>
       </p:sp>
     </p:spTree>
     <p:extLst>
       <p:ext uri="{BB962C8B-B14F-4D97-AF65-F5344CB8AC3E}">
-        <p14:creationId xmlns:p14="http://schemas.microsoft.com/office/powerpoint/2010/main" val="314678066"/>
+        <p14:creationId xmlns:p14="http://schemas.microsoft.com/office/powerpoint/2010/main" val="3350630885"/>
       </p:ext>
     </p:extLst>
   </p:cSld>
@@ -10538,97 +9415,6 @@
             <a:spLocks noGrp="1"/>
           </p:cNvSpPr>
           <p:nvPr>
-            <p:ph type="ctrTitle"/>
-          </p:nvPr>
-        </p:nvSpPr>
-        <p:spPr/>
-        <p:txBody>
-          <a:bodyPr/>
-          <a:lstStyle/>
-          <a:p>
-            <a:r>
-              <a:rPr lang="en-US" smtClean="0"/>
-              <a:t>GIT</a:t>
-            </a:r>
-            <a:endParaRPr lang="en-US" dirty="0"/>
-          </a:p>
-        </p:txBody>
-      </p:sp>
-      <p:sp>
-        <p:nvSpPr>
-          <p:cNvPr id="3" name="Subtitle 2"/>
-          <p:cNvSpPr>
-            <a:spLocks noGrp="1"/>
-          </p:cNvSpPr>
-          <p:nvPr>
-            <p:ph type="subTitle" idx="1"/>
-          </p:nvPr>
-        </p:nvSpPr>
-        <p:spPr/>
-        <p:txBody>
-          <a:bodyPr/>
-          <a:lstStyle/>
-          <a:p>
-            <a:r>
-              <a:rPr lang="en-US" smtClean="0"/>
-              <a:t>Distribuert versjonskontroll</a:t>
-            </a:r>
-            <a:endParaRPr lang="en-US" dirty="0"/>
-          </a:p>
-        </p:txBody>
-      </p:sp>
-    </p:spTree>
-    <p:extLst>
-      <p:ext uri="{BB962C8B-B14F-4D97-AF65-F5344CB8AC3E}">
-        <p14:creationId xmlns:p14="http://schemas.microsoft.com/office/powerpoint/2010/main" val="4195604889"/>
-      </p:ext>
-    </p:extLst>
-  </p:cSld>
-  <p:clrMapOvr>
-    <a:masterClrMapping/>
-  </p:clrMapOvr>
-  <mc:AlternateContent xmlns:mc="http://schemas.openxmlformats.org/markup-compatibility/2006" xmlns:p14="http://schemas.microsoft.com/office/powerpoint/2010/main">
-    <mc:Choice Requires="p14">
-      <p:transition p14:dur="10"/>
-    </mc:Choice>
-    <mc:Fallback xmlns="">
-      <p:transition/>
-    </mc:Fallback>
-  </mc:AlternateContent>
-  <p:timing>
-    <p:tnLst>
-      <p:par>
-        <p:cTn id="1" dur="indefinite" restart="never" nodeType="tmRoot"/>
-      </p:par>
-    </p:tnLst>
-  </p:timing>
-</p:sld>
-</file>
-
-<file path=ppt/slides/slide30.xml><?xml version="1.0" encoding="utf-8"?>
-<p:sld xmlns:a="http://schemas.openxmlformats.org/drawingml/2006/main" xmlns:r="http://schemas.openxmlformats.org/officeDocument/2006/relationships" xmlns:p="http://schemas.openxmlformats.org/presentationml/2006/main">
-  <p:cSld>
-    <p:spTree>
-      <p:nvGrpSpPr>
-        <p:cNvPr id="1" name=""/>
-        <p:cNvGrpSpPr/>
-        <p:nvPr/>
-      </p:nvGrpSpPr>
-      <p:grpSpPr>
-        <a:xfrm>
-          <a:off x="0" y="0"/>
-          <a:ext cx="0" cy="0"/>
-          <a:chOff x="0" y="0"/>
-          <a:chExt cx="0" cy="0"/>
-        </a:xfrm>
-      </p:grpSpPr>
-      <p:sp>
-        <p:nvSpPr>
-          <p:cNvPr id="2" name="Title 1"/>
-          <p:cNvSpPr>
-            <a:spLocks noGrp="1"/>
-          </p:cNvSpPr>
-          <p:nvPr>
             <p:ph type="title"/>
           </p:nvPr>
         </p:nvSpPr>
@@ -10638,8 +9424,8 @@
           <a:lstStyle/>
           <a:p>
             <a:r>
-              <a:rPr lang="en-US" dirty="0" err="1" smtClean="0"/>
-              <a:t>Github</a:t>
+              <a:rPr lang="en-US" dirty="0" smtClean="0"/>
+              <a:t>Agenda</a:t>
             </a:r>
             <a:endParaRPr lang="en-US" dirty="0"/>
           </a:p>
@@ -10662,51 +9448,152 @@
           <a:p>
             <a:r>
               <a:rPr lang="en-US" dirty="0" err="1" smtClean="0"/>
-              <a:t>Lage</a:t>
-            </a:r>
-            <a:r>
-              <a:rPr lang="en-US" dirty="0" smtClean="0"/>
-              <a:t> repository</a:t>
-            </a:r>
-          </a:p>
-          <a:p>
-            <a:r>
-              <a:rPr lang="en-US" dirty="0" smtClean="0"/>
-              <a:t>Fork</a:t>
-            </a:r>
-          </a:p>
-          <a:p>
-            <a:r>
-              <a:rPr lang="en-US" dirty="0" smtClean="0"/>
-              <a:t>Clone</a:t>
-            </a:r>
-          </a:p>
-          <a:p>
-            <a:r>
-              <a:rPr lang="en-US" dirty="0" smtClean="0"/>
-              <a:t>Remote</a:t>
+              <a:t>Hva</a:t>
+            </a:r>
+            <a:r>
+              <a:rPr lang="en-US" dirty="0" smtClean="0"/>
+              <a:t> </a:t>
+            </a:r>
+            <a:r>
+              <a:rPr lang="en-US" dirty="0" err="1" smtClean="0"/>
+              <a:t>er</a:t>
+            </a:r>
+            <a:r>
+              <a:rPr lang="en-US" dirty="0" smtClean="0"/>
+              <a:t> </a:t>
+            </a:r>
+            <a:r>
+              <a:rPr lang="en-US" dirty="0" err="1" smtClean="0"/>
+              <a:t>versjonskontroll</a:t>
+            </a:r>
+            <a:r>
+              <a:rPr lang="en-US" dirty="0" smtClean="0"/>
+              <a:t> </a:t>
+            </a:r>
+            <a:r>
+              <a:rPr lang="en-US" dirty="0" err="1" smtClean="0"/>
+              <a:t>og</a:t>
+            </a:r>
+            <a:r>
+              <a:rPr lang="en-US" dirty="0" smtClean="0"/>
+              <a:t> </a:t>
+            </a:r>
+            <a:r>
+              <a:rPr lang="en-US" dirty="0" err="1" smtClean="0"/>
+              <a:t>hvorfor</a:t>
+            </a:r>
+            <a:r>
+              <a:rPr lang="en-US" dirty="0" smtClean="0"/>
+              <a:t> </a:t>
+            </a:r>
+            <a:r>
+              <a:rPr lang="en-US" dirty="0" err="1" smtClean="0"/>
+              <a:t>skal</a:t>
+            </a:r>
+            <a:r>
+              <a:rPr lang="en-US" dirty="0" smtClean="0"/>
+              <a:t> vi </a:t>
+            </a:r>
+            <a:r>
+              <a:rPr lang="en-US" dirty="0" err="1" smtClean="0"/>
+              <a:t>bry</a:t>
+            </a:r>
+            <a:r>
+              <a:rPr lang="en-US" dirty="0" smtClean="0"/>
+              <a:t> </a:t>
+            </a:r>
+            <a:r>
+              <a:rPr lang="en-US" dirty="0" err="1" smtClean="0"/>
+              <a:t>oss</a:t>
+            </a:r>
+            <a:r>
+              <a:rPr lang="en-US" dirty="0"/>
+              <a:t>?</a:t>
+            </a:r>
+            <a:r>
+              <a:rPr lang="en-US" dirty="0" smtClean="0"/>
+              <a:t> $</a:t>
+            </a:r>
+          </a:p>
+          <a:p>
+            <a:r>
+              <a:rPr lang="en-US" dirty="0" err="1" smtClean="0"/>
+              <a:t>Hva</a:t>
+            </a:r>
+            <a:r>
+              <a:rPr lang="en-US" dirty="0" smtClean="0"/>
+              <a:t> </a:t>
+            </a:r>
+            <a:r>
+              <a:rPr lang="en-US" dirty="0" err="1" smtClean="0"/>
+              <a:t>er</a:t>
+            </a:r>
+            <a:r>
+              <a:rPr lang="en-US" dirty="0" smtClean="0"/>
+              <a:t> </a:t>
+            </a:r>
+            <a:r>
+              <a:rPr lang="en-US" dirty="0" err="1" smtClean="0"/>
+              <a:t>git</a:t>
+            </a:r>
+            <a:r>
+              <a:rPr lang="en-US" dirty="0" smtClean="0"/>
+              <a:t>?</a:t>
+            </a:r>
+            <a:endParaRPr lang="en-US" dirty="0"/>
+          </a:p>
+          <a:p>
+            <a:r>
+              <a:rPr lang="en-US" dirty="0" err="1" smtClean="0"/>
+              <a:t>Kommandolinje</a:t>
             </a:r>
             <a:endParaRPr lang="en-US" dirty="0" smtClean="0"/>
           </a:p>
           <a:p>
             <a:r>
               <a:rPr lang="en-US" dirty="0" smtClean="0"/>
-              <a:t>Push</a:t>
-            </a:r>
-          </a:p>
-          <a:p>
-            <a:r>
-              <a:rPr lang="en-US" dirty="0" smtClean="0"/>
-              <a:t>Pull</a:t>
+              <a:t>Hands on</a:t>
+            </a:r>
+          </a:p>
+          <a:p>
+            <a:r>
+              <a:rPr lang="en-US" dirty="0" err="1" smtClean="0"/>
+              <a:t>Github</a:t>
             </a:r>
             <a:endParaRPr lang="en-US" dirty="0" smtClean="0"/>
+          </a:p>
+          <a:p>
+            <a:r>
+              <a:rPr lang="en-US" dirty="0" err="1" smtClean="0"/>
+              <a:t>Eksterne</a:t>
+            </a:r>
+            <a:r>
+              <a:rPr lang="en-US" dirty="0" smtClean="0"/>
+              <a:t> </a:t>
+            </a:r>
+            <a:r>
+              <a:rPr lang="en-US" dirty="0" err="1" smtClean="0"/>
+              <a:t>tjenester</a:t>
+            </a:r>
+            <a:endParaRPr lang="en-US" dirty="0" smtClean="0"/>
+          </a:p>
+          <a:p>
+            <a:r>
+              <a:rPr lang="en-US" dirty="0" smtClean="0"/>
+              <a:t>.</a:t>
+            </a:r>
+            <a:r>
+              <a:rPr lang="en-US" dirty="0" err="1" smtClean="0"/>
+              <a:t>gitconfig</a:t>
+            </a:r>
+            <a:endParaRPr lang="en-US" dirty="0"/>
           </a:p>
         </p:txBody>
       </p:sp>
     </p:spTree>
     <p:extLst>
       <p:ext uri="{BB962C8B-B14F-4D97-AF65-F5344CB8AC3E}">
-        <p14:creationId xmlns:p14="http://schemas.microsoft.com/office/powerpoint/2010/main" val="3350630885"/>
+        <p14:creationId xmlns:p14="http://schemas.microsoft.com/office/powerpoint/2010/main" val="3495753753"/>
       </p:ext>
     </p:extLst>
   </p:cSld>
@@ -10723,7 +9610,7 @@
 </p:sld>
 </file>
 
-<file path=ppt/slides/slide31.xml><?xml version="1.0" encoding="utf-8"?>
+<file path=ppt/slides/slide30.xml><?xml version="1.0" encoding="utf-8"?>
 <p:sld xmlns:a="http://schemas.openxmlformats.org/drawingml/2006/main" xmlns:r="http://schemas.openxmlformats.org/officeDocument/2006/relationships" xmlns:p="http://schemas.openxmlformats.org/presentationml/2006/main">
   <p:cSld>
     <p:spTree>
@@ -11098,7 +9985,7 @@
 </p:sld>
 </file>
 
-<file path=ppt/slides/slide32.xml><?xml version="1.0" encoding="utf-8"?>
+<file path=ppt/slides/slide31.xml><?xml version="1.0" encoding="utf-8"?>
 <p:sld xmlns:a="http://schemas.openxmlformats.org/drawingml/2006/main" xmlns:r="http://schemas.openxmlformats.org/officeDocument/2006/relationships" xmlns:p="http://schemas.openxmlformats.org/presentationml/2006/main">
   <p:cSld>
     <p:spTree>
@@ -11268,10 +10155,29 @@
           <a:lstStyle/>
           <a:p>
             <a:r>
-              <a:rPr lang="en-US" dirty="0" smtClean="0"/>
-              <a:t>Agenda</a:t>
-            </a:r>
-            <a:endParaRPr lang="en-US" dirty="0"/>
+              <a:rPr lang="en-US" dirty="0" err="1"/>
+              <a:t>Hva</a:t>
+            </a:r>
+            <a:r>
+              <a:rPr lang="en-US" dirty="0"/>
+              <a:t> </a:t>
+            </a:r>
+            <a:r>
+              <a:rPr lang="en-US" dirty="0" err="1"/>
+              <a:t>er</a:t>
+            </a:r>
+            <a:r>
+              <a:rPr lang="en-US" dirty="0"/>
+              <a:t> </a:t>
+            </a:r>
+            <a:r>
+              <a:rPr lang="en-US" dirty="0" err="1"/>
+              <a:t>versjonskontroll</a:t>
+            </a:r>
+            <a:r>
+              <a:rPr lang="en-US" dirty="0"/>
+              <a:t>?</a:t>
+            </a:r>
           </a:p>
         </p:txBody>
       </p:sp>
@@ -11290,121 +10196,55 @@
           <a:bodyPr/>
           <a:lstStyle/>
           <a:p>
-            <a:r>
-              <a:rPr lang="en-US" dirty="0" err="1" smtClean="0"/>
-              <a:t>Hva</a:t>
-            </a:r>
-            <a:r>
-              <a:rPr lang="en-US" dirty="0" smtClean="0"/>
-              <a:t> </a:t>
-            </a:r>
-            <a:r>
-              <a:rPr lang="en-US" dirty="0" err="1" smtClean="0"/>
-              <a:t>er</a:t>
-            </a:r>
-            <a:r>
-              <a:rPr lang="en-US" dirty="0" smtClean="0"/>
-              <a:t> </a:t>
-            </a:r>
-            <a:r>
-              <a:rPr lang="en-US" dirty="0" err="1" smtClean="0"/>
-              <a:t>git</a:t>
-            </a:r>
-            <a:r>
-              <a:rPr lang="en-US" dirty="0" smtClean="0"/>
-              <a:t>?</a:t>
-            </a:r>
-          </a:p>
-          <a:p>
-            <a:r>
-              <a:rPr lang="en-US" dirty="0" err="1" smtClean="0"/>
-              <a:t>Hvorfor</a:t>
-            </a:r>
-            <a:r>
-              <a:rPr lang="en-US" dirty="0" smtClean="0"/>
-              <a:t> </a:t>
-            </a:r>
-            <a:r>
-              <a:rPr lang="en-US" dirty="0" err="1" smtClean="0"/>
-              <a:t>skal</a:t>
-            </a:r>
-            <a:r>
-              <a:rPr lang="en-US" dirty="0" smtClean="0"/>
-              <a:t> vi </a:t>
-            </a:r>
-            <a:r>
-              <a:rPr lang="en-US" dirty="0" err="1" smtClean="0"/>
-              <a:t>bruke</a:t>
-            </a:r>
-            <a:r>
-              <a:rPr lang="en-US" dirty="0" smtClean="0"/>
-              <a:t> </a:t>
-            </a:r>
-            <a:r>
-              <a:rPr lang="en-US" dirty="0" err="1" smtClean="0"/>
-              <a:t>versjonskontroll</a:t>
-            </a:r>
-            <a:r>
-              <a:rPr lang="en-US" dirty="0" smtClean="0"/>
-              <a:t>?</a:t>
-            </a:r>
-          </a:p>
-          <a:p>
-            <a:r>
-              <a:rPr lang="en-US" dirty="0" err="1" smtClean="0"/>
-              <a:t>Kommandolinje</a:t>
-            </a:r>
-            <a:endParaRPr lang="en-US" dirty="0" smtClean="0"/>
-          </a:p>
-          <a:p>
-            <a:r>
-              <a:rPr lang="en-US" dirty="0" smtClean="0"/>
-              <a:t>Hands </a:t>
-            </a:r>
-            <a:r>
-              <a:rPr lang="en-US" dirty="0" smtClean="0"/>
-              <a:t>on</a:t>
-            </a:r>
-          </a:p>
-          <a:p>
-            <a:r>
-              <a:rPr lang="en-US" dirty="0" err="1" smtClean="0"/>
-              <a:t>Github</a:t>
-            </a:r>
-            <a:endParaRPr lang="en-US" dirty="0" smtClean="0"/>
-          </a:p>
-          <a:p>
-            <a:r>
-              <a:rPr lang="en-US" dirty="0" err="1" smtClean="0"/>
-              <a:t>Eksterne</a:t>
-            </a:r>
-            <a:r>
-              <a:rPr lang="en-US" dirty="0" smtClean="0"/>
-              <a:t> </a:t>
-            </a:r>
-            <a:r>
-              <a:rPr lang="en-US" dirty="0" err="1" smtClean="0"/>
-              <a:t>tjenester</a:t>
-            </a:r>
-            <a:endParaRPr lang="en-US" dirty="0" smtClean="0"/>
-          </a:p>
-          <a:p>
-            <a:r>
-              <a:rPr lang="en-US" dirty="0" smtClean="0"/>
-              <a:t>.</a:t>
-            </a:r>
-            <a:r>
-              <a:rPr lang="en-US" dirty="0" err="1" smtClean="0"/>
-              <a:t>gitconfig</a:t>
-            </a:r>
             <a:endParaRPr lang="en-US" dirty="0"/>
           </a:p>
         </p:txBody>
       </p:sp>
+      <p:pic>
+        <p:nvPicPr>
+          <p:cNvPr id="1026" name="Picture 2" descr="http://smutch.github.io/VersionControlTutorial/_images/vc-xkcd.jpg"/>
+          <p:cNvPicPr>
+            <a:picLocks noChangeAspect="1" noChangeArrowheads="1"/>
+          </p:cNvPicPr>
+          <p:nvPr/>
+        </p:nvPicPr>
+        <p:blipFill>
+          <a:blip r:embed="rId2">
+            <a:extLst>
+              <a:ext uri="{28A0092B-C50C-407E-A947-70E740481C1C}">
+                <a14:useLocalDpi xmlns:a14="http://schemas.microsoft.com/office/drawing/2010/main" val="0"/>
+              </a:ext>
+            </a:extLst>
+          </a:blip>
+          <a:srcRect/>
+          <a:stretch>
+            <a:fillRect/>
+          </a:stretch>
+        </p:blipFill>
+        <p:spPr bwMode="auto">
+          <a:xfrm>
+            <a:off x="2161310" y="2171700"/>
+            <a:ext cx="7896225" cy="3629025"/>
+          </a:xfrm>
+          <a:prstGeom prst="rect">
+            <a:avLst/>
+          </a:prstGeom>
+          <a:noFill/>
+          <a:extLst>
+            <a:ext uri="{909E8E84-426E-40DD-AFC4-6F175D3DCCD1}">
+              <a14:hiddenFill xmlns:a14="http://schemas.microsoft.com/office/drawing/2010/main">
+                <a:solidFill>
+                  <a:srgbClr val="FFFFFF"/>
+                </a:solidFill>
+              </a14:hiddenFill>
+            </a:ext>
+          </a:extLst>
+        </p:spPr>
+      </p:pic>
     </p:spTree>
     <p:extLst>
       <p:ext uri="{BB962C8B-B14F-4D97-AF65-F5344CB8AC3E}">
-        <p14:creationId xmlns:p14="http://schemas.microsoft.com/office/powerpoint/2010/main" val="3495753753"/>
+        <p14:creationId xmlns:p14="http://schemas.microsoft.com/office/powerpoint/2010/main" val="2900801447"/>
       </p:ext>
     </p:extLst>
   </p:cSld>
@@ -11454,29 +10294,17 @@
           <a:lstStyle/>
           <a:p>
             <a:r>
-              <a:rPr lang="en-US" dirty="0" err="1"/>
-              <a:t>Hva</a:t>
+              <a:rPr lang="en-US" dirty="0" smtClean="0"/>
+              <a:t>Local </a:t>
             </a:r>
             <a:r>
               <a:rPr lang="en-US" dirty="0"/>
-              <a:t> </a:t>
-            </a:r>
-            <a:r>
-              <a:rPr lang="en-US" dirty="0" err="1"/>
-              <a:t>er</a:t>
-            </a:r>
-            <a:r>
+              <a:t>Version Control Systems</a:t>
+            </a:r>
+            <a:br>
               <a:rPr lang="en-US" dirty="0"/>
-              <a:t> </a:t>
-            </a:r>
-            <a:r>
-              <a:rPr lang="en-US" dirty="0" err="1"/>
-              <a:t>versjonskontroll</a:t>
-            </a:r>
-            <a:r>
-              <a:rPr lang="en-US" dirty="0"/>
-              <a:t>?</a:t>
-            </a:r>
+            </a:br>
+            <a:endParaRPr lang="en-US" dirty="0"/>
           </a:p>
         </p:txBody>
       </p:sp>
@@ -11492,67 +10320,13 @@
         </p:nvSpPr>
         <p:spPr>
           <a:xfrm>
-            <a:off x="1371600" y="1942238"/>
+            <a:off x="1429789" y="1734419"/>
             <a:ext cx="9601200" cy="3581400"/>
           </a:xfrm>
         </p:spPr>
         <p:txBody>
           <a:bodyPr/>
           <a:lstStyle/>
-          <a:p>
-            <a:pPr marL="384048" lvl="1">
-              <a:spcBef>
-                <a:spcPts val="1000"/>
-              </a:spcBef>
-              <a:buFont typeface="Franklin Gothic Book" panose="020B0503020102020204" pitchFamily="34" charset="0"/>
-              <a:buChar char="■"/>
-            </a:pPr>
-            <a:r>
-              <a:rPr lang="en-US" dirty="0"/>
-              <a:t>Local Version Control </a:t>
-            </a:r>
-            <a:r>
-              <a:rPr lang="en-US" dirty="0" smtClean="0"/>
-              <a:t>Systems</a:t>
-            </a:r>
-          </a:p>
-          <a:p>
-            <a:pPr marL="841248" lvl="2">
-              <a:spcBef>
-                <a:spcPts val="1000"/>
-              </a:spcBef>
-            </a:pPr>
-            <a:r>
-              <a:rPr lang="en-US" dirty="0" smtClean="0"/>
-              <a:t>File Lock</a:t>
-            </a:r>
-          </a:p>
-          <a:p>
-            <a:pPr marL="384048" lvl="1">
-              <a:spcBef>
-                <a:spcPts val="1000"/>
-              </a:spcBef>
-              <a:buFont typeface="Franklin Gothic Book" panose="020B0503020102020204" pitchFamily="34" charset="0"/>
-              <a:buChar char="■"/>
-            </a:pPr>
-            <a:r>
-              <a:rPr lang="en-US" dirty="0"/>
-              <a:t>Centralized Version Control Systems</a:t>
-            </a:r>
-          </a:p>
-          <a:p>
-            <a:pPr marL="384048" lvl="1">
-              <a:spcBef>
-                <a:spcPts val="1000"/>
-              </a:spcBef>
-              <a:buFont typeface="Franklin Gothic Book" panose="020B0503020102020204" pitchFamily="34" charset="0"/>
-              <a:buChar char="■"/>
-            </a:pPr>
-            <a:r>
-              <a:rPr lang="en-US" dirty="0"/>
-              <a:t>Distributed Version Control Systems</a:t>
-            </a:r>
-          </a:p>
           <a:p>
             <a:pPr marL="384048" lvl="1">
               <a:spcBef>
@@ -11568,6 +10342,30 @@
           </a:p>
         </p:txBody>
       </p:sp>
+      <p:pic>
+        <p:nvPicPr>
+          <p:cNvPr id="4" name="Picture 3"/>
+          <p:cNvPicPr>
+            <a:picLocks noChangeAspect="1"/>
+          </p:cNvPicPr>
+          <p:nvPr/>
+        </p:nvPicPr>
+        <p:blipFill>
+          <a:blip r:embed="rId2"/>
+          <a:stretch>
+            <a:fillRect/>
+          </a:stretch>
+        </p:blipFill>
+        <p:spPr>
+          <a:xfrm>
+            <a:off x="3809317" y="2196852"/>
+            <a:ext cx="4024725" cy="2656534"/>
+          </a:xfrm>
+          <a:prstGeom prst="rect">
+            <a:avLst/>
+          </a:prstGeom>
+        </p:spPr>
+      </p:pic>
     </p:spTree>
     <p:extLst>
       <p:ext uri="{BB962C8B-B14F-4D97-AF65-F5344CB8AC3E}">
@@ -12049,7 +10847,7 @@
             </a:r>
             <a:r>
               <a:rPr lang="en-US" dirty="0" err="1" smtClean="0"/>
-              <a:t>gitt</a:t>
+              <a:t>git</a:t>
             </a:r>
             <a:r>
               <a:rPr lang="en-US" dirty="0" smtClean="0"/>
@@ -12084,7 +10882,6 @@
               <a:rPr lang="en-US" dirty="0" smtClean="0"/>
               <a:t>Built for speed</a:t>
             </a:r>
-            <a:endParaRPr lang="en-US" dirty="0" smtClean="0"/>
           </a:p>
           <a:p>
             <a:pPr lvl="1"/>
@@ -12098,7 +10895,7 @@
             </a:r>
             <a:r>
               <a:rPr lang="en-US" dirty="0" err="1" smtClean="0"/>
-              <a:t>sammarbeid</a:t>
+              <a:t>samarbeid</a:t>
             </a:r>
             <a:r>
               <a:rPr lang="en-US" dirty="0" smtClean="0"/>
@@ -12124,15 +10921,94 @@
               <a:rPr lang="en-US" dirty="0" err="1" smtClean="0"/>
               <a:t>prosjekter</a:t>
             </a:r>
-            <a:r>
-              <a:rPr lang="en-US" dirty="0" smtClean="0"/>
-              <a:t> ~ </a:t>
+            <a:endParaRPr lang="en-US" dirty="0"/>
+          </a:p>
+          <a:p>
+            <a:pPr lvl="2"/>
+            <a:r>
+              <a:rPr lang="en-US" dirty="0" smtClean="0"/>
+              <a:t> </a:t>
+            </a:r>
+            <a:r>
+              <a:rPr lang="en-US" dirty="0" err="1" smtClean="0"/>
+              <a:t>linuxkjernen</a:t>
+            </a:r>
+            <a:r>
+              <a:rPr lang="en-US" dirty="0" smtClean="0"/>
+              <a:t> </a:t>
+            </a:r>
+            <a:r>
+              <a:rPr lang="en-US" dirty="0" err="1" smtClean="0"/>
+              <a:t>har</a:t>
+            </a:r>
+            <a:r>
+              <a:rPr lang="en-US" dirty="0" smtClean="0"/>
+              <a:t> </a:t>
+            </a:r>
+            <a:r>
+              <a:rPr lang="en-US" dirty="0" err="1" smtClean="0"/>
+              <a:t>bidrag</a:t>
+            </a:r>
+            <a:r>
+              <a:rPr lang="en-US" dirty="0" smtClean="0"/>
+              <a:t> </a:t>
+            </a:r>
+            <a:r>
+              <a:rPr lang="en-US" dirty="0" err="1" smtClean="0"/>
+              <a:t>fra</a:t>
+            </a:r>
+            <a:r>
+              <a:rPr lang="en-US" dirty="0" smtClean="0"/>
+              <a:t> over  </a:t>
+            </a:r>
+            <a:r>
+              <a:rPr lang="en-US" b="1" i="0" dirty="0" smtClean="0"/>
+              <a:t>12,000</a:t>
             </a:r>
             <a:r>
               <a:rPr lang="en-US" b="1" i="0" dirty="0"/>
-              <a:t>12,000 </a:t>
-            </a:r>
-            <a:endParaRPr lang="en-US" b="1" i="0" dirty="0" smtClean="0"/>
+              <a:t> </a:t>
+            </a:r>
+            <a:r>
+              <a:rPr lang="en-US" b="1" i="0" dirty="0" smtClean="0"/>
+              <a:t> </a:t>
+            </a:r>
+            <a:r>
+              <a:rPr lang="en-US" i="0" dirty="0" err="1" smtClean="0"/>
+              <a:t>personer</a:t>
+            </a:r>
+            <a:r>
+              <a:rPr lang="en-US" dirty="0"/>
+              <a:t> </a:t>
+            </a:r>
+            <a:r>
+              <a:rPr lang="en-US" dirty="0" smtClean="0"/>
+              <a:t>med </a:t>
+            </a:r>
+            <a:r>
+              <a:rPr lang="en-US" dirty="0" err="1" smtClean="0"/>
+              <a:t>bruk</a:t>
+            </a:r>
+            <a:r>
+              <a:rPr lang="en-US" dirty="0" smtClean="0"/>
+              <a:t> </a:t>
+            </a:r>
+            <a:r>
+              <a:rPr lang="en-US" dirty="0" err="1" smtClean="0"/>
+              <a:t>av</a:t>
+            </a:r>
+            <a:r>
+              <a:rPr lang="en-US" dirty="0" smtClean="0"/>
+              <a:t> </a:t>
+            </a:r>
+            <a:r>
+              <a:rPr lang="en-US" dirty="0" err="1" smtClean="0"/>
+              <a:t>git</a:t>
+            </a:r>
+            <a:r>
+              <a:rPr lang="en-US" b="1" i="0" dirty="0" smtClean="0"/>
+              <a:t>!</a:t>
+            </a:r>
           </a:p>
           <a:p>
             <a:r>
@@ -12144,7 +11020,7 @@
             <a:pPr lvl="1"/>
             <a:r>
               <a:rPr lang="en-US" i="0" dirty="0" err="1" smtClean="0"/>
-              <a:t>Kjenner</a:t>
+              <a:t>Må</a:t>
             </a:r>
             <a:r>
               <a:rPr lang="en-US" i="0" dirty="0" smtClean="0"/>
@@ -12152,7 +11028,7 @@
             </a:r>
             <a:r>
               <a:rPr lang="en-US" i="0" dirty="0" err="1" smtClean="0"/>
-              <a:t>ikke</a:t>
+              <a:t>laste</a:t>
             </a:r>
             <a:r>
               <a:rPr lang="en-US" i="0" dirty="0" smtClean="0"/>
@@ -12160,46 +11036,11 @@
             </a:r>
             <a:r>
               <a:rPr lang="en-US" i="0" dirty="0" err="1" smtClean="0"/>
-              <a:t>til</a:t>
+              <a:t>ned</a:t>
             </a:r>
             <a:r>
               <a:rPr lang="en-US" i="0" dirty="0" smtClean="0"/>
-              <a:t> </a:t>
-            </a:r>
-            <a:r>
-              <a:rPr lang="en-US" i="0" dirty="0" err="1" smtClean="0"/>
-              <a:t>enkelte</a:t>
-            </a:r>
-            <a:r>
-              <a:rPr lang="en-US" i="0" dirty="0" smtClean="0"/>
-              <a:t> filer</a:t>
-            </a:r>
-          </a:p>
-          <a:p>
-            <a:pPr lvl="1"/>
-            <a:r>
-              <a:rPr lang="en-US" i="0" dirty="0" err="1" smtClean="0"/>
-              <a:t>Må</a:t>
-            </a:r>
-            <a:r>
-              <a:rPr lang="en-US" i="0" dirty="0" smtClean="0"/>
-              <a:t> </a:t>
-            </a:r>
-            <a:r>
-              <a:rPr lang="en-US" i="0" dirty="0" err="1" smtClean="0"/>
-              <a:t>laste</a:t>
-            </a:r>
-            <a:r>
-              <a:rPr lang="en-US" i="0" dirty="0" smtClean="0"/>
-              <a:t> </a:t>
-            </a:r>
-            <a:r>
-              <a:rPr lang="en-US" i="0" dirty="0" err="1" smtClean="0"/>
-              <a:t>ned</a:t>
-            </a:r>
-            <a:r>
-              <a:rPr lang="en-US" i="0" dirty="0" smtClean="0"/>
-              <a:t> hele</a:t>
+              <a:t> hele repository</a:t>
             </a:r>
           </a:p>
           <a:p>
@@ -12247,7 +11088,7 @@
         </p:blipFill>
         <p:spPr bwMode="auto">
           <a:xfrm>
-            <a:off x="9333348" y="1911928"/>
+            <a:off x="8517373" y="955964"/>
             <a:ext cx="2285997" cy="2285997"/>
           </a:xfrm>
           <a:prstGeom prst="rect">
@@ -12288,7 +11129,7 @@
         </p:blipFill>
         <p:spPr bwMode="auto">
           <a:xfrm>
-            <a:off x="7755373" y="2445325"/>
+            <a:off x="6857599" y="1356011"/>
             <a:ext cx="1219200" cy="1219201"/>
           </a:xfrm>
           <a:prstGeom prst="rect">
@@ -13734,7 +12575,6 @@
                         <a:rPr lang="en-US" dirty="0" smtClean="0"/>
                         <a:t>Clone</a:t>
                       </a:r>
-                      <a:endParaRPr lang="en-US" dirty="0" smtClean="0"/>
                     </a:p>
                   </a:txBody>
                   <a:tcPr/>
@@ -13765,7 +12605,6 @@
                         <a:rPr lang="en-US" dirty="0" smtClean="0"/>
                         <a:t>Add</a:t>
                       </a:r>
-                      <a:endParaRPr lang="en-US" dirty="0" smtClean="0"/>
                     </a:p>
                   </a:txBody>
                   <a:tcPr/>
@@ -13796,7 +12635,6 @@
                         <a:rPr lang="en-US" dirty="0" smtClean="0"/>
                         <a:t>Status</a:t>
                       </a:r>
-                      <a:endParaRPr lang="en-US" dirty="0" smtClean="0"/>
                     </a:p>
                   </a:txBody>
                   <a:tcPr/>
@@ -13827,7 +12665,6 @@
                         <a:rPr lang="en-US" dirty="0" smtClean="0"/>
                         <a:t>Commit</a:t>
                       </a:r>
-                      <a:endParaRPr lang="en-US" dirty="0" smtClean="0"/>
                     </a:p>
                   </a:txBody>
                   <a:tcPr/>
@@ -13865,7 +12702,6 @@
                         <a:rPr lang="en-US" dirty="0" smtClean="0"/>
                         <a:t>Log</a:t>
                       </a:r>
-                      <a:endParaRPr lang="en-US" dirty="0" smtClean="0"/>
                     </a:p>
                   </a:txBody>
                   <a:tcPr/>
@@ -13896,7 +12732,6 @@
                         <a:rPr lang="en-US" dirty="0" smtClean="0"/>
                         <a:t>Checkout</a:t>
                       </a:r>
-                      <a:endParaRPr lang="en-US" dirty="0" smtClean="0"/>
                     </a:p>
                   </a:txBody>
                   <a:tcPr/>

</xml_diff>